<commit_message>
Egy új cím és host típus hozzáadása az adatbázishoz. Kezeli a clusterek esetén az azonos címeket. Hibajavítás. Kisebb modosítás a prezentáción.
</commit_message>
<xml_diff>
--- a/lanview.pptx
+++ b/lanview.pptx
@@ -128,6 +128,30 @@
 
 <file path=ppt/changesInfos/changesInfo1.xml><?xml version="1.0" encoding="utf-8"?>
 <pc:chgInfo xmlns:a="http://schemas.openxmlformats.org/drawingml/2006/main" xmlns:r="http://schemas.openxmlformats.org/officeDocument/2006/relationships" xmlns:ac="http://schemas.microsoft.com/office/drawing/2013/main/command" xmlns:pc="http://schemas.microsoft.com/office/powerpoint/2013/main/command">
+  <pc:docChgLst>
+    <pc:chgData name="Csiki Ferenc" userId="100300009516E1C3@LIVE.COM" providerId="AD" clId="Web-{B5290F3E-D0C8-4848-9392-71ACFDC43C31}"/>
+    <pc:docChg chg="modSld">
+      <pc:chgData name="Csiki Ferenc" userId="100300009516E1C3@LIVE.COM" providerId="AD" clId="Web-{B5290F3E-D0C8-4848-9392-71ACFDC43C31}" dt="2017-12-11T18:55:41.274" v="1"/>
+      <pc:docMkLst>
+        <pc:docMk/>
+      </pc:docMkLst>
+      <pc:sldChg chg="modSp">
+        <pc:chgData name="Csiki Ferenc" userId="100300009516E1C3@LIVE.COM" providerId="AD" clId="Web-{B5290F3E-D0C8-4848-9392-71ACFDC43C31}" dt="2017-12-11T18:55:41.274" v="1"/>
+        <pc:sldMkLst>
+          <pc:docMk/>
+          <pc:sldMk cId="1396513568" sldId="262"/>
+        </pc:sldMkLst>
+        <pc:graphicFrameChg chg="mod">
+          <ac:chgData name="Csiki Ferenc" userId="100300009516E1C3@LIVE.COM" providerId="AD" clId="Web-{B5290F3E-D0C8-4848-9392-71ACFDC43C31}" dt="2017-12-11T18:55:41.274" v="1"/>
+          <ac:graphicFrameMkLst>
+            <pc:docMk/>
+            <pc:sldMk cId="1396513568" sldId="262"/>
+            <ac:graphicFrameMk id="8" creationId="{00000000-0000-0000-0000-000000000000}"/>
+          </ac:graphicFrameMkLst>
+        </pc:graphicFrameChg>
+      </pc:sldChg>
+    </pc:docChg>
+  </pc:docChgLst>
   <pc:docChgLst>
     <pc:chgData name="Csiki Ferenc" userId="100300009516E1C3@LIVE.COM" providerId="AD" clId="Web-{2476D63A-557A-4A32-B97A-D3B2762408F3}"/>
     <pc:docChg chg="modSld">
@@ -7070,6 +7094,13 @@
         </dgm:presLayoutVars>
       </dgm:prSet>
       <dgm:spPr/>
+      <dgm:t>
+        <a:bodyPr/>
+        <a:lstStyle/>
+        <a:p>
+          <a:endParaRPr lang="hu-HU"/>
+        </a:p>
+      </dgm:t>
     </dgm:pt>
     <dgm:pt modelId="{6494A221-A136-49AD-9228-56177AF84E00}" type="pres">
       <dgm:prSet presAssocID="{7B9D6327-53AB-4CFA-84E8-365EC175D970}" presName="arrow" presStyleLbl="bgShp" presStyleIdx="0" presStyleCnt="1" custScaleX="117647"/>
@@ -7086,6 +7117,13 @@
         </dgm:presLayoutVars>
       </dgm:prSet>
       <dgm:spPr/>
+      <dgm:t>
+        <a:bodyPr/>
+        <a:lstStyle/>
+        <a:p>
+          <a:endParaRPr lang="hu-HU"/>
+        </a:p>
+      </dgm:t>
     </dgm:pt>
     <dgm:pt modelId="{FFA34217-E368-4C6A-8589-216872AF7A46}" type="pres">
       <dgm:prSet presAssocID="{5461E228-287C-44B6-ABBE-C0B6E6B7ED5E}" presName="sibTrans" presStyleCnt="0"/>
@@ -7098,6 +7136,13 @@
         </dgm:presLayoutVars>
       </dgm:prSet>
       <dgm:spPr/>
+      <dgm:t>
+        <a:bodyPr/>
+        <a:lstStyle/>
+        <a:p>
+          <a:endParaRPr lang="hu-HU"/>
+        </a:p>
+      </dgm:t>
     </dgm:pt>
     <dgm:pt modelId="{C34FF2CF-764E-4D33-85B6-1247B758DDAC}" type="pres">
       <dgm:prSet presAssocID="{8EBED27C-25FC-4B5E-A5FF-597A59F3E698}" presName="sibTrans" presStyleCnt="0"/>
@@ -7110,6 +7155,13 @@
         </dgm:presLayoutVars>
       </dgm:prSet>
       <dgm:spPr/>
+      <dgm:t>
+        <a:bodyPr/>
+        <a:lstStyle/>
+        <a:p>
+          <a:endParaRPr lang="hu-HU"/>
+        </a:p>
+      </dgm:t>
     </dgm:pt>
     <dgm:pt modelId="{AB701B30-11C6-44E7-A9C8-85906B7A612C}" type="pres">
       <dgm:prSet presAssocID="{67964E09-38D7-4F24-801A-5319E0C63CB9}" presName="sibTrans" presStyleCnt="0"/>
@@ -7122,18 +7174,25 @@
         </dgm:presLayoutVars>
       </dgm:prSet>
       <dgm:spPr/>
+      <dgm:t>
+        <a:bodyPr/>
+        <a:lstStyle/>
+        <a:p>
+          <a:endParaRPr lang="hu-HU"/>
+        </a:p>
+      </dgm:t>
     </dgm:pt>
   </dgm:ptLst>
   <dgm:cxnLst>
+    <dgm:cxn modelId="{F5020B2D-D9C5-4518-9E75-70391660AF96}" type="presOf" srcId="{2AEEFA18-1DCA-45DC-9AEA-BCFF5B1A8C5A}" destId="{4BCAD1D2-380A-4C18-B959-6423AB065706}" srcOrd="0" destOrd="0" presId="urn:microsoft.com/office/officeart/2005/8/layout/hProcess9"/>
     <dgm:cxn modelId="{F45DE218-52DC-40D7-8497-A353EFFCC1C5}" srcId="{7B9D6327-53AB-4CFA-84E8-365EC175D970}" destId="{666124C1-3FB9-4E63-BCFC-E6333EDDF170}" srcOrd="2" destOrd="0" parTransId="{0C0F906C-FB70-4AF1-A390-AAFA57EA0C27}" sibTransId="{67964E09-38D7-4F24-801A-5319E0C63CB9}"/>
-    <dgm:cxn modelId="{D53C9828-0D90-4A99-B74D-51B3DA41E078}" srcId="{7B9D6327-53AB-4CFA-84E8-365EC175D970}" destId="{169B725F-19F6-4AA2-A601-5C92F89EF033}" srcOrd="3" destOrd="0" parTransId="{8F1BE1D8-1994-4162-AC91-C410473C2921}" sibTransId="{5B2590FC-8108-4795-BCBC-650E7D71F03C}"/>
-    <dgm:cxn modelId="{F5020B2D-D9C5-4518-9E75-70391660AF96}" type="presOf" srcId="{2AEEFA18-1DCA-45DC-9AEA-BCFF5B1A8C5A}" destId="{4BCAD1D2-380A-4C18-B959-6423AB065706}" srcOrd="0" destOrd="0" presId="urn:microsoft.com/office/officeart/2005/8/layout/hProcess9"/>
-    <dgm:cxn modelId="{537D3A38-FC8E-4054-8163-C40BA1C52337}" type="presOf" srcId="{666124C1-3FB9-4E63-BCFC-E6333EDDF170}" destId="{88BF2B91-9C21-4AA1-A7B3-F73DF29AA5F7}" srcOrd="0" destOrd="0" presId="urn:microsoft.com/office/officeart/2005/8/layout/hProcess9"/>
     <dgm:cxn modelId="{B493EB38-C778-4B42-863A-95FC5EDCFBF3}" srcId="{7B9D6327-53AB-4CFA-84E8-365EC175D970}" destId="{49A1843F-16D0-44B5-94E5-3817AF209A40}" srcOrd="1" destOrd="0" parTransId="{49764B83-6253-40E0-AE89-5A96E1230AF3}" sibTransId="{8EBED27C-25FC-4B5E-A5FF-597A59F3E698}"/>
     <dgm:cxn modelId="{C76A7386-8FA2-4414-A3AB-617E65925C49}" type="presOf" srcId="{7B9D6327-53AB-4CFA-84E8-365EC175D970}" destId="{CB6A9AEB-3C2C-477F-9BEF-012F7F725CDA}" srcOrd="0" destOrd="0" presId="urn:microsoft.com/office/officeart/2005/8/layout/hProcess9"/>
     <dgm:cxn modelId="{05796E97-65B1-4E60-9602-DE80977DE593}" srcId="{7B9D6327-53AB-4CFA-84E8-365EC175D970}" destId="{2AEEFA18-1DCA-45DC-9AEA-BCFF5B1A8C5A}" srcOrd="0" destOrd="0" parTransId="{4256D9BB-3C22-49D0-9363-B492836943A9}" sibTransId="{5461E228-287C-44B6-ABBE-C0B6E6B7ED5E}"/>
+    <dgm:cxn modelId="{2DB871B9-4FE1-42D0-A0F5-B7BF2C182082}" type="presOf" srcId="{169B725F-19F6-4AA2-A601-5C92F89EF033}" destId="{245C1520-E559-43C1-8B98-C27FCAA36F47}" srcOrd="0" destOrd="0" presId="urn:microsoft.com/office/officeart/2005/8/layout/hProcess9"/>
+    <dgm:cxn modelId="{537D3A38-FC8E-4054-8163-C40BA1C52337}" type="presOf" srcId="{666124C1-3FB9-4E63-BCFC-E6333EDDF170}" destId="{88BF2B91-9C21-4AA1-A7B3-F73DF29AA5F7}" srcOrd="0" destOrd="0" presId="urn:microsoft.com/office/officeart/2005/8/layout/hProcess9"/>
+    <dgm:cxn modelId="{D53C9828-0D90-4A99-B74D-51B3DA41E078}" srcId="{7B9D6327-53AB-4CFA-84E8-365EC175D970}" destId="{169B725F-19F6-4AA2-A601-5C92F89EF033}" srcOrd="3" destOrd="0" parTransId="{8F1BE1D8-1994-4162-AC91-C410473C2921}" sibTransId="{5B2590FC-8108-4795-BCBC-650E7D71F03C}"/>
     <dgm:cxn modelId="{DC28359C-E820-49B7-AE10-D1EBD41116D0}" type="presOf" srcId="{49A1843F-16D0-44B5-94E5-3817AF209A40}" destId="{F6E1E0C3-3EE9-49D3-AC7D-54697EA1B03E}" srcOrd="0" destOrd="0" presId="urn:microsoft.com/office/officeart/2005/8/layout/hProcess9"/>
-    <dgm:cxn modelId="{2DB871B9-4FE1-42D0-A0F5-B7BF2C182082}" type="presOf" srcId="{169B725F-19F6-4AA2-A601-5C92F89EF033}" destId="{245C1520-E559-43C1-8B98-C27FCAA36F47}" srcOrd="0" destOrd="0" presId="urn:microsoft.com/office/officeart/2005/8/layout/hProcess9"/>
     <dgm:cxn modelId="{190858D3-4373-48CB-B75F-E6B24BC0094D}" type="presParOf" srcId="{CB6A9AEB-3C2C-477F-9BEF-012F7F725CDA}" destId="{6494A221-A136-49AD-9228-56177AF84E00}" srcOrd="0" destOrd="0" presId="urn:microsoft.com/office/officeart/2005/8/layout/hProcess9"/>
     <dgm:cxn modelId="{F37CBC3E-DD7F-4DA9-80BA-85754BE5C260}" type="presParOf" srcId="{CB6A9AEB-3C2C-477F-9BEF-012F7F725CDA}" destId="{86192979-C426-4352-882D-986E11BB9B6D}" srcOrd="1" destOrd="0" presId="urn:microsoft.com/office/officeart/2005/8/layout/hProcess9"/>
     <dgm:cxn modelId="{CAF52F68-873C-4738-90F0-A9AF64CB6A48}" type="presParOf" srcId="{86192979-C426-4352-882D-986E11BB9B6D}" destId="{4BCAD1D2-380A-4C18-B959-6423AB065706}" srcOrd="0" destOrd="0" presId="urn:microsoft.com/office/officeart/2005/8/layout/hProcess9"/>
@@ -7324,6 +7383,13 @@
         </dgm:presLayoutVars>
       </dgm:prSet>
       <dgm:spPr/>
+      <dgm:t>
+        <a:bodyPr/>
+        <a:lstStyle/>
+        <a:p>
+          <a:endParaRPr lang="hu-HU"/>
+        </a:p>
+      </dgm:t>
     </dgm:pt>
     <dgm:pt modelId="{83EB107A-842F-4F3C-A3DF-18D7DD930698}" type="pres">
       <dgm:prSet presAssocID="{BF985055-68B4-4899-AA1F-CA66C137D02A}" presName="arrow" presStyleLbl="bgShp" presStyleIdx="0" presStyleCnt="1" custFlipHor="1" custScaleX="1354" custScaleY="24239"/>
@@ -7342,6 +7408,13 @@
         </dgm:presLayoutVars>
       </dgm:prSet>
       <dgm:spPr/>
+      <dgm:t>
+        <a:bodyPr/>
+        <a:lstStyle/>
+        <a:p>
+          <a:endParaRPr lang="hu-HU"/>
+        </a:p>
+      </dgm:t>
     </dgm:pt>
     <dgm:pt modelId="{1DA2811E-7200-4BBE-9CC7-955527291F1E}" type="pres">
       <dgm:prSet presAssocID="{948B8B5D-77A3-408F-BCAA-5269D1B12C2D}" presName="sibTrans" presStyleCnt="0"/>
@@ -7354,6 +7427,13 @@
         </dgm:presLayoutVars>
       </dgm:prSet>
       <dgm:spPr/>
+      <dgm:t>
+        <a:bodyPr/>
+        <a:lstStyle/>
+        <a:p>
+          <a:endParaRPr lang="hu-HU"/>
+        </a:p>
+      </dgm:t>
     </dgm:pt>
     <dgm:pt modelId="{FA383FAB-FA0F-4FB0-8E5B-643CF58CA28D}" type="pres">
       <dgm:prSet presAssocID="{3B3413E3-8B60-48BC-AE14-3178ABD61A18}" presName="sibTrans" presStyleCnt="0"/>
@@ -7366,6 +7446,13 @@
         </dgm:presLayoutVars>
       </dgm:prSet>
       <dgm:spPr/>
+      <dgm:t>
+        <a:bodyPr/>
+        <a:lstStyle/>
+        <a:p>
+          <a:endParaRPr lang="hu-HU"/>
+        </a:p>
+      </dgm:t>
     </dgm:pt>
     <dgm:pt modelId="{058548D9-8FEF-424E-BAC5-139831E3E108}" type="pres">
       <dgm:prSet presAssocID="{C7F614E8-BC52-48E7-9E32-61E7C0ED3AAB}" presName="sibTrans" presStyleCnt="0"/>
@@ -7378,18 +7465,25 @@
         </dgm:presLayoutVars>
       </dgm:prSet>
       <dgm:spPr/>
+      <dgm:t>
+        <a:bodyPr/>
+        <a:lstStyle/>
+        <a:p>
+          <a:endParaRPr lang="hu-HU"/>
+        </a:p>
+      </dgm:t>
     </dgm:pt>
   </dgm:ptLst>
   <dgm:cxnLst>
+    <dgm:cxn modelId="{BF7DC054-B31B-43E0-A6A2-FD0FB5FE7DE0}" srcId="{BF985055-68B4-4899-AA1F-CA66C137D02A}" destId="{DBC25DEE-28CC-4772-A8C7-17B0A5402439}" srcOrd="1" destOrd="0" parTransId="{B1FD8F13-695B-47DA-B392-E182B878E505}" sibTransId="{3B3413E3-8B60-48BC-AE14-3178ABD61A18}"/>
+    <dgm:cxn modelId="{9290C050-CAD3-41A4-B9E5-9A0DB7E45BFF}" type="presOf" srcId="{BF985055-68B4-4899-AA1F-CA66C137D02A}" destId="{06CDD3C2-D052-4BC4-AB58-D2C9CBE6E096}" srcOrd="0" destOrd="0" presId="urn:microsoft.com/office/officeart/2005/8/layout/hProcess9"/>
+    <dgm:cxn modelId="{A330B7F3-9F79-4219-B601-057C0ECFD50A}" type="presOf" srcId="{B52C2317-5879-48DA-AC17-9D6570467A12}" destId="{034A0340-3A20-4252-A850-C6A39F574970}" srcOrd="0" destOrd="0" presId="urn:microsoft.com/office/officeart/2005/8/layout/hProcess9"/>
+    <dgm:cxn modelId="{3AEEAFB5-AF53-4ABF-9825-C9419D5B25DD}" type="presOf" srcId="{DBC25DEE-28CC-4772-A8C7-17B0A5402439}" destId="{18080AD5-DF28-44D0-B53B-0F4270F18ECA}" srcOrd="0" destOrd="0" presId="urn:microsoft.com/office/officeart/2005/8/layout/hProcess9"/>
+    <dgm:cxn modelId="{FFA2DDDE-9F7D-4A25-B578-68655B660FDB}" srcId="{BF985055-68B4-4899-AA1F-CA66C137D02A}" destId="{39834B56-B7F1-40BE-974F-DA4708DEE4FE}" srcOrd="2" destOrd="0" parTransId="{533BC263-1A37-49A1-BE04-DB35099F0C2A}" sibTransId="{C7F614E8-BC52-48E7-9E32-61E7C0ED3AAB}"/>
     <dgm:cxn modelId="{309AF213-624D-41F4-B636-01422B14C60B}" srcId="{BF985055-68B4-4899-AA1F-CA66C137D02A}" destId="{49BC2493-A5D9-4AA8-849C-84A582F488AB}" srcOrd="3" destOrd="0" parTransId="{86F8CC9E-F875-4A21-8F7A-8F5414F35284}" sibTransId="{3F669EAA-E7C2-42A2-8FD0-AAC0738972A5}"/>
-    <dgm:cxn modelId="{9290C050-CAD3-41A4-B9E5-9A0DB7E45BFF}" type="presOf" srcId="{BF985055-68B4-4899-AA1F-CA66C137D02A}" destId="{06CDD3C2-D052-4BC4-AB58-D2C9CBE6E096}" srcOrd="0" destOrd="0" presId="urn:microsoft.com/office/officeart/2005/8/layout/hProcess9"/>
+    <dgm:cxn modelId="{2EB8438D-703C-4E12-920E-511A96E06F92}" srcId="{BF985055-68B4-4899-AA1F-CA66C137D02A}" destId="{B52C2317-5879-48DA-AC17-9D6570467A12}" srcOrd="0" destOrd="0" parTransId="{D0DC332A-106D-440B-BD37-8CAD21FD4A6E}" sibTransId="{948B8B5D-77A3-408F-BCAA-5269D1B12C2D}"/>
+    <dgm:cxn modelId="{BD6FB6D9-3A60-40CB-AF32-E346760E7735}" type="presOf" srcId="{49BC2493-A5D9-4AA8-849C-84A582F488AB}" destId="{065C20BE-D08A-4817-85C2-B053D987C367}" srcOrd="0" destOrd="0" presId="urn:microsoft.com/office/officeart/2005/8/layout/hProcess9"/>
     <dgm:cxn modelId="{D3C3A474-D89E-424A-98B8-D62EF5C454AB}" type="presOf" srcId="{39834B56-B7F1-40BE-974F-DA4708DEE4FE}" destId="{474F4354-155E-4407-97B3-63807484C902}" srcOrd="0" destOrd="0" presId="urn:microsoft.com/office/officeart/2005/8/layout/hProcess9"/>
-    <dgm:cxn modelId="{BF7DC054-B31B-43E0-A6A2-FD0FB5FE7DE0}" srcId="{BF985055-68B4-4899-AA1F-CA66C137D02A}" destId="{DBC25DEE-28CC-4772-A8C7-17B0A5402439}" srcOrd="1" destOrd="0" parTransId="{B1FD8F13-695B-47DA-B392-E182B878E505}" sibTransId="{3B3413E3-8B60-48BC-AE14-3178ABD61A18}"/>
-    <dgm:cxn modelId="{2EB8438D-703C-4E12-920E-511A96E06F92}" srcId="{BF985055-68B4-4899-AA1F-CA66C137D02A}" destId="{B52C2317-5879-48DA-AC17-9D6570467A12}" srcOrd="0" destOrd="0" parTransId="{D0DC332A-106D-440B-BD37-8CAD21FD4A6E}" sibTransId="{948B8B5D-77A3-408F-BCAA-5269D1B12C2D}"/>
-    <dgm:cxn modelId="{3AEEAFB5-AF53-4ABF-9825-C9419D5B25DD}" type="presOf" srcId="{DBC25DEE-28CC-4772-A8C7-17B0A5402439}" destId="{18080AD5-DF28-44D0-B53B-0F4270F18ECA}" srcOrd="0" destOrd="0" presId="urn:microsoft.com/office/officeart/2005/8/layout/hProcess9"/>
-    <dgm:cxn modelId="{BD6FB6D9-3A60-40CB-AF32-E346760E7735}" type="presOf" srcId="{49BC2493-A5D9-4AA8-849C-84A582F488AB}" destId="{065C20BE-D08A-4817-85C2-B053D987C367}" srcOrd="0" destOrd="0" presId="urn:microsoft.com/office/officeart/2005/8/layout/hProcess9"/>
-    <dgm:cxn modelId="{FFA2DDDE-9F7D-4A25-B578-68655B660FDB}" srcId="{BF985055-68B4-4899-AA1F-CA66C137D02A}" destId="{39834B56-B7F1-40BE-974F-DA4708DEE4FE}" srcOrd="2" destOrd="0" parTransId="{533BC263-1A37-49A1-BE04-DB35099F0C2A}" sibTransId="{C7F614E8-BC52-48E7-9E32-61E7C0ED3AAB}"/>
-    <dgm:cxn modelId="{A330B7F3-9F79-4219-B601-057C0ECFD50A}" type="presOf" srcId="{B52C2317-5879-48DA-AC17-9D6570467A12}" destId="{034A0340-3A20-4252-A850-C6A39F574970}" srcOrd="0" destOrd="0" presId="urn:microsoft.com/office/officeart/2005/8/layout/hProcess9"/>
     <dgm:cxn modelId="{C00B12FC-DE56-4FBE-B5E3-6F551EE68BE4}" type="presParOf" srcId="{06CDD3C2-D052-4BC4-AB58-D2C9CBE6E096}" destId="{83EB107A-842F-4F3C-A3DF-18D7DD930698}" srcOrd="0" destOrd="0" presId="urn:microsoft.com/office/officeart/2005/8/layout/hProcess9"/>
     <dgm:cxn modelId="{02616EB5-B46A-4B25-B423-839ECE48FE65}" type="presParOf" srcId="{06CDD3C2-D052-4BC4-AB58-D2C9CBE6E096}" destId="{33A30950-4B56-484B-AE9E-7760212DC6A1}" srcOrd="1" destOrd="0" presId="urn:microsoft.com/office/officeart/2005/8/layout/hProcess9"/>
     <dgm:cxn modelId="{E23C732B-B5F0-45E9-B3C4-BAFF68F0E7A0}" type="presParOf" srcId="{33A30950-4B56-484B-AE9E-7760212DC6A1}" destId="{034A0340-3A20-4252-A850-C6A39F574970}" srcOrd="0" destOrd="0" presId="urn:microsoft.com/office/officeart/2005/8/layout/hProcess9"/>
@@ -7580,6 +7674,13 @@
         </dgm:presLayoutVars>
       </dgm:prSet>
       <dgm:spPr/>
+      <dgm:t>
+        <a:bodyPr/>
+        <a:lstStyle/>
+        <a:p>
+          <a:endParaRPr lang="hu-HU"/>
+        </a:p>
+      </dgm:t>
     </dgm:pt>
     <dgm:pt modelId="{53F5226A-8FD1-418F-9093-6890947C5F2C}" type="pres">
       <dgm:prSet presAssocID="{51B6D244-161E-41A5-B869-D0BC845F8ACB}" presName="arrow" presStyleLbl="bgShp" presStyleIdx="0" presStyleCnt="1"/>
@@ -7598,6 +7699,13 @@
         </dgm:presLayoutVars>
       </dgm:prSet>
       <dgm:spPr/>
+      <dgm:t>
+        <a:bodyPr/>
+        <a:lstStyle/>
+        <a:p>
+          <a:endParaRPr lang="hu-HU"/>
+        </a:p>
+      </dgm:t>
     </dgm:pt>
     <dgm:pt modelId="{1CC86669-841E-4ADB-AC58-ADD279AC3390}" type="pres">
       <dgm:prSet presAssocID="{E1F2B632-DD8B-416C-8AA7-F509C4A172A6}" presName="sibTrans" presStyleCnt="0"/>
@@ -7610,6 +7718,13 @@
         </dgm:presLayoutVars>
       </dgm:prSet>
       <dgm:spPr/>
+      <dgm:t>
+        <a:bodyPr/>
+        <a:lstStyle/>
+        <a:p>
+          <a:endParaRPr lang="hu-HU"/>
+        </a:p>
+      </dgm:t>
     </dgm:pt>
     <dgm:pt modelId="{E94F31E7-9AD3-4A61-AE9D-2376B4B1E429}" type="pres">
       <dgm:prSet presAssocID="{A5DCFE6B-F78D-43CF-9B2D-094F052AC406}" presName="sibTrans" presStyleCnt="0"/>
@@ -7622,6 +7737,13 @@
         </dgm:presLayoutVars>
       </dgm:prSet>
       <dgm:spPr/>
+      <dgm:t>
+        <a:bodyPr/>
+        <a:lstStyle/>
+        <a:p>
+          <a:endParaRPr lang="hu-HU"/>
+        </a:p>
+      </dgm:t>
     </dgm:pt>
     <dgm:pt modelId="{583AF3D5-32C6-421F-AE22-4FA39FE7CB90}" type="pres">
       <dgm:prSet presAssocID="{A37747A0-6E1E-409E-BB0D-A295D81F5362}" presName="sibTrans" presStyleCnt="0"/>
@@ -7634,18 +7756,25 @@
         </dgm:presLayoutVars>
       </dgm:prSet>
       <dgm:spPr/>
+      <dgm:t>
+        <a:bodyPr/>
+        <a:lstStyle/>
+        <a:p>
+          <a:endParaRPr lang="hu-HU"/>
+        </a:p>
+      </dgm:t>
     </dgm:pt>
   </dgm:ptLst>
   <dgm:cxnLst>
+    <dgm:cxn modelId="{1EDA4C4F-137E-4453-8653-52E8E2477C8D}" srcId="{51B6D244-161E-41A5-B869-D0BC845F8ACB}" destId="{5134035C-8206-42F3-BAF6-2EFE64A8E997}" srcOrd="3" destOrd="0" parTransId="{A50E53D9-839E-4A6F-9FC8-742F85BCCAC0}" sibTransId="{DA67F173-F2AA-4434-9FA5-3AD0513E1B97}"/>
+    <dgm:cxn modelId="{CA8B66EA-7E1A-43D5-9B53-6C8267661E01}" type="presOf" srcId="{51B6D244-161E-41A5-B869-D0BC845F8ACB}" destId="{5E4FBF63-8A43-4ACB-9E79-8EE21610F44C}" srcOrd="0" destOrd="0" presId="urn:microsoft.com/office/officeart/2005/8/layout/hProcess9"/>
+    <dgm:cxn modelId="{C7A64E3D-0867-4135-905B-E44830CD505F}" type="presOf" srcId="{E5415FFB-C97E-473D-A222-0C17E24E2D87}" destId="{ECB83B8D-4871-426D-A510-B053CC23384A}" srcOrd="0" destOrd="0" presId="urn:microsoft.com/office/officeart/2005/8/layout/hProcess9"/>
+    <dgm:cxn modelId="{B21AF5BA-2849-4303-A01D-4046EDD59818}" srcId="{51B6D244-161E-41A5-B869-D0BC845F8ACB}" destId="{E5415FFB-C97E-473D-A222-0C17E24E2D87}" srcOrd="1" destOrd="0" parTransId="{84D61883-B426-41FD-BBC4-40117769EC2E}" sibTransId="{A5DCFE6B-F78D-43CF-9B2D-094F052AC406}"/>
+    <dgm:cxn modelId="{3644B696-59E5-475C-B70D-39B833BFDB5C}" type="presOf" srcId="{631A8508-2F64-4EDE-98A8-A9E8C3E60DCA}" destId="{E6745038-9D77-4C8A-B304-1670878DF9AF}" srcOrd="0" destOrd="0" presId="urn:microsoft.com/office/officeart/2005/8/layout/hProcess9"/>
+    <dgm:cxn modelId="{CBA04164-4C6B-4970-9187-85D6DF953056}" type="presOf" srcId="{5134035C-8206-42F3-BAF6-2EFE64A8E997}" destId="{CB6BB2D4-24EC-4558-AE6F-13342FD38957}" srcOrd="0" destOrd="0" presId="urn:microsoft.com/office/officeart/2005/8/layout/hProcess9"/>
+    <dgm:cxn modelId="{236D7EA0-DB74-49F0-897D-34E679D5E594}" type="presOf" srcId="{B2DC7F87-1171-4090-92CF-2D865D26D906}" destId="{F1D997A5-E7A7-49C3-A550-8C8740C766C0}" srcOrd="0" destOrd="0" presId="urn:microsoft.com/office/officeart/2005/8/layout/hProcess9"/>
     <dgm:cxn modelId="{5D51EA39-F9EC-412F-99D6-FF24A24680D3}" srcId="{51B6D244-161E-41A5-B869-D0BC845F8ACB}" destId="{631A8508-2F64-4EDE-98A8-A9E8C3E60DCA}" srcOrd="0" destOrd="0" parTransId="{BACC8199-82E7-4255-BE10-46191B743AFD}" sibTransId="{E1F2B632-DD8B-416C-8AA7-F509C4A172A6}"/>
-    <dgm:cxn modelId="{C7A64E3D-0867-4135-905B-E44830CD505F}" type="presOf" srcId="{E5415FFB-C97E-473D-A222-0C17E24E2D87}" destId="{ECB83B8D-4871-426D-A510-B053CC23384A}" srcOrd="0" destOrd="0" presId="urn:microsoft.com/office/officeart/2005/8/layout/hProcess9"/>
-    <dgm:cxn modelId="{CBA04164-4C6B-4970-9187-85D6DF953056}" type="presOf" srcId="{5134035C-8206-42F3-BAF6-2EFE64A8E997}" destId="{CB6BB2D4-24EC-4558-AE6F-13342FD38957}" srcOrd="0" destOrd="0" presId="urn:microsoft.com/office/officeart/2005/8/layout/hProcess9"/>
-    <dgm:cxn modelId="{1EDA4C4F-137E-4453-8653-52E8E2477C8D}" srcId="{51B6D244-161E-41A5-B869-D0BC845F8ACB}" destId="{5134035C-8206-42F3-BAF6-2EFE64A8E997}" srcOrd="3" destOrd="0" parTransId="{A50E53D9-839E-4A6F-9FC8-742F85BCCAC0}" sibTransId="{DA67F173-F2AA-4434-9FA5-3AD0513E1B97}"/>
-    <dgm:cxn modelId="{3644B696-59E5-475C-B70D-39B833BFDB5C}" type="presOf" srcId="{631A8508-2F64-4EDE-98A8-A9E8C3E60DCA}" destId="{E6745038-9D77-4C8A-B304-1670878DF9AF}" srcOrd="0" destOrd="0" presId="urn:microsoft.com/office/officeart/2005/8/layout/hProcess9"/>
-    <dgm:cxn modelId="{236D7EA0-DB74-49F0-897D-34E679D5E594}" type="presOf" srcId="{B2DC7F87-1171-4090-92CF-2D865D26D906}" destId="{F1D997A5-E7A7-49C3-A550-8C8740C766C0}" srcOrd="0" destOrd="0" presId="urn:microsoft.com/office/officeart/2005/8/layout/hProcess9"/>
-    <dgm:cxn modelId="{B21AF5BA-2849-4303-A01D-4046EDD59818}" srcId="{51B6D244-161E-41A5-B869-D0BC845F8ACB}" destId="{E5415FFB-C97E-473D-A222-0C17E24E2D87}" srcOrd="1" destOrd="0" parTransId="{84D61883-B426-41FD-BBC4-40117769EC2E}" sibTransId="{A5DCFE6B-F78D-43CF-9B2D-094F052AC406}"/>
     <dgm:cxn modelId="{F5E78BE1-B21D-4CC2-A163-8CC1EBA00607}" srcId="{51B6D244-161E-41A5-B869-D0BC845F8ACB}" destId="{B2DC7F87-1171-4090-92CF-2D865D26D906}" srcOrd="2" destOrd="0" parTransId="{4B0FEFB9-D928-454D-955E-CD68A1BA84D2}" sibTransId="{A37747A0-6E1E-409E-BB0D-A295D81F5362}"/>
-    <dgm:cxn modelId="{CA8B66EA-7E1A-43D5-9B53-6C8267661E01}" type="presOf" srcId="{51B6D244-161E-41A5-B869-D0BC845F8ACB}" destId="{5E4FBF63-8A43-4ACB-9E79-8EE21610F44C}" srcOrd="0" destOrd="0" presId="urn:microsoft.com/office/officeart/2005/8/layout/hProcess9"/>
     <dgm:cxn modelId="{41D6A430-31C3-4851-8432-EF85EC63D9B5}" type="presParOf" srcId="{5E4FBF63-8A43-4ACB-9E79-8EE21610F44C}" destId="{53F5226A-8FD1-418F-9093-6890947C5F2C}" srcOrd="0" destOrd="0" presId="urn:microsoft.com/office/officeart/2005/8/layout/hProcess9"/>
     <dgm:cxn modelId="{7975A4E3-C668-4793-B081-AB11614E77F6}" type="presParOf" srcId="{5E4FBF63-8A43-4ACB-9E79-8EE21610F44C}" destId="{5B0E55F9-0260-43F4-BFD1-38989C673C20}" srcOrd="1" destOrd="0" presId="urn:microsoft.com/office/officeart/2005/8/layout/hProcess9"/>
     <dgm:cxn modelId="{8E070666-EC41-4885-B884-CDAD99C1CACD}" type="presParOf" srcId="{5B0E55F9-0260-43F4-BFD1-38989C673C20}" destId="{E6745038-9D77-4C8A-B304-1670878DF9AF}" srcOrd="0" destOrd="0" presId="urn:microsoft.com/office/officeart/2005/8/layout/hProcess9"/>
@@ -7727,6 +7856,13 @@
         </dgm:presLayoutVars>
       </dgm:prSet>
       <dgm:spPr/>
+      <dgm:t>
+        <a:bodyPr/>
+        <a:lstStyle/>
+        <a:p>
+          <a:endParaRPr lang="hu-HU"/>
+        </a:p>
+      </dgm:t>
     </dgm:pt>
     <dgm:pt modelId="{7F16950C-765C-4DEA-984E-32C130842C85}" type="pres">
       <dgm:prSet presAssocID="{37A115D1-6D4B-4536-9012-96A80DDD6B6C}" presName="arrow" presStyleLbl="bgShp" presStyleIdx="0" presStyleCnt="1"/>
@@ -7745,12 +7881,19 @@
         </dgm:presLayoutVars>
       </dgm:prSet>
       <dgm:spPr/>
+      <dgm:t>
+        <a:bodyPr/>
+        <a:lstStyle/>
+        <a:p>
+          <a:endParaRPr lang="hu-HU"/>
+        </a:p>
+      </dgm:t>
     </dgm:pt>
   </dgm:ptLst>
   <dgm:cxnLst>
     <dgm:cxn modelId="{3A9FE4BE-C705-4596-9AC8-D931ECA81AB4}" type="presOf" srcId="{37A115D1-6D4B-4536-9012-96A80DDD6B6C}" destId="{B638AA77-B25F-47F8-B867-986B2EE0DAD6}" srcOrd="0" destOrd="0" presId="urn:microsoft.com/office/officeart/2005/8/layout/hProcess9"/>
+    <dgm:cxn modelId="{321CC0F7-09FD-48E1-BBC7-7D3664BD303C}" type="presOf" srcId="{F8D68FE5-BB07-49A9-BAF0-FDF1160CA80B}" destId="{89A750C5-6077-400B-8A52-87C475281BCB}" srcOrd="0" destOrd="0" presId="urn:microsoft.com/office/officeart/2005/8/layout/hProcess9"/>
     <dgm:cxn modelId="{592C50E4-F732-4C84-ACC2-326F76E7E130}" srcId="{37A115D1-6D4B-4536-9012-96A80DDD6B6C}" destId="{F8D68FE5-BB07-49A9-BAF0-FDF1160CA80B}" srcOrd="0" destOrd="0" parTransId="{BE600DC0-6EE1-4608-8409-03B4D22402F3}" sibTransId="{5B8BDCA2-0CC8-4810-B8ED-B159B2D0EE4D}"/>
-    <dgm:cxn modelId="{321CC0F7-09FD-48E1-BBC7-7D3664BD303C}" type="presOf" srcId="{F8D68FE5-BB07-49A9-BAF0-FDF1160CA80B}" destId="{89A750C5-6077-400B-8A52-87C475281BCB}" srcOrd="0" destOrd="0" presId="urn:microsoft.com/office/officeart/2005/8/layout/hProcess9"/>
     <dgm:cxn modelId="{4717C226-6B40-4401-8EC5-36AF82BEA6E9}" type="presParOf" srcId="{B638AA77-B25F-47F8-B867-986B2EE0DAD6}" destId="{7F16950C-765C-4DEA-984E-32C130842C85}" srcOrd="0" destOrd="0" presId="urn:microsoft.com/office/officeart/2005/8/layout/hProcess9"/>
     <dgm:cxn modelId="{0AAD7F26-4474-43C3-8094-B0AA0B7FFF8E}" type="presParOf" srcId="{B638AA77-B25F-47F8-B867-986B2EE0DAD6}" destId="{BFA3702B-20DB-4561-B6AB-931D9D3666CE}" srcOrd="1" destOrd="0" presId="urn:microsoft.com/office/officeart/2005/8/layout/hProcess9"/>
     <dgm:cxn modelId="{D49A77F5-6F37-445B-BE9C-F0056379DE34}" type="presParOf" srcId="{BFA3702B-20DB-4561-B6AB-931D9D3666CE}" destId="{89A750C5-6077-400B-8A52-87C475281BCB}" srcOrd="0" destOrd="0" presId="urn:microsoft.com/office/officeart/2005/8/layout/hProcess9"/>
@@ -8013,6 +8156,13 @@
         </dgm:presLayoutVars>
       </dgm:prSet>
       <dgm:spPr/>
+      <dgm:t>
+        <a:bodyPr/>
+        <a:lstStyle/>
+        <a:p>
+          <a:endParaRPr lang="hu-HU"/>
+        </a:p>
+      </dgm:t>
     </dgm:pt>
     <dgm:pt modelId="{FDB2537E-B13B-459E-85A6-60EBF09B16D8}" type="pres">
       <dgm:prSet presAssocID="{7FC3FF27-545F-40A3-BF84-534BA90F44BF}" presName="hierRoot1" presStyleCnt="0">
@@ -8033,10 +8183,24 @@
         </dgm:presLayoutVars>
       </dgm:prSet>
       <dgm:spPr/>
+      <dgm:t>
+        <a:bodyPr/>
+        <a:lstStyle/>
+        <a:p>
+          <a:endParaRPr lang="hu-HU"/>
+        </a:p>
+      </dgm:t>
     </dgm:pt>
     <dgm:pt modelId="{73B7ECAA-1CA5-4814-9629-74B74421F0BB}" type="pres">
       <dgm:prSet presAssocID="{7FC3FF27-545F-40A3-BF84-534BA90F44BF}" presName="rootConnector1" presStyleLbl="node1" presStyleIdx="0" presStyleCnt="0"/>
       <dgm:spPr/>
+      <dgm:t>
+        <a:bodyPr/>
+        <a:lstStyle/>
+        <a:p>
+          <a:endParaRPr lang="hu-HU"/>
+        </a:p>
+      </dgm:t>
     </dgm:pt>
     <dgm:pt modelId="{BD201433-2757-408B-91B0-F5DA28F70FE6}" type="pres">
       <dgm:prSet presAssocID="{7FC3FF27-545F-40A3-BF84-534BA90F44BF}" presName="hierChild2" presStyleCnt="0"/>
@@ -8045,6 +8209,13 @@
     <dgm:pt modelId="{5F77070C-5332-4A79-9A25-3C444826BEA5}" type="pres">
       <dgm:prSet presAssocID="{BD050040-9319-48AF-BD5E-C0B572FE5764}" presName="Name37" presStyleLbl="parChTrans1D2" presStyleIdx="0" presStyleCnt="3"/>
       <dgm:spPr/>
+      <dgm:t>
+        <a:bodyPr/>
+        <a:lstStyle/>
+        <a:p>
+          <a:endParaRPr lang="hu-HU"/>
+        </a:p>
+      </dgm:t>
     </dgm:pt>
     <dgm:pt modelId="{4FE56862-BBB5-4B0F-AF4B-DAB25F3A8775}" type="pres">
       <dgm:prSet presAssocID="{18B785C8-BB2C-4260-BCA3-5917D60DD55C}" presName="hierRoot2" presStyleCnt="0">
@@ -8065,10 +8236,24 @@
         </dgm:presLayoutVars>
       </dgm:prSet>
       <dgm:spPr/>
+      <dgm:t>
+        <a:bodyPr/>
+        <a:lstStyle/>
+        <a:p>
+          <a:endParaRPr lang="hu-HU"/>
+        </a:p>
+      </dgm:t>
     </dgm:pt>
     <dgm:pt modelId="{918958A4-FCC6-4D7A-BB25-33CED2C53A6B}" type="pres">
       <dgm:prSet presAssocID="{18B785C8-BB2C-4260-BCA3-5917D60DD55C}" presName="rootConnector" presStyleLbl="node2" presStyleIdx="0" presStyleCnt="3"/>
       <dgm:spPr/>
+      <dgm:t>
+        <a:bodyPr/>
+        <a:lstStyle/>
+        <a:p>
+          <a:endParaRPr lang="hu-HU"/>
+        </a:p>
+      </dgm:t>
     </dgm:pt>
     <dgm:pt modelId="{10F2D6C1-243E-4FB8-A40C-EB28A4AECF65}" type="pres">
       <dgm:prSet presAssocID="{18B785C8-BB2C-4260-BCA3-5917D60DD55C}" presName="hierChild4" presStyleCnt="0"/>
@@ -8081,6 +8266,13 @@
     <dgm:pt modelId="{0343D3CF-FF9E-42CF-8590-E33780EB2C7E}" type="pres">
       <dgm:prSet presAssocID="{4E0D05F0-62FF-484E-9DB0-82EA631C7E03}" presName="Name37" presStyleLbl="parChTrans1D2" presStyleIdx="1" presStyleCnt="3"/>
       <dgm:spPr/>
+      <dgm:t>
+        <a:bodyPr/>
+        <a:lstStyle/>
+        <a:p>
+          <a:endParaRPr lang="hu-HU"/>
+        </a:p>
+      </dgm:t>
     </dgm:pt>
     <dgm:pt modelId="{3FD5A0D4-F61F-4F3C-B456-61EE6C6664E3}" type="pres">
       <dgm:prSet presAssocID="{774A845F-2245-4F87-927F-70147ABC5EC5}" presName="hierRoot2" presStyleCnt="0">
@@ -8101,10 +8293,24 @@
         </dgm:presLayoutVars>
       </dgm:prSet>
       <dgm:spPr/>
+      <dgm:t>
+        <a:bodyPr/>
+        <a:lstStyle/>
+        <a:p>
+          <a:endParaRPr lang="hu-HU"/>
+        </a:p>
+      </dgm:t>
     </dgm:pt>
     <dgm:pt modelId="{F2DCCE3C-1AF8-418F-ADC2-D45FCB9115B9}" type="pres">
       <dgm:prSet presAssocID="{774A845F-2245-4F87-927F-70147ABC5EC5}" presName="rootConnector" presStyleLbl="node2" presStyleIdx="1" presStyleCnt="3"/>
       <dgm:spPr/>
+      <dgm:t>
+        <a:bodyPr/>
+        <a:lstStyle/>
+        <a:p>
+          <a:endParaRPr lang="hu-HU"/>
+        </a:p>
+      </dgm:t>
     </dgm:pt>
     <dgm:pt modelId="{46B87F4A-2D42-4800-A4FE-36B0E7F4F4D1}" type="pres">
       <dgm:prSet presAssocID="{774A845F-2245-4F87-927F-70147ABC5EC5}" presName="hierChild4" presStyleCnt="0"/>
@@ -8117,6 +8323,13 @@
     <dgm:pt modelId="{36C0D069-9E77-4A49-9D04-DDDC9243E2B6}" type="pres">
       <dgm:prSet presAssocID="{591FA75D-A15F-460C-9A65-D18A0F2070BB}" presName="Name37" presStyleLbl="parChTrans1D2" presStyleIdx="2" presStyleCnt="3"/>
       <dgm:spPr/>
+      <dgm:t>
+        <a:bodyPr/>
+        <a:lstStyle/>
+        <a:p>
+          <a:endParaRPr lang="hu-HU"/>
+        </a:p>
+      </dgm:t>
     </dgm:pt>
     <dgm:pt modelId="{A2B5E1D3-06AD-40EE-97E1-367B5D126719}" type="pres">
       <dgm:prSet presAssocID="{F207DC52-B3F8-452E-8F63-75052EB45BA4}" presName="hierRoot2" presStyleCnt="0">
@@ -8137,10 +8350,24 @@
         </dgm:presLayoutVars>
       </dgm:prSet>
       <dgm:spPr/>
+      <dgm:t>
+        <a:bodyPr/>
+        <a:lstStyle/>
+        <a:p>
+          <a:endParaRPr lang="hu-HU"/>
+        </a:p>
+      </dgm:t>
     </dgm:pt>
     <dgm:pt modelId="{8B30DECE-C82D-4C32-81B3-6ACED946CB9C}" type="pres">
       <dgm:prSet presAssocID="{F207DC52-B3F8-452E-8F63-75052EB45BA4}" presName="rootConnector" presStyleLbl="node2" presStyleIdx="2" presStyleCnt="3"/>
       <dgm:spPr/>
+      <dgm:t>
+        <a:bodyPr/>
+        <a:lstStyle/>
+        <a:p>
+          <a:endParaRPr lang="hu-HU"/>
+        </a:p>
+      </dgm:t>
     </dgm:pt>
     <dgm:pt modelId="{759E390B-8DF8-4EB8-A022-8A2B9F0B7468}" type="pres">
       <dgm:prSet presAssocID="{F207DC52-B3F8-452E-8F63-75052EB45BA4}" presName="hierChild4" presStyleCnt="0"/>
@@ -8149,6 +8376,13 @@
     <dgm:pt modelId="{FEB6DF48-1BDD-4B9B-A622-CBA2CAF2F8E4}" type="pres">
       <dgm:prSet presAssocID="{4BA44C64-34B3-430F-B487-5BE0AB069182}" presName="Name37" presStyleLbl="parChTrans1D3" presStyleIdx="0" presStyleCnt="2"/>
       <dgm:spPr/>
+      <dgm:t>
+        <a:bodyPr/>
+        <a:lstStyle/>
+        <a:p>
+          <a:endParaRPr lang="hu-HU"/>
+        </a:p>
+      </dgm:t>
     </dgm:pt>
     <dgm:pt modelId="{7EDEA491-9610-489E-99DB-B7795D5B2D79}" type="pres">
       <dgm:prSet presAssocID="{CC7DDDC8-7A57-4B4D-A8B0-49F5A1EBEB10}" presName="hierRoot2" presStyleCnt="0">
@@ -8169,10 +8403,24 @@
         </dgm:presLayoutVars>
       </dgm:prSet>
       <dgm:spPr/>
+      <dgm:t>
+        <a:bodyPr/>
+        <a:lstStyle/>
+        <a:p>
+          <a:endParaRPr lang="hu-HU"/>
+        </a:p>
+      </dgm:t>
     </dgm:pt>
     <dgm:pt modelId="{469C023A-2C9B-4A78-B3D0-D7B7E7D6425E}" type="pres">
       <dgm:prSet presAssocID="{CC7DDDC8-7A57-4B4D-A8B0-49F5A1EBEB10}" presName="rootConnector" presStyleLbl="node3" presStyleIdx="0" presStyleCnt="2"/>
       <dgm:spPr/>
+      <dgm:t>
+        <a:bodyPr/>
+        <a:lstStyle/>
+        <a:p>
+          <a:endParaRPr lang="hu-HU"/>
+        </a:p>
+      </dgm:t>
     </dgm:pt>
     <dgm:pt modelId="{2804F78D-527A-4B2E-AECC-2EFFFD04261B}" type="pres">
       <dgm:prSet presAssocID="{CC7DDDC8-7A57-4B4D-A8B0-49F5A1EBEB10}" presName="hierChild4" presStyleCnt="0"/>
@@ -8185,6 +8433,13 @@
     <dgm:pt modelId="{80F15F78-D69F-4279-B659-0ECC2B64B76F}" type="pres">
       <dgm:prSet presAssocID="{F6A1BE6D-988B-42CE-B4FD-1B3DD8C2ED49}" presName="Name37" presStyleLbl="parChTrans1D3" presStyleIdx="1" presStyleCnt="2"/>
       <dgm:spPr/>
+      <dgm:t>
+        <a:bodyPr/>
+        <a:lstStyle/>
+        <a:p>
+          <a:endParaRPr lang="hu-HU"/>
+        </a:p>
+      </dgm:t>
     </dgm:pt>
     <dgm:pt modelId="{B9A64F4E-F4A8-47AD-ADA1-2ACF85363064}" type="pres">
       <dgm:prSet presAssocID="{DD3283EC-7B56-4E61-921C-D290C920DD05}" presName="hierRoot2" presStyleCnt="0">
@@ -8205,10 +8460,24 @@
         </dgm:presLayoutVars>
       </dgm:prSet>
       <dgm:spPr/>
+      <dgm:t>
+        <a:bodyPr/>
+        <a:lstStyle/>
+        <a:p>
+          <a:endParaRPr lang="hu-HU"/>
+        </a:p>
+      </dgm:t>
     </dgm:pt>
     <dgm:pt modelId="{04547235-44AB-493C-85BE-2DC349F67C4E}" type="pres">
       <dgm:prSet presAssocID="{DD3283EC-7B56-4E61-921C-D290C920DD05}" presName="rootConnector" presStyleLbl="node3" presStyleIdx="1" presStyleCnt="2"/>
       <dgm:spPr/>
+      <dgm:t>
+        <a:bodyPr/>
+        <a:lstStyle/>
+        <a:p>
+          <a:endParaRPr lang="hu-HU"/>
+        </a:p>
+      </dgm:t>
     </dgm:pt>
     <dgm:pt modelId="{A1BD61DC-42B5-4B5F-9281-0095BA7E64EE}" type="pres">
       <dgm:prSet presAssocID="{DD3283EC-7B56-4E61-921C-D290C920DD05}" presName="hierChild4" presStyleCnt="0"/>
@@ -8229,29 +8498,29 @@
   </dgm:ptLst>
   <dgm:cxnLst>
     <dgm:cxn modelId="{5FF01007-9D14-4BA9-A9C9-38EE0EEF309D}" srcId="{F207DC52-B3F8-452E-8F63-75052EB45BA4}" destId="{DD3283EC-7B56-4E61-921C-D290C920DD05}" srcOrd="1" destOrd="0" parTransId="{F6A1BE6D-988B-42CE-B4FD-1B3DD8C2ED49}" sibTransId="{64A7550D-E45D-4923-92B5-D53184F30332}"/>
+    <dgm:cxn modelId="{EA710358-D821-4B95-BC62-0EA23FCB2D2A}" srcId="{7FC3FF27-545F-40A3-BF84-534BA90F44BF}" destId="{F207DC52-B3F8-452E-8F63-75052EB45BA4}" srcOrd="2" destOrd="0" parTransId="{591FA75D-A15F-460C-9A65-D18A0F2070BB}" sibTransId="{3A1ADC8A-3587-4A4D-930D-E979DFA93EAD}"/>
+    <dgm:cxn modelId="{F9F93857-4F2F-4360-89F6-8B3AEDABE3E6}" type="presOf" srcId="{DD3283EC-7B56-4E61-921C-D290C920DD05}" destId="{04547235-44AB-493C-85BE-2DC349F67C4E}" srcOrd="1" destOrd="0" presId="urn:microsoft.com/office/officeart/2005/8/layout/orgChart1"/>
+    <dgm:cxn modelId="{25D7C72B-DC09-49B2-914C-3EEEE63242B5}" type="presOf" srcId="{F207DC52-B3F8-452E-8F63-75052EB45BA4}" destId="{8B30DECE-C82D-4C32-81B3-6ACED946CB9C}" srcOrd="1" destOrd="0" presId="urn:microsoft.com/office/officeart/2005/8/layout/orgChart1"/>
+    <dgm:cxn modelId="{E98323D8-7DCB-458E-ADAA-D5C2E8EACA3E}" type="presOf" srcId="{4BA44C64-34B3-430F-B487-5BE0AB069182}" destId="{FEB6DF48-1BDD-4B9B-A622-CBA2CAF2F8E4}" srcOrd="0" destOrd="0" presId="urn:microsoft.com/office/officeart/2005/8/layout/orgChart1"/>
+    <dgm:cxn modelId="{44D19870-2E90-4B15-8ECA-26DE06BCC4D2}" type="presOf" srcId="{A5099243-3FC2-4824-BB91-AA6561350FCF}" destId="{2E1C3897-205B-4BBF-91BA-D671840DBB7E}" srcOrd="0" destOrd="0" presId="urn:microsoft.com/office/officeart/2005/8/layout/orgChart1"/>
+    <dgm:cxn modelId="{5BB3AB4E-4097-4B94-840C-6552FE142B47}" type="presOf" srcId="{591FA75D-A15F-460C-9A65-D18A0F2070BB}" destId="{36C0D069-9E77-4A49-9D04-DDDC9243E2B6}" srcOrd="0" destOrd="0" presId="urn:microsoft.com/office/officeart/2005/8/layout/orgChart1"/>
+    <dgm:cxn modelId="{4C29B358-52E8-49C2-B760-0E9BF6A2CE45}" type="presOf" srcId="{F6A1BE6D-988B-42CE-B4FD-1B3DD8C2ED49}" destId="{80F15F78-D69F-4279-B659-0ECC2B64B76F}" srcOrd="0" destOrd="0" presId="urn:microsoft.com/office/officeart/2005/8/layout/orgChart1"/>
+    <dgm:cxn modelId="{B016BC30-3C05-4A8E-954D-5220416ABA1D}" srcId="{F207DC52-B3F8-452E-8F63-75052EB45BA4}" destId="{CC7DDDC8-7A57-4B4D-A8B0-49F5A1EBEB10}" srcOrd="0" destOrd="0" parTransId="{4BA44C64-34B3-430F-B487-5BE0AB069182}" sibTransId="{23A2BFA9-7C1F-4B61-B1D6-90D7C084CF01}"/>
+    <dgm:cxn modelId="{9D5BEAB9-45DA-472E-BD7A-1AFE71DE3438}" type="presOf" srcId="{18B785C8-BB2C-4260-BCA3-5917D60DD55C}" destId="{918958A4-FCC6-4D7A-BB25-33CED2C53A6B}" srcOrd="1" destOrd="0" presId="urn:microsoft.com/office/officeart/2005/8/layout/orgChart1"/>
     <dgm:cxn modelId="{4592B71E-27A6-4B6F-B991-D32DF8FE87FC}" type="presOf" srcId="{CC7DDDC8-7A57-4B4D-A8B0-49F5A1EBEB10}" destId="{6EF8D142-3CEE-4C3A-A393-8EBECF033AAF}" srcOrd="0" destOrd="0" presId="urn:microsoft.com/office/officeart/2005/8/layout/orgChart1"/>
-    <dgm:cxn modelId="{25D7C72B-DC09-49B2-914C-3EEEE63242B5}" type="presOf" srcId="{F207DC52-B3F8-452E-8F63-75052EB45BA4}" destId="{8B30DECE-C82D-4C32-81B3-6ACED946CB9C}" srcOrd="1" destOrd="0" presId="urn:microsoft.com/office/officeart/2005/8/layout/orgChart1"/>
-    <dgm:cxn modelId="{B016BC30-3C05-4A8E-954D-5220416ABA1D}" srcId="{F207DC52-B3F8-452E-8F63-75052EB45BA4}" destId="{CC7DDDC8-7A57-4B4D-A8B0-49F5A1EBEB10}" srcOrd="0" destOrd="0" parTransId="{4BA44C64-34B3-430F-B487-5BE0AB069182}" sibTransId="{23A2BFA9-7C1F-4B61-B1D6-90D7C084CF01}"/>
+    <dgm:cxn modelId="{EDFAECCD-374C-4548-89F3-6B5F5DE910E7}" type="presOf" srcId="{CC7DDDC8-7A57-4B4D-A8B0-49F5A1EBEB10}" destId="{469C023A-2C9B-4A78-B3D0-D7B7E7D6425E}" srcOrd="1" destOrd="0" presId="urn:microsoft.com/office/officeart/2005/8/layout/orgChart1"/>
+    <dgm:cxn modelId="{F8D94FE0-AB2E-499B-8F38-FBD92CEE4AD5}" type="presOf" srcId="{774A845F-2245-4F87-927F-70147ABC5EC5}" destId="{F2DCCE3C-1AF8-418F-ADC2-D45FCB9115B9}" srcOrd="1" destOrd="0" presId="urn:microsoft.com/office/officeart/2005/8/layout/orgChart1"/>
+    <dgm:cxn modelId="{93965FCD-FAE4-4869-BC4F-87D645ABFBFC}" type="presOf" srcId="{18B785C8-BB2C-4260-BCA3-5917D60DD55C}" destId="{18D33703-4048-4A9B-8BC9-1AB69E7A468E}" srcOrd="0" destOrd="0" presId="urn:microsoft.com/office/officeart/2005/8/layout/orgChart1"/>
     <dgm:cxn modelId="{51CE0942-1334-43D3-9CFA-B7850D17FA02}" srcId="{7FC3FF27-545F-40A3-BF84-534BA90F44BF}" destId="{18B785C8-BB2C-4260-BCA3-5917D60DD55C}" srcOrd="0" destOrd="0" parTransId="{BD050040-9319-48AF-BD5E-C0B572FE5764}" sibTransId="{C040729B-1909-4A31-85AD-885904A40562}"/>
+    <dgm:cxn modelId="{2A7602ED-FC11-47B1-94F2-DA6424CADBF9}" type="presOf" srcId="{7FC3FF27-545F-40A3-BF84-534BA90F44BF}" destId="{22A4D8AC-C130-466A-AC84-CC750F249BFF}" srcOrd="0" destOrd="0" presId="urn:microsoft.com/office/officeart/2005/8/layout/orgChart1"/>
+    <dgm:cxn modelId="{0EB036E7-ACEC-47BD-B933-1F83B222B4D8}" type="presOf" srcId="{4E0D05F0-62FF-484E-9DB0-82EA631C7E03}" destId="{0343D3CF-FF9E-42CF-8590-E33780EB2C7E}" srcOrd="0" destOrd="0" presId="urn:microsoft.com/office/officeart/2005/8/layout/orgChart1"/>
+    <dgm:cxn modelId="{8D7F209B-4306-4E79-BAC7-1F13C5B94A23}" type="presOf" srcId="{F207DC52-B3F8-452E-8F63-75052EB45BA4}" destId="{51E29D2B-11A0-4E33-8E16-E5140292B1F0}" srcOrd="0" destOrd="0" presId="urn:microsoft.com/office/officeart/2005/8/layout/orgChart1"/>
+    <dgm:cxn modelId="{7114796E-905F-43DE-92BE-C4DB455D37DB}" type="presOf" srcId="{774A845F-2245-4F87-927F-70147ABC5EC5}" destId="{F272A33A-0804-4307-8D5A-D5DC2A8A14C2}" srcOrd="0" destOrd="0" presId="urn:microsoft.com/office/officeart/2005/8/layout/orgChart1"/>
+    <dgm:cxn modelId="{ACDAD095-D4F6-4BDC-8280-2661101EC28C}" srcId="{7FC3FF27-545F-40A3-BF84-534BA90F44BF}" destId="{774A845F-2245-4F87-927F-70147ABC5EC5}" srcOrd="1" destOrd="0" parTransId="{4E0D05F0-62FF-484E-9DB0-82EA631C7E03}" sibTransId="{9D998949-E6BF-4C63-8A29-C476755070A2}"/>
+    <dgm:cxn modelId="{6D32A989-3C59-45AF-BC87-C8F6715E0459}" type="presOf" srcId="{BD050040-9319-48AF-BD5E-C0B572FE5764}" destId="{5F77070C-5332-4A79-9A25-3C444826BEA5}" srcOrd="0" destOrd="0" presId="urn:microsoft.com/office/officeart/2005/8/layout/orgChart1"/>
+    <dgm:cxn modelId="{18A8F2FB-7CE4-4423-9E7A-F4573D341E1F}" srcId="{A5099243-3FC2-4824-BB91-AA6561350FCF}" destId="{7FC3FF27-545F-40A3-BF84-534BA90F44BF}" srcOrd="0" destOrd="0" parTransId="{9E8E7794-3A79-47F7-9907-DF39E5ACE20B}" sibTransId="{D7EDD94D-B8BE-43D4-9D5A-F99530AFE251}"/>
+    <dgm:cxn modelId="{1C70AA7E-2DAE-455A-92BA-D4AB52DE1997}" type="presOf" srcId="{DD3283EC-7B56-4E61-921C-D290C920DD05}" destId="{A1828263-2C56-4B62-A0B6-DD28C54F2DC0}" srcOrd="0" destOrd="0" presId="urn:microsoft.com/office/officeart/2005/8/layout/orgChart1"/>
     <dgm:cxn modelId="{64682C6A-6CE2-44B8-BF9D-369C31A7360F}" type="presOf" srcId="{7FC3FF27-545F-40A3-BF84-534BA90F44BF}" destId="{73B7ECAA-1CA5-4814-9629-74B74421F0BB}" srcOrd="1" destOrd="0" presId="urn:microsoft.com/office/officeart/2005/8/layout/orgChart1"/>
-    <dgm:cxn modelId="{7114796E-905F-43DE-92BE-C4DB455D37DB}" type="presOf" srcId="{774A845F-2245-4F87-927F-70147ABC5EC5}" destId="{F272A33A-0804-4307-8D5A-D5DC2A8A14C2}" srcOrd="0" destOrd="0" presId="urn:microsoft.com/office/officeart/2005/8/layout/orgChart1"/>
-    <dgm:cxn modelId="{5BB3AB4E-4097-4B94-840C-6552FE142B47}" type="presOf" srcId="{591FA75D-A15F-460C-9A65-D18A0F2070BB}" destId="{36C0D069-9E77-4A49-9D04-DDDC9243E2B6}" srcOrd="0" destOrd="0" presId="urn:microsoft.com/office/officeart/2005/8/layout/orgChart1"/>
-    <dgm:cxn modelId="{44D19870-2E90-4B15-8ECA-26DE06BCC4D2}" type="presOf" srcId="{A5099243-3FC2-4824-BB91-AA6561350FCF}" destId="{2E1C3897-205B-4BBF-91BA-D671840DBB7E}" srcOrd="0" destOrd="0" presId="urn:microsoft.com/office/officeart/2005/8/layout/orgChart1"/>
-    <dgm:cxn modelId="{F9F93857-4F2F-4360-89F6-8B3AEDABE3E6}" type="presOf" srcId="{DD3283EC-7B56-4E61-921C-D290C920DD05}" destId="{04547235-44AB-493C-85BE-2DC349F67C4E}" srcOrd="1" destOrd="0" presId="urn:microsoft.com/office/officeart/2005/8/layout/orgChart1"/>
-    <dgm:cxn modelId="{EA710358-D821-4B95-BC62-0EA23FCB2D2A}" srcId="{7FC3FF27-545F-40A3-BF84-534BA90F44BF}" destId="{F207DC52-B3F8-452E-8F63-75052EB45BA4}" srcOrd="2" destOrd="0" parTransId="{591FA75D-A15F-460C-9A65-D18A0F2070BB}" sibTransId="{3A1ADC8A-3587-4A4D-930D-E979DFA93EAD}"/>
-    <dgm:cxn modelId="{4C29B358-52E8-49C2-B760-0E9BF6A2CE45}" type="presOf" srcId="{F6A1BE6D-988B-42CE-B4FD-1B3DD8C2ED49}" destId="{80F15F78-D69F-4279-B659-0ECC2B64B76F}" srcOrd="0" destOrd="0" presId="urn:microsoft.com/office/officeart/2005/8/layout/orgChart1"/>
-    <dgm:cxn modelId="{1C70AA7E-2DAE-455A-92BA-D4AB52DE1997}" type="presOf" srcId="{DD3283EC-7B56-4E61-921C-D290C920DD05}" destId="{A1828263-2C56-4B62-A0B6-DD28C54F2DC0}" srcOrd="0" destOrd="0" presId="urn:microsoft.com/office/officeart/2005/8/layout/orgChart1"/>
-    <dgm:cxn modelId="{6D32A989-3C59-45AF-BC87-C8F6715E0459}" type="presOf" srcId="{BD050040-9319-48AF-BD5E-C0B572FE5764}" destId="{5F77070C-5332-4A79-9A25-3C444826BEA5}" srcOrd="0" destOrd="0" presId="urn:microsoft.com/office/officeart/2005/8/layout/orgChart1"/>
-    <dgm:cxn modelId="{ACDAD095-D4F6-4BDC-8280-2661101EC28C}" srcId="{7FC3FF27-545F-40A3-BF84-534BA90F44BF}" destId="{774A845F-2245-4F87-927F-70147ABC5EC5}" srcOrd="1" destOrd="0" parTransId="{4E0D05F0-62FF-484E-9DB0-82EA631C7E03}" sibTransId="{9D998949-E6BF-4C63-8A29-C476755070A2}"/>
-    <dgm:cxn modelId="{8D7F209B-4306-4E79-BAC7-1F13C5B94A23}" type="presOf" srcId="{F207DC52-B3F8-452E-8F63-75052EB45BA4}" destId="{51E29D2B-11A0-4E33-8E16-E5140292B1F0}" srcOrd="0" destOrd="0" presId="urn:microsoft.com/office/officeart/2005/8/layout/orgChart1"/>
-    <dgm:cxn modelId="{9D5BEAB9-45DA-472E-BD7A-1AFE71DE3438}" type="presOf" srcId="{18B785C8-BB2C-4260-BCA3-5917D60DD55C}" destId="{918958A4-FCC6-4D7A-BB25-33CED2C53A6B}" srcOrd="1" destOrd="0" presId="urn:microsoft.com/office/officeart/2005/8/layout/orgChart1"/>
-    <dgm:cxn modelId="{93965FCD-FAE4-4869-BC4F-87D645ABFBFC}" type="presOf" srcId="{18B785C8-BB2C-4260-BCA3-5917D60DD55C}" destId="{18D33703-4048-4A9B-8BC9-1AB69E7A468E}" srcOrd="0" destOrd="0" presId="urn:microsoft.com/office/officeart/2005/8/layout/orgChart1"/>
-    <dgm:cxn modelId="{EDFAECCD-374C-4548-89F3-6B5F5DE910E7}" type="presOf" srcId="{CC7DDDC8-7A57-4B4D-A8B0-49F5A1EBEB10}" destId="{469C023A-2C9B-4A78-B3D0-D7B7E7D6425E}" srcOrd="1" destOrd="0" presId="urn:microsoft.com/office/officeart/2005/8/layout/orgChart1"/>
-    <dgm:cxn modelId="{E98323D8-7DCB-458E-ADAA-D5C2E8EACA3E}" type="presOf" srcId="{4BA44C64-34B3-430F-B487-5BE0AB069182}" destId="{FEB6DF48-1BDD-4B9B-A622-CBA2CAF2F8E4}" srcOrd="0" destOrd="0" presId="urn:microsoft.com/office/officeart/2005/8/layout/orgChart1"/>
-    <dgm:cxn modelId="{F8D94FE0-AB2E-499B-8F38-FBD92CEE4AD5}" type="presOf" srcId="{774A845F-2245-4F87-927F-70147ABC5EC5}" destId="{F2DCCE3C-1AF8-418F-ADC2-D45FCB9115B9}" srcOrd="1" destOrd="0" presId="urn:microsoft.com/office/officeart/2005/8/layout/orgChart1"/>
-    <dgm:cxn modelId="{0EB036E7-ACEC-47BD-B933-1F83B222B4D8}" type="presOf" srcId="{4E0D05F0-62FF-484E-9DB0-82EA631C7E03}" destId="{0343D3CF-FF9E-42CF-8590-E33780EB2C7E}" srcOrd="0" destOrd="0" presId="urn:microsoft.com/office/officeart/2005/8/layout/orgChart1"/>
-    <dgm:cxn modelId="{2A7602ED-FC11-47B1-94F2-DA6424CADBF9}" type="presOf" srcId="{7FC3FF27-545F-40A3-BF84-534BA90F44BF}" destId="{22A4D8AC-C130-466A-AC84-CC750F249BFF}" srcOrd="0" destOrd="0" presId="urn:microsoft.com/office/officeart/2005/8/layout/orgChart1"/>
-    <dgm:cxn modelId="{18A8F2FB-7CE4-4423-9E7A-F4573D341E1F}" srcId="{A5099243-3FC2-4824-BB91-AA6561350FCF}" destId="{7FC3FF27-545F-40A3-BF84-534BA90F44BF}" srcOrd="0" destOrd="0" parTransId="{9E8E7794-3A79-47F7-9907-DF39E5ACE20B}" sibTransId="{D7EDD94D-B8BE-43D4-9D5A-F99530AFE251}"/>
     <dgm:cxn modelId="{F4E1EE17-9C45-4836-87B4-C21A15C25B30}" type="presParOf" srcId="{2E1C3897-205B-4BBF-91BA-D671840DBB7E}" destId="{FDB2537E-B13B-459E-85A6-60EBF09B16D8}" srcOrd="0" destOrd="0" presId="urn:microsoft.com/office/officeart/2005/8/layout/orgChart1"/>
     <dgm:cxn modelId="{0DA1058B-44F1-4B86-A19D-37C4A472D5C8}" type="presParOf" srcId="{FDB2537E-B13B-459E-85A6-60EBF09B16D8}" destId="{8F508FA6-9E2D-4BF1-932C-24673D7A4996}" srcOrd="0" destOrd="0" presId="urn:microsoft.com/office/officeart/2005/8/layout/orgChart1"/>
     <dgm:cxn modelId="{D8D468D3-1335-453E-9F51-546FA7D053AD}" type="presParOf" srcId="{8F508FA6-9E2D-4BF1-932C-24673D7A4996}" destId="{22A4D8AC-C130-466A-AC84-CC750F249BFF}" srcOrd="0" destOrd="0" presId="urn:microsoft.com/office/officeart/2005/8/layout/orgChart1"/>
@@ -8478,6 +8747,13 @@
         </dgm:presLayoutVars>
       </dgm:prSet>
       <dgm:spPr/>
+      <dgm:t>
+        <a:bodyPr/>
+        <a:lstStyle/>
+        <a:p>
+          <a:endParaRPr lang="hu-HU"/>
+        </a:p>
+      </dgm:t>
     </dgm:pt>
     <dgm:pt modelId="{F65BEAA2-FAE4-4085-8CDD-A212319A6E49}" type="pres">
       <dgm:prSet presAssocID="{4B34A85A-9764-4449-93CA-2AC3F02899B7}" presName="hierRoot1" presStyleCnt="0">
@@ -8498,10 +8774,24 @@
         </dgm:presLayoutVars>
       </dgm:prSet>
       <dgm:spPr/>
+      <dgm:t>
+        <a:bodyPr/>
+        <a:lstStyle/>
+        <a:p>
+          <a:endParaRPr lang="hu-HU"/>
+        </a:p>
+      </dgm:t>
     </dgm:pt>
     <dgm:pt modelId="{01BF291C-125A-4EE6-8980-C9A7B3695970}" type="pres">
       <dgm:prSet presAssocID="{4B34A85A-9764-4449-93CA-2AC3F02899B7}" presName="rootConnector1" presStyleLbl="node1" presStyleIdx="0" presStyleCnt="0"/>
       <dgm:spPr/>
+      <dgm:t>
+        <a:bodyPr/>
+        <a:lstStyle/>
+        <a:p>
+          <a:endParaRPr lang="hu-HU"/>
+        </a:p>
+      </dgm:t>
     </dgm:pt>
     <dgm:pt modelId="{71A72706-7109-4099-A780-86B19EA71BC6}" type="pres">
       <dgm:prSet presAssocID="{4B34A85A-9764-4449-93CA-2AC3F02899B7}" presName="hierChild2" presStyleCnt="0"/>
@@ -8530,10 +8820,24 @@
         </dgm:presLayoutVars>
       </dgm:prSet>
       <dgm:spPr/>
+      <dgm:t>
+        <a:bodyPr/>
+        <a:lstStyle/>
+        <a:p>
+          <a:endParaRPr lang="hu-HU"/>
+        </a:p>
+      </dgm:t>
     </dgm:pt>
     <dgm:pt modelId="{C105A49E-8C0D-4C52-92A7-4031E78046D6}" type="pres">
       <dgm:prSet presAssocID="{83CB087C-2B02-441F-8AF9-EA05FEBBD7B7}" presName="rootConnector1" presStyleLbl="node1" presStyleIdx="0" presStyleCnt="0"/>
       <dgm:spPr/>
+      <dgm:t>
+        <a:bodyPr/>
+        <a:lstStyle/>
+        <a:p>
+          <a:endParaRPr lang="hu-HU"/>
+        </a:p>
+      </dgm:t>
     </dgm:pt>
     <dgm:pt modelId="{9CA741CF-6321-48C6-AA14-1FB3E366D977}" type="pres">
       <dgm:prSet presAssocID="{83CB087C-2B02-441F-8AF9-EA05FEBBD7B7}" presName="hierChild2" presStyleCnt="0"/>
@@ -8542,6 +8846,13 @@
     <dgm:pt modelId="{0A5439EB-E8DD-40F4-BBB1-96CB23CE0ADC}" type="pres">
       <dgm:prSet presAssocID="{2E15DC35-4972-44B4-BDF8-EF7239CC94B4}" presName="Name37" presStyleLbl="parChTrans1D2" presStyleIdx="0" presStyleCnt="2"/>
       <dgm:spPr/>
+      <dgm:t>
+        <a:bodyPr/>
+        <a:lstStyle/>
+        <a:p>
+          <a:endParaRPr lang="hu-HU"/>
+        </a:p>
+      </dgm:t>
     </dgm:pt>
     <dgm:pt modelId="{A0F6F191-E293-4961-B58A-FF9876597666}" type="pres">
       <dgm:prSet presAssocID="{3A993B80-87FB-41B5-BA61-44B951864DB1}" presName="hierRoot2" presStyleCnt="0">
@@ -8562,10 +8873,24 @@
         </dgm:presLayoutVars>
       </dgm:prSet>
       <dgm:spPr/>
+      <dgm:t>
+        <a:bodyPr/>
+        <a:lstStyle/>
+        <a:p>
+          <a:endParaRPr lang="hu-HU"/>
+        </a:p>
+      </dgm:t>
     </dgm:pt>
     <dgm:pt modelId="{5AA32425-D026-4F71-AE97-45B63D4D5C8F}" type="pres">
       <dgm:prSet presAssocID="{3A993B80-87FB-41B5-BA61-44B951864DB1}" presName="rootConnector" presStyleLbl="node2" presStyleIdx="0" presStyleCnt="2"/>
       <dgm:spPr/>
+      <dgm:t>
+        <a:bodyPr/>
+        <a:lstStyle/>
+        <a:p>
+          <a:endParaRPr lang="hu-HU"/>
+        </a:p>
+      </dgm:t>
     </dgm:pt>
     <dgm:pt modelId="{5ED6C6DB-EFA7-4FCD-A50B-59F98AC5010F}" type="pres">
       <dgm:prSet presAssocID="{3A993B80-87FB-41B5-BA61-44B951864DB1}" presName="hierChild4" presStyleCnt="0"/>
@@ -8578,6 +8903,13 @@
     <dgm:pt modelId="{E87B3C42-F2B8-4189-B13D-E8B98E2550B1}" type="pres">
       <dgm:prSet presAssocID="{877FDA2A-A52C-480A-BC51-482B81ECD728}" presName="Name37" presStyleLbl="parChTrans1D2" presStyleIdx="1" presStyleCnt="2"/>
       <dgm:spPr/>
+      <dgm:t>
+        <a:bodyPr/>
+        <a:lstStyle/>
+        <a:p>
+          <a:endParaRPr lang="hu-HU"/>
+        </a:p>
+      </dgm:t>
     </dgm:pt>
     <dgm:pt modelId="{8E70D10D-07C3-4EE4-864F-803D892CF4DC}" type="pres">
       <dgm:prSet presAssocID="{A055491F-C8B2-4D77-A3BE-B8C758D6F6C9}" presName="hierRoot2" presStyleCnt="0">
@@ -8598,10 +8930,24 @@
         </dgm:presLayoutVars>
       </dgm:prSet>
       <dgm:spPr/>
+      <dgm:t>
+        <a:bodyPr/>
+        <a:lstStyle/>
+        <a:p>
+          <a:endParaRPr lang="hu-HU"/>
+        </a:p>
+      </dgm:t>
     </dgm:pt>
     <dgm:pt modelId="{5DBC7B22-EAD2-4BA3-9235-29A96DA2B717}" type="pres">
       <dgm:prSet presAssocID="{A055491F-C8B2-4D77-A3BE-B8C758D6F6C9}" presName="rootConnector" presStyleLbl="node2" presStyleIdx="1" presStyleCnt="2"/>
       <dgm:spPr/>
+      <dgm:t>
+        <a:bodyPr/>
+        <a:lstStyle/>
+        <a:p>
+          <a:endParaRPr lang="hu-HU"/>
+        </a:p>
+      </dgm:t>
     </dgm:pt>
     <dgm:pt modelId="{5774BF92-E0B2-4EE3-8B58-C511E00D577D}" type="pres">
       <dgm:prSet presAssocID="{A055491F-C8B2-4D77-A3BE-B8C758D6F6C9}" presName="hierChild4" presStyleCnt="0"/>
@@ -8617,21 +8963,21 @@
     </dgm:pt>
   </dgm:ptLst>
   <dgm:cxnLst>
+    <dgm:cxn modelId="{E3183D52-B2BF-43AA-AA57-33584F072E62}" type="presOf" srcId="{83CB087C-2B02-441F-8AF9-EA05FEBBD7B7}" destId="{C105A49E-8C0D-4C52-92A7-4031E78046D6}" srcOrd="1" destOrd="0" presId="urn:microsoft.com/office/officeart/2005/8/layout/orgChart1"/>
+    <dgm:cxn modelId="{9AF3C7B0-B9FD-448E-897D-1FC0AE24A598}" type="presOf" srcId="{A055491F-C8B2-4D77-A3BE-B8C758D6F6C9}" destId="{5DBC7B22-EAD2-4BA3-9235-29A96DA2B717}" srcOrd="1" destOrd="0" presId="urn:microsoft.com/office/officeart/2005/8/layout/orgChart1"/>
+    <dgm:cxn modelId="{6CF927AB-06EA-4C70-92CF-80086D051F34}" type="presOf" srcId="{A055491F-C8B2-4D77-A3BE-B8C758D6F6C9}" destId="{305ADB5F-FB0C-4042-8849-198DB338E7EB}" srcOrd="0" destOrd="0" presId="urn:microsoft.com/office/officeart/2005/8/layout/orgChart1"/>
     <dgm:cxn modelId="{1B2DBB23-D231-43ED-AA2B-6580B8343680}" srcId="{83CB087C-2B02-441F-8AF9-EA05FEBBD7B7}" destId="{3A993B80-87FB-41B5-BA61-44B951864DB1}" srcOrd="0" destOrd="0" parTransId="{2E15DC35-4972-44B4-BDF8-EF7239CC94B4}" sibTransId="{EA76815F-F31C-4360-8E61-5B7F9781FAE6}"/>
+    <dgm:cxn modelId="{77F6202D-BFC3-4FDB-AF45-77AE9C7BDB83}" type="presOf" srcId="{2E15DC35-4972-44B4-BDF8-EF7239CC94B4}" destId="{0A5439EB-E8DD-40F4-BBB1-96CB23CE0ADC}" srcOrd="0" destOrd="0" presId="urn:microsoft.com/office/officeart/2005/8/layout/orgChart1"/>
     <dgm:cxn modelId="{F637FA24-54CB-41B4-B608-21961BD70D8F}" type="presOf" srcId="{3A993B80-87FB-41B5-BA61-44B951864DB1}" destId="{E1B88E63-114D-4C39-9D1D-E737B7978F7D}" srcOrd="0" destOrd="0" presId="urn:microsoft.com/office/officeart/2005/8/layout/orgChart1"/>
+    <dgm:cxn modelId="{482591F8-1A8C-46A8-80B1-26BBEA8C3CC4}" srcId="{83CB087C-2B02-441F-8AF9-EA05FEBBD7B7}" destId="{A055491F-C8B2-4D77-A3BE-B8C758D6F6C9}" srcOrd="1" destOrd="0" parTransId="{877FDA2A-A52C-480A-BC51-482B81ECD728}" sibTransId="{60346700-7FC6-424A-B6D4-26045B79EA4D}"/>
+    <dgm:cxn modelId="{7BF26B7F-AC85-4222-BE72-436BF53B68BA}" type="presOf" srcId="{4B34A85A-9764-4449-93CA-2AC3F02899B7}" destId="{01BF291C-125A-4EE6-8980-C9A7B3695970}" srcOrd="1" destOrd="0" presId="urn:microsoft.com/office/officeart/2005/8/layout/orgChart1"/>
+    <dgm:cxn modelId="{24BE48B4-F8B5-4CEF-A14E-DEA4E7F67B32}" type="presOf" srcId="{83CB087C-2B02-441F-8AF9-EA05FEBBD7B7}" destId="{0A6AF965-34E9-42F1-A9B1-686CE25FAB78}" srcOrd="0" destOrd="0" presId="urn:microsoft.com/office/officeart/2005/8/layout/orgChart1"/>
     <dgm:cxn modelId="{D2E90325-0112-4C38-A37C-8F738A2436A1}" srcId="{2FD81B69-27DE-455D-8FC7-C423BCD2D03B}" destId="{83CB087C-2B02-441F-8AF9-EA05FEBBD7B7}" srcOrd="1" destOrd="0" parTransId="{340AE612-70D7-48AB-8FEF-174621863906}" sibTransId="{AD8087DC-B225-4B1A-998F-FFA4EE87A06C}"/>
-    <dgm:cxn modelId="{77F6202D-BFC3-4FDB-AF45-77AE9C7BDB83}" type="presOf" srcId="{2E15DC35-4972-44B4-BDF8-EF7239CC94B4}" destId="{0A5439EB-E8DD-40F4-BBB1-96CB23CE0ADC}" srcOrd="0" destOrd="0" presId="urn:microsoft.com/office/officeart/2005/8/layout/orgChart1"/>
+    <dgm:cxn modelId="{623B5F82-8894-40F3-9662-3EF26C272D96}" type="presOf" srcId="{4B34A85A-9764-4449-93CA-2AC3F02899B7}" destId="{CC5BA98B-5EC1-4789-A54E-C335F6B6D265}" srcOrd="0" destOrd="0" presId="urn:microsoft.com/office/officeart/2005/8/layout/orgChart1"/>
+    <dgm:cxn modelId="{EE1F2344-871C-4512-B11F-9CAB7C5BF9C8}" type="presOf" srcId="{877FDA2A-A52C-480A-BC51-482B81ECD728}" destId="{E87B3C42-F2B8-4189-B13D-E8B98E2550B1}" srcOrd="0" destOrd="0" presId="urn:microsoft.com/office/officeart/2005/8/layout/orgChart1"/>
     <dgm:cxn modelId="{F88A535B-481B-4CC7-97E2-15F872B25B3E}" type="presOf" srcId="{3A993B80-87FB-41B5-BA61-44B951864DB1}" destId="{5AA32425-D026-4F71-AE97-45B63D4D5C8F}" srcOrd="1" destOrd="0" presId="urn:microsoft.com/office/officeart/2005/8/layout/orgChart1"/>
-    <dgm:cxn modelId="{EE1F2344-871C-4512-B11F-9CAB7C5BF9C8}" type="presOf" srcId="{877FDA2A-A52C-480A-BC51-482B81ECD728}" destId="{E87B3C42-F2B8-4189-B13D-E8B98E2550B1}" srcOrd="0" destOrd="0" presId="urn:microsoft.com/office/officeart/2005/8/layout/orgChart1"/>
+    <dgm:cxn modelId="{6EDA1873-AD7A-4BC4-8671-C9595FD51535}" type="presOf" srcId="{2FD81B69-27DE-455D-8FC7-C423BCD2D03B}" destId="{F69644AB-A9A5-4076-9446-7FBEDCC0D615}" srcOrd="0" destOrd="0" presId="urn:microsoft.com/office/officeart/2005/8/layout/orgChart1"/>
     <dgm:cxn modelId="{14FC4165-F218-4D2A-8749-4BD0635B01FD}" srcId="{2FD81B69-27DE-455D-8FC7-C423BCD2D03B}" destId="{4B34A85A-9764-4449-93CA-2AC3F02899B7}" srcOrd="0" destOrd="0" parTransId="{B43A1854-D5F5-41DA-8969-D2503D78B4E9}" sibTransId="{2319BDA0-BB94-420F-BCA0-E7638218BA00}"/>
-    <dgm:cxn modelId="{E3183D52-B2BF-43AA-AA57-33584F072E62}" type="presOf" srcId="{83CB087C-2B02-441F-8AF9-EA05FEBBD7B7}" destId="{C105A49E-8C0D-4C52-92A7-4031E78046D6}" srcOrd="1" destOrd="0" presId="urn:microsoft.com/office/officeart/2005/8/layout/orgChart1"/>
-    <dgm:cxn modelId="{6EDA1873-AD7A-4BC4-8671-C9595FD51535}" type="presOf" srcId="{2FD81B69-27DE-455D-8FC7-C423BCD2D03B}" destId="{F69644AB-A9A5-4076-9446-7FBEDCC0D615}" srcOrd="0" destOrd="0" presId="urn:microsoft.com/office/officeart/2005/8/layout/orgChart1"/>
-    <dgm:cxn modelId="{7BF26B7F-AC85-4222-BE72-436BF53B68BA}" type="presOf" srcId="{4B34A85A-9764-4449-93CA-2AC3F02899B7}" destId="{01BF291C-125A-4EE6-8980-C9A7B3695970}" srcOrd="1" destOrd="0" presId="urn:microsoft.com/office/officeart/2005/8/layout/orgChart1"/>
-    <dgm:cxn modelId="{623B5F82-8894-40F3-9662-3EF26C272D96}" type="presOf" srcId="{4B34A85A-9764-4449-93CA-2AC3F02899B7}" destId="{CC5BA98B-5EC1-4789-A54E-C335F6B6D265}" srcOrd="0" destOrd="0" presId="urn:microsoft.com/office/officeart/2005/8/layout/orgChart1"/>
-    <dgm:cxn modelId="{6CF927AB-06EA-4C70-92CF-80086D051F34}" type="presOf" srcId="{A055491F-C8B2-4D77-A3BE-B8C758D6F6C9}" destId="{305ADB5F-FB0C-4042-8849-198DB338E7EB}" srcOrd="0" destOrd="0" presId="urn:microsoft.com/office/officeart/2005/8/layout/orgChart1"/>
-    <dgm:cxn modelId="{9AF3C7B0-B9FD-448E-897D-1FC0AE24A598}" type="presOf" srcId="{A055491F-C8B2-4D77-A3BE-B8C758D6F6C9}" destId="{5DBC7B22-EAD2-4BA3-9235-29A96DA2B717}" srcOrd="1" destOrd="0" presId="urn:microsoft.com/office/officeart/2005/8/layout/orgChart1"/>
-    <dgm:cxn modelId="{24BE48B4-F8B5-4CEF-A14E-DEA4E7F67B32}" type="presOf" srcId="{83CB087C-2B02-441F-8AF9-EA05FEBBD7B7}" destId="{0A6AF965-34E9-42F1-A9B1-686CE25FAB78}" srcOrd="0" destOrd="0" presId="urn:microsoft.com/office/officeart/2005/8/layout/orgChart1"/>
-    <dgm:cxn modelId="{482591F8-1A8C-46A8-80B1-26BBEA8C3CC4}" srcId="{83CB087C-2B02-441F-8AF9-EA05FEBBD7B7}" destId="{A055491F-C8B2-4D77-A3BE-B8C758D6F6C9}" srcOrd="1" destOrd="0" parTransId="{877FDA2A-A52C-480A-BC51-482B81ECD728}" sibTransId="{60346700-7FC6-424A-B6D4-26045B79EA4D}"/>
     <dgm:cxn modelId="{18101EA6-03C9-4CE3-A541-C32FBE78DCD0}" type="presParOf" srcId="{F69644AB-A9A5-4076-9446-7FBEDCC0D615}" destId="{F65BEAA2-FAE4-4085-8CDD-A212319A6E49}" srcOrd="0" destOrd="0" presId="urn:microsoft.com/office/officeart/2005/8/layout/orgChart1"/>
     <dgm:cxn modelId="{89956180-CA88-4DAE-9322-B645AF0C640D}" type="presParOf" srcId="{F65BEAA2-FAE4-4085-8CDD-A212319A6E49}" destId="{9450F9EA-8029-48F9-BFF7-A1D81E38A5D0}" srcOrd="0" destOrd="0" presId="urn:microsoft.com/office/officeart/2005/8/layout/orgChart1"/>
     <dgm:cxn modelId="{38EBA851-4359-496E-87C0-C00F2EB22CA2}" type="presParOf" srcId="{9450F9EA-8029-48F9-BFF7-A1D81E38A5D0}" destId="{CC5BA98B-5EC1-4789-A54E-C335F6B6D265}" srcOrd="0" destOrd="0" presId="urn:microsoft.com/office/officeart/2005/8/layout/orgChart1"/>
@@ -8728,6 +9074,13 @@
         </dgm:presLayoutVars>
       </dgm:prSet>
       <dgm:spPr/>
+      <dgm:t>
+        <a:bodyPr/>
+        <a:lstStyle/>
+        <a:p>
+          <a:endParaRPr lang="hu-HU"/>
+        </a:p>
+      </dgm:t>
     </dgm:pt>
     <dgm:pt modelId="{B160E52C-F1A7-4A61-A730-93FD9E4F1A23}" type="pres">
       <dgm:prSet presAssocID="{ED191446-E253-466F-9C84-D999F7723FF1}" presName="arrow" presStyleLbl="bgShp" presStyleIdx="0" presStyleCnt="1"/>
@@ -8744,12 +9097,19 @@
         </dgm:presLayoutVars>
       </dgm:prSet>
       <dgm:spPr/>
+      <dgm:t>
+        <a:bodyPr/>
+        <a:lstStyle/>
+        <a:p>
+          <a:endParaRPr lang="hu-HU"/>
+        </a:p>
+      </dgm:t>
     </dgm:pt>
   </dgm:ptLst>
   <dgm:cxnLst>
     <dgm:cxn modelId="{08EFF93C-C150-4BA9-B662-AF5987EDD4C2}" srcId="{ED191446-E253-466F-9C84-D999F7723FF1}" destId="{F8970F03-67CE-48F3-8D91-9870BCC27A62}" srcOrd="0" destOrd="0" parTransId="{79F5CCA3-AD18-47BC-AE2C-0491594E9830}" sibTransId="{749468E8-F9D6-4D53-8769-6CE95E5D3ECC}"/>
+    <dgm:cxn modelId="{6E8D14C5-01A2-4AB1-AEB6-A281CB2EB981}" type="presOf" srcId="{F8970F03-67CE-48F3-8D91-9870BCC27A62}" destId="{67AFCB89-4437-496F-BF6D-E4D0D083E3D3}" srcOrd="0" destOrd="0" presId="urn:microsoft.com/office/officeart/2005/8/layout/hProcess9"/>
     <dgm:cxn modelId="{FACA3879-F163-4347-A22E-6ECB2B5C8B5E}" type="presOf" srcId="{ED191446-E253-466F-9C84-D999F7723FF1}" destId="{98251D72-9340-4E03-AB01-FA6E1A1870EA}" srcOrd="0" destOrd="0" presId="urn:microsoft.com/office/officeart/2005/8/layout/hProcess9"/>
-    <dgm:cxn modelId="{6E8D14C5-01A2-4AB1-AEB6-A281CB2EB981}" type="presOf" srcId="{F8970F03-67CE-48F3-8D91-9870BCC27A62}" destId="{67AFCB89-4437-496F-BF6D-E4D0D083E3D3}" srcOrd="0" destOrd="0" presId="urn:microsoft.com/office/officeart/2005/8/layout/hProcess9"/>
     <dgm:cxn modelId="{759BD3E7-B43E-45F6-8FFE-34B349D52678}" type="presParOf" srcId="{98251D72-9340-4E03-AB01-FA6E1A1870EA}" destId="{B160E52C-F1A7-4A61-A730-93FD9E4F1A23}" srcOrd="0" destOrd="0" presId="urn:microsoft.com/office/officeart/2005/8/layout/hProcess9"/>
     <dgm:cxn modelId="{22A2814A-44B2-4C81-83E0-66D4A5129B89}" type="presParOf" srcId="{98251D72-9340-4E03-AB01-FA6E1A1870EA}" destId="{054A8762-CE2D-4504-8254-D283EF1C548C}" srcOrd="1" destOrd="0" presId="urn:microsoft.com/office/officeart/2005/8/layout/hProcess9"/>
     <dgm:cxn modelId="{1BC08924-C6BB-440C-95A9-5E8653DD65F7}" type="presParOf" srcId="{054A8762-CE2D-4504-8254-D283EF1C548C}" destId="{67AFCB89-4437-496F-BF6D-E4D0D083E3D3}" srcOrd="0" destOrd="0" presId="urn:microsoft.com/office/officeart/2005/8/layout/hProcess9"/>
@@ -8827,10 +9187,14 @@
         <a:bodyPr/>
         <a:lstStyle/>
         <a:p>
-          <a:pPr rtl="0"/>
+          <a:pPr algn="l" rtl="0"/>
           <a:r>
-            <a:rPr lang="hu-HU"/>
-            <a:t>lv2 API</a:t>
+            <a:rPr lang="hu-HU" dirty="0" smtClean="0"/>
+            <a:t>		lv2 </a:t>
+          </a:r>
+          <a:r>
+            <a:rPr lang="hu-HU" dirty="0"/>
+            <a:t>API</a:t>
           </a:r>
         </a:p>
       </dgm:t>
@@ -8866,15 +9230,15 @@
         <a:p>
           <a:pPr rtl="0"/>
           <a:r>
-            <a:rPr lang="hu-HU"/>
+            <a:rPr lang="hu-HU" dirty="0"/>
             <a:t>lv2d lekérdező gyökér alkalmazás / </a:t>
           </a:r>
           <a:r>
-            <a:rPr lang="hu-HU" err="1"/>
+            <a:rPr lang="hu-HU" dirty="0" err="1"/>
             <a:t>daemon</a:t>
           </a:r>
           <a:r>
-            <a:rPr lang="hu-HU"/>
+            <a:rPr lang="hu-HU" dirty="0"/>
             <a:t>.</a:t>
           </a:r>
         </a:p>
@@ -8911,7 +9275,7 @@
         <a:p>
           <a:pPr rtl="0"/>
           <a:r>
-            <a:rPr lang="hu-HU"/>
+            <a:rPr lang="hu-HU" dirty="0"/>
             <a:t>Lekérdező alprogramok</a:t>
           </a:r>
         </a:p>
@@ -8948,7 +9312,7 @@
         <a:p>
           <a:pPr rtl="0"/>
           <a:r>
-            <a:rPr lang="hu-HU"/>
+            <a:rPr lang="hu-HU" dirty="0"/>
             <a:t>lv2g GUI API</a:t>
           </a:r>
         </a:p>
@@ -8985,7 +9349,7 @@
         <a:p>
           <a:pPr rtl="0"/>
           <a:r>
-            <a:rPr lang="hu-HU"/>
+            <a:rPr lang="hu-HU" dirty="0"/>
             <a:t>lv2gui GUI</a:t>
           </a:r>
         </a:p>
@@ -9092,11 +9456,11 @@
         <a:p>
           <a:pPr rtl="0"/>
           <a:r>
-            <a:rPr lang="hu-HU" err="1"/>
+            <a:rPr lang="hu-HU" dirty="0" err="1"/>
             <a:t>Interpreter</a:t>
           </a:r>
           <a:r>
-            <a:rPr lang="hu-HU"/>
+            <a:rPr lang="hu-HU" dirty="0"/>
             <a:t> (CLI)</a:t>
           </a:r>
         </a:p>
@@ -9132,6 +9496,13 @@
         </dgm:presLayoutVars>
       </dgm:prSet>
       <dgm:spPr/>
+      <dgm:t>
+        <a:bodyPr/>
+        <a:lstStyle/>
+        <a:p>
+          <a:endParaRPr lang="hu-HU"/>
+        </a:p>
+      </dgm:t>
     </dgm:pt>
     <dgm:pt modelId="{B126D1BC-AB1B-472B-9C25-16C03E6A6418}" type="pres">
       <dgm:prSet presAssocID="{B8F5505B-8B1B-4243-9DC3-7332B0FA6B1D}" presName="node" presStyleLbl="node1" presStyleIdx="0" presStyleCnt="8" custScaleX="336981" custScaleY="32993" custLinFactNeighborX="-486" custLinFactNeighborY="-15319">
@@ -9140,110 +9511,166 @@
         </dgm:presLayoutVars>
       </dgm:prSet>
       <dgm:spPr/>
+      <dgm:t>
+        <a:bodyPr/>
+        <a:lstStyle/>
+        <a:p>
+          <a:endParaRPr lang="hu-HU"/>
+        </a:p>
+      </dgm:t>
     </dgm:pt>
     <dgm:pt modelId="{D1755F16-3529-4E8B-8A90-F7F058379951}" type="pres">
       <dgm:prSet presAssocID="{D8AD3245-70C9-40EA-A79B-5951E610E6C5}" presName="sibTrans" presStyleCnt="0"/>
       <dgm:spPr/>
     </dgm:pt>
     <dgm:pt modelId="{39F58DB6-7C30-40C0-A24D-711C7738D926}" type="pres">
-      <dgm:prSet presAssocID="{3DF321BB-C06D-49C3-BD3C-525472A9D435}" presName="node" presStyleLbl="node1" presStyleIdx="1" presStyleCnt="8" custScaleX="337537" custScaleY="31352" custLinFactNeighborX="-208" custLinFactNeighborY="-25898">
+      <dgm:prSet presAssocID="{3DF321BB-C06D-49C3-BD3C-525472A9D435}" presName="node" presStyleLbl="node1" presStyleIdx="1" presStyleCnt="8" custScaleX="337537" custScaleY="31352" custLinFactNeighborX="-1170" custLinFactNeighborY="-12005">
         <dgm:presLayoutVars>
           <dgm:bulletEnabled val="1"/>
         </dgm:presLayoutVars>
       </dgm:prSet>
       <dgm:spPr/>
+      <dgm:t>
+        <a:bodyPr/>
+        <a:lstStyle/>
+        <a:p>
+          <a:endParaRPr lang="hu-HU"/>
+        </a:p>
+      </dgm:t>
     </dgm:pt>
     <dgm:pt modelId="{F4EBD3B1-2B16-4DEE-B38D-AC30D0702B8A}" type="pres">
       <dgm:prSet presAssocID="{802D658C-7183-4363-9CD7-6A5A58EBA73C}" presName="sibTrans" presStyleCnt="0"/>
       <dgm:spPr/>
     </dgm:pt>
     <dgm:pt modelId="{FF5D3E38-4180-4A1B-82A6-2E303B6EC4F1}" type="pres">
-      <dgm:prSet presAssocID="{DEE65FBB-C6B9-4847-92D3-4A55086AA61F}" presName="node" presStyleLbl="node1" presStyleIdx="2" presStyleCnt="8" custScaleX="94917" custScaleY="59544" custLinFactNeighborX="-3193" custLinFactNeighborY="-33116">
+      <dgm:prSet presAssocID="{DEE65FBB-C6B9-4847-92D3-4A55086AA61F}" presName="node" presStyleLbl="node1" presStyleIdx="2" presStyleCnt="8" custScaleX="94917" custScaleY="59544" custLinFactNeighborX="-6078" custLinFactNeighborY="2151">
         <dgm:presLayoutVars>
           <dgm:bulletEnabled val="1"/>
         </dgm:presLayoutVars>
       </dgm:prSet>
       <dgm:spPr/>
+      <dgm:t>
+        <a:bodyPr/>
+        <a:lstStyle/>
+        <a:p>
+          <a:endParaRPr lang="hu-HU"/>
+        </a:p>
+      </dgm:t>
     </dgm:pt>
     <dgm:pt modelId="{4B3736CC-B6EE-482B-B1E0-DEC35533A99F}" type="pres">
       <dgm:prSet presAssocID="{03DC95C3-4E6A-42C2-969C-5A100762C14D}" presName="sibTrans" presStyleCnt="0"/>
       <dgm:spPr/>
     </dgm:pt>
     <dgm:pt modelId="{3549E376-78AF-42C3-A7CA-9A1AD236BCF9}" type="pres">
-      <dgm:prSet presAssocID="{7D657BA1-D249-450B-835D-A7CE43720783}" presName="node" presStyleLbl="node1" presStyleIdx="3" presStyleCnt="8" custScaleX="94917" custScaleY="58758" custLinFactX="-8094" custLinFactNeighborX="-100000" custLinFactNeighborY="37016">
+      <dgm:prSet presAssocID="{7D657BA1-D249-450B-835D-A7CE43720783}" presName="node" presStyleLbl="node1" presStyleIdx="3" presStyleCnt="8" custScaleX="94917" custScaleY="58758" custLinFactX="-10338" custLinFactNeighborX="-100000" custLinFactNeighborY="71215">
         <dgm:presLayoutVars>
           <dgm:bulletEnabled val="1"/>
         </dgm:presLayoutVars>
       </dgm:prSet>
       <dgm:spPr/>
+      <dgm:t>
+        <a:bodyPr/>
+        <a:lstStyle/>
+        <a:p>
+          <a:endParaRPr lang="hu-HU"/>
+        </a:p>
+      </dgm:t>
     </dgm:pt>
     <dgm:pt modelId="{08570418-8ECE-4AA4-998C-8E86CEC3EBB7}" type="pres">
       <dgm:prSet presAssocID="{C5235B82-08A0-4D8D-AF3A-953E5D979DB2}" presName="sibTrans" presStyleCnt="0"/>
       <dgm:spPr/>
     </dgm:pt>
     <dgm:pt modelId="{33086322-1E4F-4AB1-8999-BC204DF12542}" type="pres">
-      <dgm:prSet presAssocID="{DFCC976D-5CAA-4C25-BA1E-FFE54EBC6B3A}" presName="node" presStyleLbl="node1" presStyleIdx="4" presStyleCnt="8" custScaleX="94917" custScaleY="31639" custLinFactNeighborX="7051" custLinFactNeighborY="-48545">
+      <dgm:prSet presAssocID="{DFCC976D-5CAA-4C25-BA1E-FFE54EBC6B3A}" presName="node" presStyleLbl="node1" presStyleIdx="4" presStyleCnt="8" custScaleX="94917" custScaleY="31639" custLinFactNeighborX="7371" custLinFactNeighborY="-9537">
         <dgm:presLayoutVars>
           <dgm:bulletEnabled val="1"/>
         </dgm:presLayoutVars>
       </dgm:prSet>
       <dgm:spPr/>
+      <dgm:t>
+        <a:bodyPr/>
+        <a:lstStyle/>
+        <a:p>
+          <a:endParaRPr lang="hu-HU"/>
+        </a:p>
+      </dgm:t>
     </dgm:pt>
     <dgm:pt modelId="{C86DFA1B-79DA-4FC5-A3A1-AC6AA9107F6F}" type="pres">
       <dgm:prSet presAssocID="{2716F3CD-C7DC-40EB-95DA-7278819E4BD3}" presName="sibTrans" presStyleCnt="0"/>
       <dgm:spPr/>
     </dgm:pt>
     <dgm:pt modelId="{477BD5DF-D6E8-40CD-A937-91918C377058}" type="pres">
-      <dgm:prSet presAssocID="{51381443-17F1-4F73-B437-861B885031EE}" presName="node" presStyleLbl="node1" presStyleIdx="5" presStyleCnt="8" custScaleX="94917" custScaleY="31725" custLinFactX="100000" custLinFactNeighborX="119296" custLinFactNeighborY="-86247">
+      <dgm:prSet presAssocID="{51381443-17F1-4F73-B437-861B885031EE}" presName="node" presStyleLbl="node1" presStyleIdx="5" presStyleCnt="8" custScaleX="94917" custScaleY="31725" custLinFactX="64539" custLinFactNeighborX="100000" custLinFactNeighborY="-48843">
         <dgm:presLayoutVars>
           <dgm:bulletEnabled val="1"/>
         </dgm:presLayoutVars>
       </dgm:prSet>
       <dgm:spPr/>
+      <dgm:t>
+        <a:bodyPr/>
+        <a:lstStyle/>
+        <a:p>
+          <a:endParaRPr lang="hu-HU"/>
+        </a:p>
+      </dgm:t>
     </dgm:pt>
     <dgm:pt modelId="{AAA1A6D9-EB58-44DE-897B-00D64AEBCEF4}" type="pres">
       <dgm:prSet presAssocID="{2DB01569-E475-4D43-9976-9C8C0446A075}" presName="sibTrans" presStyleCnt="0"/>
       <dgm:spPr/>
     </dgm:pt>
     <dgm:pt modelId="{66B3E63F-CDA4-4EF4-90CF-F441A8E3BDDA}" type="pres">
-      <dgm:prSet presAssocID="{0101A2F2-01F5-4271-B460-EC64746F193F}" presName="node" presStyleLbl="node1" presStyleIdx="6" presStyleCnt="8" custScaleX="94917" custScaleY="68385" custLinFactNeighborX="-39471" custLinFactNeighborY="33143">
+      <dgm:prSet presAssocID="{0101A2F2-01F5-4271-B460-EC64746F193F}" presName="node" presStyleLbl="node1" presStyleIdx="6" presStyleCnt="8" custScaleX="94917" custScaleY="68385" custLinFactNeighborX="-48256" custLinFactNeighborY="21921">
         <dgm:presLayoutVars>
           <dgm:bulletEnabled val="1"/>
         </dgm:presLayoutVars>
       </dgm:prSet>
       <dgm:spPr/>
+      <dgm:t>
+        <a:bodyPr/>
+        <a:lstStyle/>
+        <a:p>
+          <a:endParaRPr lang="hu-HU"/>
+        </a:p>
+      </dgm:t>
     </dgm:pt>
     <dgm:pt modelId="{CB836353-B7C7-499E-B32E-444F81C54E91}" type="pres">
       <dgm:prSet presAssocID="{5A1E6CBF-6D8C-4786-86E4-3F246A3D0EC5}" presName="sibTrans" presStyleCnt="0"/>
       <dgm:spPr/>
     </dgm:pt>
     <dgm:pt modelId="{0CE6889F-9388-4F53-8B43-C5CB91720557}" type="pres">
-      <dgm:prSet presAssocID="{D3BE6404-7A9F-410C-8DF8-3CBAFB09DA24}" presName="node" presStyleLbl="node1" presStyleIdx="7" presStyleCnt="8" custScaleY="31639" custLinFactX="-2401" custLinFactY="-28733" custLinFactNeighborX="-100000" custLinFactNeighborY="-100000">
+      <dgm:prSet presAssocID="{D3BE6404-7A9F-410C-8DF8-3CBAFB09DA24}" presName="node" presStyleLbl="node1" presStyleIdx="7" presStyleCnt="8" custScaleX="130696" custScaleY="31639" custLinFactY="-100000" custLinFactNeighborX="-450" custLinFactNeighborY="-107818">
         <dgm:presLayoutVars>
           <dgm:bulletEnabled val="1"/>
         </dgm:presLayoutVars>
       </dgm:prSet>
       <dgm:spPr/>
+      <dgm:t>
+        <a:bodyPr/>
+        <a:lstStyle/>
+        <a:p>
+          <a:endParaRPr lang="hu-HU"/>
+        </a:p>
+      </dgm:t>
     </dgm:pt>
   </dgm:ptLst>
   <dgm:cxnLst>
+    <dgm:cxn modelId="{24C95A7A-F918-403E-8EE5-C4F85443775E}" type="presOf" srcId="{DEE65FBB-C6B9-4847-92D3-4A55086AA61F}" destId="{FF5D3E38-4180-4A1B-82A6-2E303B6EC4F1}" srcOrd="0" destOrd="0" presId="urn:microsoft.com/office/officeart/2005/8/layout/default"/>
+    <dgm:cxn modelId="{8569168F-D912-45F3-9669-DA306FE6A45B}" type="presOf" srcId="{DFCC976D-5CAA-4C25-BA1E-FFE54EBC6B3A}" destId="{33086322-1E4F-4AB1-8999-BC204DF12542}" srcOrd="0" destOrd="0" presId="urn:microsoft.com/office/officeart/2005/8/layout/default"/>
+    <dgm:cxn modelId="{AC5843CF-8D22-4530-A8B7-E0665204F388}" srcId="{B88EDFC0-8093-4031-BB44-A0C05C4D563C}" destId="{51381443-17F1-4F73-B437-861B885031EE}" srcOrd="5" destOrd="0" parTransId="{654DA488-5B32-4628-86E8-D74AB2478FAF}" sibTransId="{2DB01569-E475-4D43-9976-9C8C0446A075}"/>
+    <dgm:cxn modelId="{70522D39-3838-4942-AA18-ECF0FC17F887}" srcId="{B88EDFC0-8093-4031-BB44-A0C05C4D563C}" destId="{DFCC976D-5CAA-4C25-BA1E-FFE54EBC6B3A}" srcOrd="4" destOrd="0" parTransId="{2F43C66B-4CAA-478F-927C-5AD3ED3DC2FD}" sibTransId="{2716F3CD-C7DC-40EB-95DA-7278819E4BD3}"/>
+    <dgm:cxn modelId="{F5E87CF6-5146-4745-BACD-EB6E568795FE}" srcId="{B88EDFC0-8093-4031-BB44-A0C05C4D563C}" destId="{7D657BA1-D249-450B-835D-A7CE43720783}" srcOrd="3" destOrd="0" parTransId="{B8AE10BD-BCF3-4845-8DF8-9C4582CF32CD}" sibTransId="{C5235B82-08A0-4D8D-AF3A-953E5D979DB2}"/>
     <dgm:cxn modelId="{C18AB636-21C1-4FB4-81D4-C90E01B0CCC7}" type="presOf" srcId="{B88EDFC0-8093-4031-BB44-A0C05C4D563C}" destId="{4FB2E487-1CA9-4A72-BC2F-A18A4EBD7EBB}" srcOrd="0" destOrd="0" presId="urn:microsoft.com/office/officeart/2005/8/layout/default"/>
-    <dgm:cxn modelId="{70522D39-3838-4942-AA18-ECF0FC17F887}" srcId="{B88EDFC0-8093-4031-BB44-A0C05C4D563C}" destId="{DFCC976D-5CAA-4C25-BA1E-FFE54EBC6B3A}" srcOrd="4" destOrd="0" parTransId="{2F43C66B-4CAA-478F-927C-5AD3ED3DC2FD}" sibTransId="{2716F3CD-C7DC-40EB-95DA-7278819E4BD3}"/>
+    <dgm:cxn modelId="{97A81A6A-A317-44CD-B0F0-4027B74DA559}" type="presOf" srcId="{D3BE6404-7A9F-410C-8DF8-3CBAFB09DA24}" destId="{0CE6889F-9388-4F53-8B43-C5CB91720557}" srcOrd="0" destOrd="0" presId="urn:microsoft.com/office/officeart/2005/8/layout/default"/>
     <dgm:cxn modelId="{3DC12064-9BD7-467F-8C89-941DE7D7D8DE}" type="presOf" srcId="{51381443-17F1-4F73-B437-861B885031EE}" destId="{477BD5DF-D6E8-40CD-A937-91918C377058}" srcOrd="0" destOrd="0" presId="urn:microsoft.com/office/officeart/2005/8/layout/default"/>
+    <dgm:cxn modelId="{3237C0F9-D027-44FF-B3C5-4FF7E2A4CE21}" srcId="{B88EDFC0-8093-4031-BB44-A0C05C4D563C}" destId="{3DF321BB-C06D-49C3-BD3C-525472A9D435}" srcOrd="1" destOrd="0" parTransId="{A1EF16D6-C546-4CE4-8FC9-5EFFEF25B000}" sibTransId="{802D658C-7183-4363-9CD7-6A5A58EBA73C}"/>
+    <dgm:cxn modelId="{E5F1F47F-FAAD-4A16-8671-2697C5449812}" srcId="{B88EDFC0-8093-4031-BB44-A0C05C4D563C}" destId="{DEE65FBB-C6B9-4847-92D3-4A55086AA61F}" srcOrd="2" destOrd="0" parTransId="{F606610E-46B0-476E-B328-0E13FD11CCD9}" sibTransId="{03DC95C3-4E6A-42C2-969C-5A100762C14D}"/>
+    <dgm:cxn modelId="{7631D3EE-9079-41C7-B063-ECFECE164199}" type="presOf" srcId="{3DF321BB-C06D-49C3-BD3C-525472A9D435}" destId="{39F58DB6-7C30-40C0-A24D-711C7738D926}" srcOrd="0" destOrd="0" presId="urn:microsoft.com/office/officeart/2005/8/layout/default"/>
+    <dgm:cxn modelId="{914EC5AB-E1EA-4291-A4A0-842248B362E9}" type="presOf" srcId="{0101A2F2-01F5-4271-B460-EC64746F193F}" destId="{66B3E63F-CDA4-4EF4-90CF-F441A8E3BDDA}" srcOrd="0" destOrd="0" presId="urn:microsoft.com/office/officeart/2005/8/layout/default"/>
+    <dgm:cxn modelId="{E3763481-406E-483A-AFAB-1365DFEA2355}" type="presOf" srcId="{7D657BA1-D249-450B-835D-A7CE43720783}" destId="{3549E376-78AF-42C3-A7CA-9A1AD236BCF9}" srcOrd="0" destOrd="0" presId="urn:microsoft.com/office/officeart/2005/8/layout/default"/>
+    <dgm:cxn modelId="{DD05F0F6-2845-415F-94F4-EF4B1F5119B4}" srcId="{B88EDFC0-8093-4031-BB44-A0C05C4D563C}" destId="{D3BE6404-7A9F-410C-8DF8-3CBAFB09DA24}" srcOrd="7" destOrd="0" parTransId="{F00612B5-EEB0-4B35-8313-2FF8E28D6D93}" sibTransId="{DBBBE49D-4719-4894-A408-C225CD25958C}"/>
     <dgm:cxn modelId="{73F8BF68-2187-4077-9EC7-41155F8C9B23}" srcId="{B88EDFC0-8093-4031-BB44-A0C05C4D563C}" destId="{0101A2F2-01F5-4271-B460-EC64746F193F}" srcOrd="6" destOrd="0" parTransId="{7A1C1ADE-1841-4FFB-BE50-D516F4277302}" sibTransId="{5A1E6CBF-6D8C-4786-86E4-3F246A3D0EC5}"/>
-    <dgm:cxn modelId="{97A81A6A-A317-44CD-B0F0-4027B74DA559}" type="presOf" srcId="{D3BE6404-7A9F-410C-8DF8-3CBAFB09DA24}" destId="{0CE6889F-9388-4F53-8B43-C5CB91720557}" srcOrd="0" destOrd="0" presId="urn:microsoft.com/office/officeart/2005/8/layout/default"/>
     <dgm:cxn modelId="{48075A5A-3CF2-41D8-8D5F-CA0A988C2A73}" type="presOf" srcId="{B8F5505B-8B1B-4243-9DC3-7332B0FA6B1D}" destId="{B126D1BC-AB1B-472B-9C25-16C03E6A6418}" srcOrd="0" destOrd="0" presId="urn:microsoft.com/office/officeart/2005/8/layout/default"/>
-    <dgm:cxn modelId="{24C95A7A-F918-403E-8EE5-C4F85443775E}" type="presOf" srcId="{DEE65FBB-C6B9-4847-92D3-4A55086AA61F}" destId="{FF5D3E38-4180-4A1B-82A6-2E303B6EC4F1}" srcOrd="0" destOrd="0" presId="urn:microsoft.com/office/officeart/2005/8/layout/default"/>
-    <dgm:cxn modelId="{E5F1F47F-FAAD-4A16-8671-2697C5449812}" srcId="{B88EDFC0-8093-4031-BB44-A0C05C4D563C}" destId="{DEE65FBB-C6B9-4847-92D3-4A55086AA61F}" srcOrd="2" destOrd="0" parTransId="{F606610E-46B0-476E-B328-0E13FD11CCD9}" sibTransId="{03DC95C3-4E6A-42C2-969C-5A100762C14D}"/>
-    <dgm:cxn modelId="{E3763481-406E-483A-AFAB-1365DFEA2355}" type="presOf" srcId="{7D657BA1-D249-450B-835D-A7CE43720783}" destId="{3549E376-78AF-42C3-A7CA-9A1AD236BCF9}" srcOrd="0" destOrd="0" presId="urn:microsoft.com/office/officeart/2005/8/layout/default"/>
-    <dgm:cxn modelId="{8569168F-D912-45F3-9669-DA306FE6A45B}" type="presOf" srcId="{DFCC976D-5CAA-4C25-BA1E-FFE54EBC6B3A}" destId="{33086322-1E4F-4AB1-8999-BC204DF12542}" srcOrd="0" destOrd="0" presId="urn:microsoft.com/office/officeart/2005/8/layout/default"/>
-    <dgm:cxn modelId="{914EC5AB-E1EA-4291-A4A0-842248B362E9}" type="presOf" srcId="{0101A2F2-01F5-4271-B460-EC64746F193F}" destId="{66B3E63F-CDA4-4EF4-90CF-F441A8E3BDDA}" srcOrd="0" destOrd="0" presId="urn:microsoft.com/office/officeart/2005/8/layout/default"/>
-    <dgm:cxn modelId="{AC5843CF-8D22-4530-A8B7-E0665204F388}" srcId="{B88EDFC0-8093-4031-BB44-A0C05C4D563C}" destId="{51381443-17F1-4F73-B437-861B885031EE}" srcOrd="5" destOrd="0" parTransId="{654DA488-5B32-4628-86E8-D74AB2478FAF}" sibTransId="{2DB01569-E475-4D43-9976-9C8C0446A075}"/>
     <dgm:cxn modelId="{FBBAE5D6-8A51-437A-BF1E-1D8B15AC04B9}" srcId="{B88EDFC0-8093-4031-BB44-A0C05C4D563C}" destId="{B8F5505B-8B1B-4243-9DC3-7332B0FA6B1D}" srcOrd="0" destOrd="0" parTransId="{E9405FBC-2A2A-4910-AF2E-0C7351558A42}" sibTransId="{D8AD3245-70C9-40EA-A79B-5951E610E6C5}"/>
-    <dgm:cxn modelId="{7631D3EE-9079-41C7-B063-ECFECE164199}" type="presOf" srcId="{3DF321BB-C06D-49C3-BD3C-525472A9D435}" destId="{39F58DB6-7C30-40C0-A24D-711C7738D926}" srcOrd="0" destOrd="0" presId="urn:microsoft.com/office/officeart/2005/8/layout/default"/>
-    <dgm:cxn modelId="{F5E87CF6-5146-4745-BACD-EB6E568795FE}" srcId="{B88EDFC0-8093-4031-BB44-A0C05C4D563C}" destId="{7D657BA1-D249-450B-835D-A7CE43720783}" srcOrd="3" destOrd="0" parTransId="{B8AE10BD-BCF3-4845-8DF8-9C4582CF32CD}" sibTransId="{C5235B82-08A0-4D8D-AF3A-953E5D979DB2}"/>
-    <dgm:cxn modelId="{DD05F0F6-2845-415F-94F4-EF4B1F5119B4}" srcId="{B88EDFC0-8093-4031-BB44-A0C05C4D563C}" destId="{D3BE6404-7A9F-410C-8DF8-3CBAFB09DA24}" srcOrd="7" destOrd="0" parTransId="{F00612B5-EEB0-4B35-8313-2FF8E28D6D93}" sibTransId="{DBBBE49D-4719-4894-A408-C225CD25958C}"/>
-    <dgm:cxn modelId="{3237C0F9-D027-44FF-B3C5-4FF7E2A4CE21}" srcId="{B88EDFC0-8093-4031-BB44-A0C05C4D563C}" destId="{3DF321BB-C06D-49C3-BD3C-525472A9D435}" srcOrd="1" destOrd="0" parTransId="{A1EF16D6-C546-4CE4-8FC9-5EFFEF25B000}" sibTransId="{802D658C-7183-4363-9CD7-6A5A58EBA73C}"/>
     <dgm:cxn modelId="{1492A2AF-54F0-46CA-9953-BA27CB2C1CA6}" type="presParOf" srcId="{4FB2E487-1CA9-4A72-BC2F-A18A4EBD7EBB}" destId="{B126D1BC-AB1B-472B-9C25-16C03E6A6418}" srcOrd="0" destOrd="0" presId="urn:microsoft.com/office/officeart/2005/8/layout/default"/>
     <dgm:cxn modelId="{0816B250-A109-4672-B990-C099B3D99668}" type="presParOf" srcId="{4FB2E487-1CA9-4A72-BC2F-A18A4EBD7EBB}" destId="{D1755F16-3529-4E8B-8A90-F7F058379951}" srcOrd="1" destOrd="0" presId="urn:microsoft.com/office/officeart/2005/8/layout/default"/>
     <dgm:cxn modelId="{56767D54-AB22-42B7-B605-9E6333FA1311}" type="presParOf" srcId="{4FB2E487-1CA9-4A72-BC2F-A18A4EBD7EBB}" destId="{39F58DB6-7C30-40C0-A24D-711C7738D926}" srcOrd="2" destOrd="0" presId="urn:microsoft.com/office/officeart/2005/8/layout/default"/>
@@ -9448,6 +9875,13 @@
         </dgm:presLayoutVars>
       </dgm:prSet>
       <dgm:spPr/>
+      <dgm:t>
+        <a:bodyPr/>
+        <a:lstStyle/>
+        <a:p>
+          <a:endParaRPr lang="hu-HU"/>
+        </a:p>
+      </dgm:t>
     </dgm:pt>
     <dgm:pt modelId="{0D972EB1-AEA3-483B-A6C8-E335A793BB96}" type="pres">
       <dgm:prSet presAssocID="{DF3B006B-53BE-41C8-9A24-E74660C5E91E}" presName="parentText" presStyleLbl="node1" presStyleIdx="0" presStyleCnt="4" custLinFactY="-16704" custLinFactNeighborY="-100000">
@@ -9457,6 +9891,13 @@
         </dgm:presLayoutVars>
       </dgm:prSet>
       <dgm:spPr/>
+      <dgm:t>
+        <a:bodyPr/>
+        <a:lstStyle/>
+        <a:p>
+          <a:endParaRPr lang="hu-HU"/>
+        </a:p>
+      </dgm:t>
     </dgm:pt>
     <dgm:pt modelId="{E977AB78-66FD-4531-A580-C11626DDA3C7}" type="pres">
       <dgm:prSet presAssocID="{3EB25D0C-350B-48A8-B53C-2877BC56D2D2}" presName="spacer" presStyleCnt="0"/>
@@ -9470,6 +9911,13 @@
         </dgm:presLayoutVars>
       </dgm:prSet>
       <dgm:spPr/>
+      <dgm:t>
+        <a:bodyPr/>
+        <a:lstStyle/>
+        <a:p>
+          <a:endParaRPr lang="hu-HU"/>
+        </a:p>
+      </dgm:t>
     </dgm:pt>
     <dgm:pt modelId="{FAE4BA36-7325-4378-9F47-34E4B84CA5DB}" type="pres">
       <dgm:prSet presAssocID="{E509A821-C929-45C4-B0B6-92E1F9705D1A}" presName="spacer" presStyleCnt="0"/>
@@ -9483,6 +9931,13 @@
         </dgm:presLayoutVars>
       </dgm:prSet>
       <dgm:spPr/>
+      <dgm:t>
+        <a:bodyPr/>
+        <a:lstStyle/>
+        <a:p>
+          <a:endParaRPr lang="hu-HU"/>
+        </a:p>
+      </dgm:t>
     </dgm:pt>
     <dgm:pt modelId="{9F1E4CFE-B836-4285-BA93-E5967B569F64}" type="pres">
       <dgm:prSet presAssocID="{DE683FBC-3624-4817-8598-31EFD6D31655}" presName="spacer" presStyleCnt="0"/>
@@ -9496,18 +9951,25 @@
         </dgm:presLayoutVars>
       </dgm:prSet>
       <dgm:spPr/>
+      <dgm:t>
+        <a:bodyPr/>
+        <a:lstStyle/>
+        <a:p>
+          <a:endParaRPr lang="hu-HU"/>
+        </a:p>
+      </dgm:t>
     </dgm:pt>
   </dgm:ptLst>
   <dgm:cxnLst>
+    <dgm:cxn modelId="{47BA521F-7ED4-4CC3-B755-A0F207110414}" type="presOf" srcId="{395D8231-56B3-497A-BB3C-8755D9CE7632}" destId="{F699706B-6E0C-4F28-BFF1-6AF2C46FDFFF}" srcOrd="0" destOrd="0" presId="urn:microsoft.com/office/officeart/2005/8/layout/vList2"/>
+    <dgm:cxn modelId="{441D957D-E9CD-4E8D-B4D3-77783691CA1D}" type="presOf" srcId="{DF3B006B-53BE-41C8-9A24-E74660C5E91E}" destId="{0D972EB1-AEA3-483B-A6C8-E335A793BB96}" srcOrd="0" destOrd="0" presId="urn:microsoft.com/office/officeart/2005/8/layout/vList2"/>
+    <dgm:cxn modelId="{B8E73F1F-1AE6-4277-9DB1-CD7188B8819E}" type="presOf" srcId="{DC935A6B-42CC-4C3A-98C6-F69C4A53A127}" destId="{FC094A2A-CA25-43CB-B395-F11557DEE0EC}" srcOrd="0" destOrd="0" presId="urn:microsoft.com/office/officeart/2005/8/layout/vList2"/>
     <dgm:cxn modelId="{F4541119-775E-4DCF-9AB8-A15B5335E55F}" srcId="{395D8231-56B3-497A-BB3C-8755D9CE7632}" destId="{792A4CBA-8FD8-4801-A402-8A39400887A1}" srcOrd="1" destOrd="0" parTransId="{D396FE7B-BEC2-44C4-A4CD-E00310EFBDDE}" sibTransId="{E509A821-C929-45C4-B0B6-92E1F9705D1A}"/>
-    <dgm:cxn modelId="{B8E73F1F-1AE6-4277-9DB1-CD7188B8819E}" type="presOf" srcId="{DC935A6B-42CC-4C3A-98C6-F69C4A53A127}" destId="{FC094A2A-CA25-43CB-B395-F11557DEE0EC}" srcOrd="0" destOrd="0" presId="urn:microsoft.com/office/officeart/2005/8/layout/vList2"/>
-    <dgm:cxn modelId="{47BA521F-7ED4-4CC3-B755-A0F207110414}" type="presOf" srcId="{395D8231-56B3-497A-BB3C-8755D9CE7632}" destId="{F699706B-6E0C-4F28-BFF1-6AF2C46FDFFF}" srcOrd="0" destOrd="0" presId="urn:microsoft.com/office/officeart/2005/8/layout/vList2"/>
-    <dgm:cxn modelId="{EBEF5135-3885-456C-B2E0-BFADAB70C45B}" srcId="{395D8231-56B3-497A-BB3C-8755D9CE7632}" destId="{DF3B006B-53BE-41C8-9A24-E74660C5E91E}" srcOrd="0" destOrd="0" parTransId="{ECC07BB8-416F-430A-BB91-622B73549A1A}" sibTransId="{3EB25D0C-350B-48A8-B53C-2877BC56D2D2}"/>
-    <dgm:cxn modelId="{441D957D-E9CD-4E8D-B4D3-77783691CA1D}" type="presOf" srcId="{DF3B006B-53BE-41C8-9A24-E74660C5E91E}" destId="{0D972EB1-AEA3-483B-A6C8-E335A793BB96}" srcOrd="0" destOrd="0" presId="urn:microsoft.com/office/officeart/2005/8/layout/vList2"/>
+    <dgm:cxn modelId="{FC11F6E9-47ED-4C6D-935C-8B795395D02B}" srcId="{395D8231-56B3-497A-BB3C-8755D9CE7632}" destId="{DC935A6B-42CC-4C3A-98C6-F69C4A53A127}" srcOrd="2" destOrd="0" parTransId="{A488DC34-294E-4606-A6E7-DCC00A5FAED8}" sibTransId="{DE683FBC-3624-4817-8598-31EFD6D31655}"/>
     <dgm:cxn modelId="{155BDA8C-B027-4F68-97E4-9076D38F9676}" type="presOf" srcId="{792A4CBA-8FD8-4801-A402-8A39400887A1}" destId="{A8848CC5-9D30-4E36-9BB0-CC6416E945C8}" srcOrd="0" destOrd="0" presId="urn:microsoft.com/office/officeart/2005/8/layout/vList2"/>
     <dgm:cxn modelId="{94ADF298-F639-4336-B7DF-0FA973F64905}" type="presOf" srcId="{41DADE64-E719-4DF4-AF76-EEC064353075}" destId="{FE514F19-CE08-464A-99C2-7875CECDC5F6}" srcOrd="0" destOrd="0" presId="urn:microsoft.com/office/officeart/2005/8/layout/vList2"/>
     <dgm:cxn modelId="{38D1D9D7-2DEC-4B52-A08C-DD719AF329E9}" srcId="{395D8231-56B3-497A-BB3C-8755D9CE7632}" destId="{41DADE64-E719-4DF4-AF76-EEC064353075}" srcOrd="3" destOrd="0" parTransId="{1279F6EB-A5DB-491C-A422-F2041FE279B9}" sibTransId="{9A097FF2-1195-4906-91E9-B18C60D8D8C9}"/>
-    <dgm:cxn modelId="{FC11F6E9-47ED-4C6D-935C-8B795395D02B}" srcId="{395D8231-56B3-497A-BB3C-8755D9CE7632}" destId="{DC935A6B-42CC-4C3A-98C6-F69C4A53A127}" srcOrd="2" destOrd="0" parTransId="{A488DC34-294E-4606-A6E7-DCC00A5FAED8}" sibTransId="{DE683FBC-3624-4817-8598-31EFD6D31655}"/>
+    <dgm:cxn modelId="{EBEF5135-3885-456C-B2E0-BFADAB70C45B}" srcId="{395D8231-56B3-497A-BB3C-8755D9CE7632}" destId="{DF3B006B-53BE-41C8-9A24-E74660C5E91E}" srcOrd="0" destOrd="0" parTransId="{ECC07BB8-416F-430A-BB91-622B73549A1A}" sibTransId="{3EB25D0C-350B-48A8-B53C-2877BC56D2D2}"/>
     <dgm:cxn modelId="{D0B62F76-F65B-4155-ACC4-2754A5DA2762}" type="presParOf" srcId="{F699706B-6E0C-4F28-BFF1-6AF2C46FDFFF}" destId="{0D972EB1-AEA3-483B-A6C8-E335A793BB96}" srcOrd="0" destOrd="0" presId="urn:microsoft.com/office/officeart/2005/8/layout/vList2"/>
     <dgm:cxn modelId="{8E1FBC85-F397-4649-9C06-27AFE5BB29EE}" type="presParOf" srcId="{F699706B-6E0C-4F28-BFF1-6AF2C46FDFFF}" destId="{E977AB78-66FD-4531-A580-C11626DDA3C7}" srcOrd="1" destOrd="0" presId="urn:microsoft.com/office/officeart/2005/8/layout/vList2"/>
     <dgm:cxn modelId="{253A76D5-3A77-47DB-A0A6-60B5D9C29ED9}" type="presParOf" srcId="{F699706B-6E0C-4F28-BFF1-6AF2C46FDFFF}" destId="{A8848CC5-9D30-4E36-9BB0-CC6416E945C8}" srcOrd="2" destOrd="0" presId="urn:microsoft.com/office/officeart/2005/8/layout/vList2"/>
@@ -9697,7 +10159,7 @@
         </a:bodyPr>
         <a:lstStyle/>
         <a:p>
-          <a:pPr marL="0" lvl="0" indent="0" algn="ctr" defTabSz="1733550" rtl="0">
+          <a:pPr lvl="0" algn="ctr" defTabSz="1733550" rtl="0">
             <a:lnSpc>
               <a:spcPct val="90000"/>
             </a:lnSpc>
@@ -9707,7 +10169,6 @@
             <a:spcAft>
               <a:spcPct val="35000"/>
             </a:spcAft>
-            <a:buNone/>
           </a:pPr>
           <a:r>
             <a:rPr lang="hu-HU" sz="3900" kern="1200" err="1"/>
@@ -9811,7 +10272,7 @@
         </a:bodyPr>
         <a:lstStyle/>
         <a:p>
-          <a:pPr marL="0" lvl="0" indent="0" algn="ctr" defTabSz="1733550" rtl="0">
+          <a:pPr lvl="0" algn="ctr" defTabSz="1733550" rtl="0">
             <a:lnSpc>
               <a:spcPct val="90000"/>
             </a:lnSpc>
@@ -9821,7 +10282,6 @@
             <a:spcAft>
               <a:spcPct val="35000"/>
             </a:spcAft>
-            <a:buNone/>
           </a:pPr>
           <a:r>
             <a:rPr lang="hu-HU" sz="3900" kern="1200" err="1"/>
@@ -9922,7 +10382,7 @@
         </a:bodyPr>
         <a:lstStyle/>
         <a:p>
-          <a:pPr marL="0" lvl="0" indent="0" algn="ctr" defTabSz="1733550" rtl="0">
+          <a:pPr lvl="0" algn="ctr" defTabSz="1733550" rtl="0">
             <a:lnSpc>
               <a:spcPct val="90000"/>
             </a:lnSpc>
@@ -9932,7 +10392,6 @@
             <a:spcAft>
               <a:spcPct val="35000"/>
             </a:spcAft>
-            <a:buNone/>
           </a:pPr>
           <a:r>
             <a:rPr lang="hu-HU" sz="3900" kern="1200" err="1"/>
@@ -10033,7 +10492,7 @@
         </a:bodyPr>
         <a:lstStyle/>
         <a:p>
-          <a:pPr marL="0" lvl="0" indent="0" algn="ctr" defTabSz="1733550" rtl="0">
+          <a:pPr lvl="0" algn="ctr" defTabSz="1733550" rtl="0">
             <a:lnSpc>
               <a:spcPct val="90000"/>
             </a:lnSpc>
@@ -10043,7 +10502,6 @@
             <a:spcAft>
               <a:spcPct val="35000"/>
             </a:spcAft>
-            <a:buNone/>
           </a:pPr>
           <a:r>
             <a:rPr lang="hu-HU" sz="3900" kern="1200"/>
@@ -10194,7 +10652,7 @@
         </a:bodyPr>
         <a:lstStyle/>
         <a:p>
-          <a:pPr marL="0" lvl="0" indent="0" algn="ctr" defTabSz="889000" rtl="0">
+          <a:pPr lvl="0" algn="ctr" defTabSz="889000" rtl="0">
             <a:lnSpc>
               <a:spcPct val="90000"/>
             </a:lnSpc>
@@ -10204,7 +10662,6 @@
             <a:spcAft>
               <a:spcPct val="35000"/>
             </a:spcAft>
-            <a:buNone/>
           </a:pPr>
           <a:r>
             <a:rPr lang="hu-HU" sz="2000" kern="1200"/>
@@ -10304,7 +10761,7 @@
         </a:bodyPr>
         <a:lstStyle/>
         <a:p>
-          <a:pPr marL="0" lvl="0" indent="0" algn="ctr" defTabSz="889000" rtl="0">
+          <a:pPr lvl="0" algn="ctr" defTabSz="889000" rtl="0">
             <a:lnSpc>
               <a:spcPct val="90000"/>
             </a:lnSpc>
@@ -10314,7 +10771,6 @@
             <a:spcAft>
               <a:spcPct val="35000"/>
             </a:spcAft>
-            <a:buNone/>
           </a:pPr>
           <a:r>
             <a:rPr lang="hu-HU" sz="2000" kern="1200"/>
@@ -10414,7 +10870,7 @@
         </a:bodyPr>
         <a:lstStyle/>
         <a:p>
-          <a:pPr marL="0" lvl="0" indent="0" algn="ctr" defTabSz="889000" rtl="0">
+          <a:pPr lvl="0" algn="ctr" defTabSz="889000" rtl="0">
             <a:lnSpc>
               <a:spcPct val="90000"/>
             </a:lnSpc>
@@ -10424,7 +10880,6 @@
             <a:spcAft>
               <a:spcPct val="35000"/>
             </a:spcAft>
-            <a:buNone/>
           </a:pPr>
           <a:r>
             <a:rPr lang="hu-HU" sz="2000" kern="1200"/>
@@ -10524,7 +10979,7 @@
         </a:bodyPr>
         <a:lstStyle/>
         <a:p>
-          <a:pPr marL="0" lvl="0" indent="0" algn="ctr" defTabSz="889000" rtl="0">
+          <a:pPr lvl="0" algn="ctr" defTabSz="889000" rtl="0">
             <a:lnSpc>
               <a:spcPct val="90000"/>
             </a:lnSpc>
@@ -10534,7 +10989,6 @@
             <a:spcAft>
               <a:spcPct val="35000"/>
             </a:spcAft>
-            <a:buNone/>
           </a:pPr>
           <a:r>
             <a:rPr lang="hu-HU" sz="2000" kern="1200"/>
@@ -10685,7 +11139,7 @@
         </a:bodyPr>
         <a:lstStyle/>
         <a:p>
-          <a:pPr marL="0" lvl="0" indent="0" algn="ctr" defTabSz="1111250" rtl="0">
+          <a:pPr lvl="0" algn="ctr" defTabSz="1111250" rtl="0">
             <a:lnSpc>
               <a:spcPct val="90000"/>
             </a:lnSpc>
@@ -10695,7 +11149,6 @@
             <a:spcAft>
               <a:spcPct val="35000"/>
             </a:spcAft>
-            <a:buNone/>
           </a:pPr>
           <a:r>
             <a:rPr lang="hu-HU" sz="2500" kern="1200"/>
@@ -10795,7 +11248,7 @@
         </a:bodyPr>
         <a:lstStyle/>
         <a:p>
-          <a:pPr marL="0" lvl="0" indent="0" algn="ctr" defTabSz="1111250" rtl="0">
+          <a:pPr lvl="0" algn="ctr" defTabSz="1111250" rtl="0">
             <a:lnSpc>
               <a:spcPct val="90000"/>
             </a:lnSpc>
@@ -10805,7 +11258,6 @@
             <a:spcAft>
               <a:spcPct val="35000"/>
             </a:spcAft>
-            <a:buNone/>
           </a:pPr>
           <a:r>
             <a:rPr lang="hu-HU" sz="2500" kern="1200"/>
@@ -10905,7 +11357,7 @@
         </a:bodyPr>
         <a:lstStyle/>
         <a:p>
-          <a:pPr marL="0" lvl="0" indent="0" algn="ctr" defTabSz="1111250" rtl="0">
+          <a:pPr lvl="0" algn="ctr" defTabSz="1111250" rtl="0">
             <a:lnSpc>
               <a:spcPct val="90000"/>
             </a:lnSpc>
@@ -10915,7 +11367,6 @@
             <a:spcAft>
               <a:spcPct val="35000"/>
             </a:spcAft>
-            <a:buNone/>
           </a:pPr>
           <a:r>
             <a:rPr lang="hu-HU" sz="2500" kern="1200"/>
@@ -11015,7 +11466,7 @@
         </a:bodyPr>
         <a:lstStyle/>
         <a:p>
-          <a:pPr marL="0" lvl="0" indent="0" algn="ctr" defTabSz="1111250" rtl="0">
+          <a:pPr lvl="0" algn="ctr" defTabSz="1111250" rtl="0">
             <a:lnSpc>
               <a:spcPct val="90000"/>
             </a:lnSpc>
@@ -11025,7 +11476,6 @@
             <a:spcAft>
               <a:spcPct val="35000"/>
             </a:spcAft>
-            <a:buNone/>
           </a:pPr>
           <a:r>
             <a:rPr lang="hu-HU" sz="2500" kern="1200"/>
@@ -11176,7 +11626,7 @@
         </a:bodyPr>
         <a:lstStyle/>
         <a:p>
-          <a:pPr marL="0" lvl="0" indent="0" algn="ctr" defTabSz="1466850" rtl="0">
+          <a:pPr lvl="0" algn="ctr" defTabSz="1466850" rtl="0">
             <a:lnSpc>
               <a:spcPct val="90000"/>
             </a:lnSpc>
@@ -11186,7 +11636,6 @@
             <a:spcAft>
               <a:spcPct val="35000"/>
             </a:spcAft>
-            <a:buNone/>
           </a:pPr>
           <a:r>
             <a:rPr lang="hu-HU" sz="3300" kern="1200"/>
@@ -11616,7 +12065,7 @@
         </a:bodyPr>
         <a:lstStyle/>
         <a:p>
-          <a:pPr marL="0" lvl="0" indent="0" algn="ctr" defTabSz="933450" rtl="0">
+          <a:pPr lvl="0" algn="ctr" defTabSz="933450" rtl="0">
             <a:lnSpc>
               <a:spcPct val="90000"/>
             </a:lnSpc>
@@ -11626,7 +12075,6 @@
             <a:spcAft>
               <a:spcPct val="35000"/>
             </a:spcAft>
-            <a:buNone/>
           </a:pPr>
           <a:r>
             <a:rPr lang="hu-HU" sz="2100" kern="1200"/>
@@ -11726,7 +12174,7 @@
         </a:bodyPr>
         <a:lstStyle/>
         <a:p>
-          <a:pPr marL="0" lvl="0" indent="0" algn="ctr" defTabSz="933450" rtl="0">
+          <a:pPr lvl="0" algn="ctr" defTabSz="933450" rtl="0">
             <a:lnSpc>
               <a:spcPct val="90000"/>
             </a:lnSpc>
@@ -11736,7 +12184,6 @@
             <a:spcAft>
               <a:spcPct val="35000"/>
             </a:spcAft>
-            <a:buNone/>
           </a:pPr>
           <a:r>
             <a:rPr lang="hu-HU" sz="2100" kern="1200"/>
@@ -11836,7 +12283,7 @@
         </a:bodyPr>
         <a:lstStyle/>
         <a:p>
-          <a:pPr marL="0" lvl="0" indent="0" algn="ctr" defTabSz="933450" rtl="0">
+          <a:pPr lvl="0" algn="ctr" defTabSz="933450" rtl="0">
             <a:lnSpc>
               <a:spcPct val="90000"/>
             </a:lnSpc>
@@ -11846,7 +12293,6 @@
             <a:spcAft>
               <a:spcPct val="35000"/>
             </a:spcAft>
-            <a:buNone/>
           </a:pPr>
           <a:r>
             <a:rPr lang="hu-HU" sz="2100" kern="1200"/>
@@ -11946,7 +12392,7 @@
         </a:bodyPr>
         <a:lstStyle/>
         <a:p>
-          <a:pPr marL="0" lvl="0" indent="0" algn="ctr" defTabSz="933450" rtl="0">
+          <a:pPr lvl="0" algn="ctr" defTabSz="933450" rtl="0">
             <a:lnSpc>
               <a:spcPct val="90000"/>
             </a:lnSpc>
@@ -11956,7 +12402,6 @@
             <a:spcAft>
               <a:spcPct val="35000"/>
             </a:spcAft>
-            <a:buNone/>
           </a:pPr>
           <a:r>
             <a:rPr lang="hu-HU" sz="2100" kern="1200"/>
@@ -12056,7 +12501,7 @@
         </a:bodyPr>
         <a:lstStyle/>
         <a:p>
-          <a:pPr marL="0" lvl="0" indent="0" algn="ctr" defTabSz="933450" rtl="0">
+          <a:pPr lvl="0" algn="ctr" defTabSz="933450" rtl="0">
             <a:lnSpc>
               <a:spcPct val="90000"/>
             </a:lnSpc>
@@ -12066,7 +12511,6 @@
             <a:spcAft>
               <a:spcPct val="35000"/>
             </a:spcAft>
-            <a:buNone/>
           </a:pPr>
           <a:r>
             <a:rPr lang="hu-HU" sz="2100" kern="1200"/>
@@ -12166,7 +12610,7 @@
         </a:bodyPr>
         <a:lstStyle/>
         <a:p>
-          <a:pPr marL="0" lvl="0" indent="0" algn="ctr" defTabSz="933450" rtl="0">
+          <a:pPr lvl="0" algn="ctr" defTabSz="933450" rtl="0">
             <a:lnSpc>
               <a:spcPct val="90000"/>
             </a:lnSpc>
@@ -12176,7 +12620,6 @@
             <a:spcAft>
               <a:spcPct val="35000"/>
             </a:spcAft>
-            <a:buNone/>
           </a:pPr>
           <a:r>
             <a:rPr lang="hu-HU" sz="2100" kern="1200"/>
@@ -12420,7 +12863,7 @@
         </a:bodyPr>
         <a:lstStyle/>
         <a:p>
-          <a:pPr marL="0" lvl="0" indent="0" algn="ctr" defTabSz="1022350" rtl="0">
+          <a:pPr lvl="0" algn="ctr" defTabSz="1022350" rtl="0">
             <a:lnSpc>
               <a:spcPct val="90000"/>
             </a:lnSpc>
@@ -12430,7 +12873,6 @@
             <a:spcAft>
               <a:spcPct val="35000"/>
             </a:spcAft>
-            <a:buNone/>
           </a:pPr>
           <a:r>
             <a:rPr lang="hu-HU" sz="2300" kern="1200"/>
@@ -12530,7 +12972,7 @@
         </a:bodyPr>
         <a:lstStyle/>
         <a:p>
-          <a:pPr marL="0" lvl="0" indent="0" algn="ctr" defTabSz="1022350" rtl="0">
+          <a:pPr lvl="0" algn="ctr" defTabSz="1022350" rtl="0">
             <a:lnSpc>
               <a:spcPct val="90000"/>
             </a:lnSpc>
@@ -12540,7 +12982,6 @@
             <a:spcAft>
               <a:spcPct val="35000"/>
             </a:spcAft>
-            <a:buNone/>
           </a:pPr>
           <a:r>
             <a:rPr lang="hu-HU" sz="2300" kern="1200"/>
@@ -12640,7 +13081,7 @@
         </a:bodyPr>
         <a:lstStyle/>
         <a:p>
-          <a:pPr marL="0" lvl="0" indent="0" algn="ctr" defTabSz="1022350" rtl="0">
+          <a:pPr lvl="0" algn="ctr" defTabSz="1022350" rtl="0">
             <a:lnSpc>
               <a:spcPct val="90000"/>
             </a:lnSpc>
@@ -12650,7 +13091,6 @@
             <a:spcAft>
               <a:spcPct val="35000"/>
             </a:spcAft>
-            <a:buNone/>
           </a:pPr>
           <a:r>
             <a:rPr lang="hu-HU" sz="2300" kern="1200"/>
@@ -12750,7 +13190,7 @@
         </a:bodyPr>
         <a:lstStyle/>
         <a:p>
-          <a:pPr marL="0" lvl="0" indent="0" algn="ctr" defTabSz="1022350" rtl="0">
+          <a:pPr lvl="0" algn="ctr" defTabSz="1022350" rtl="0">
             <a:lnSpc>
               <a:spcPct val="90000"/>
             </a:lnSpc>
@@ -12760,7 +13200,6 @@
             <a:spcAft>
               <a:spcPct val="35000"/>
             </a:spcAft>
-            <a:buNone/>
           </a:pPr>
           <a:r>
             <a:rPr lang="hu-HU" sz="2300" kern="1200"/>
@@ -12948,7 +13387,7 @@
         </a:bodyPr>
         <a:lstStyle/>
         <a:p>
-          <a:pPr marL="0" lvl="0" indent="0" algn="ctr" defTabSz="1066800" rtl="0">
+          <a:pPr lvl="0" algn="ctr" defTabSz="1066800" rtl="0">
             <a:lnSpc>
               <a:spcPct val="90000"/>
             </a:lnSpc>
@@ -12958,7 +13397,6 @@
             <a:spcAft>
               <a:spcPct val="35000"/>
             </a:spcAft>
-            <a:buNone/>
           </a:pPr>
           <a:r>
             <a:rPr lang="hu-HU" sz="2400" kern="1200"/>
@@ -12990,7 +13428,7 @@
       </dsp:nvSpPr>
       <dsp:spPr>
         <a:xfrm>
-          <a:off x="10" y="564081"/>
+          <a:off x="10" y="0"/>
           <a:ext cx="9241147" cy="542867"/>
         </a:xfrm>
         <a:prstGeom prst="rect">
@@ -13070,7 +13508,7 @@
         </a:bodyPr>
         <a:lstStyle/>
         <a:p>
-          <a:pPr marL="0" lvl="0" indent="0" algn="ctr" defTabSz="933450" rtl="0">
+          <a:pPr lvl="0" algn="ctr" defTabSz="933450" rtl="0">
             <a:lnSpc>
               <a:spcPct val="90000"/>
             </a:lnSpc>
@@ -13080,7 +13518,6 @@
             <a:spcAft>
               <a:spcPct val="35000"/>
             </a:spcAft>
-            <a:buNone/>
           </a:pPr>
           <a:r>
             <a:rPr lang="hu-HU" sz="2100" kern="1200"/>
@@ -13094,7 +13531,7 @@
         </a:p>
       </dsp:txBody>
       <dsp:txXfrm>
-        <a:off x="10" y="564081"/>
+        <a:off x="10" y="0"/>
         <a:ext cx="9241147" cy="542867"/>
       </dsp:txXfrm>
     </dsp:sp>
@@ -13105,7 +13542,7 @@
       </dsp:nvSpPr>
       <dsp:spPr>
         <a:xfrm>
-          <a:off x="10" y="1207115"/>
+          <a:off x="0" y="728915"/>
           <a:ext cx="9256395" cy="515866"/>
         </a:xfrm>
         <a:prstGeom prst="rect">
@@ -13185,7 +13622,7 @@
         </a:bodyPr>
         <a:lstStyle/>
         <a:p>
-          <a:pPr marL="0" lvl="0" indent="0" algn="ctr" defTabSz="933450" rtl="0">
+          <a:pPr lvl="0" algn="l" defTabSz="933450" rtl="0">
             <a:lnSpc>
               <a:spcPct val="90000"/>
             </a:lnSpc>
@@ -13195,16 +13632,19 @@
             <a:spcAft>
               <a:spcPct val="35000"/>
             </a:spcAft>
-            <a:buNone/>
           </a:pPr>
           <a:r>
-            <a:rPr lang="hu-HU" sz="2100" kern="1200"/>
-            <a:t>lv2 API</a:t>
+            <a:rPr lang="hu-HU" sz="2100" kern="1200" dirty="0" smtClean="0"/>
+            <a:t>		lv2 </a:t>
+          </a:r>
+          <a:r>
+            <a:rPr lang="hu-HU" sz="2100" kern="1200" dirty="0"/>
+            <a:t>API</a:t>
           </a:r>
         </a:p>
       </dsp:txBody>
       <dsp:txXfrm>
-        <a:off x="10" y="1207115"/>
+        <a:off x="0" y="728915"/>
         <a:ext cx="9256395" cy="515866"/>
       </dsp:txXfrm>
     </dsp:sp>
@@ -13215,7 +13655,7 @@
       </dsp:nvSpPr>
       <dsp:spPr>
         <a:xfrm>
-          <a:off x="367703" y="1878449"/>
+          <a:off x="288586" y="1751938"/>
           <a:ext cx="2602942" cy="979737"/>
         </a:xfrm>
         <a:prstGeom prst="rect">
@@ -13295,7 +13735,7 @@
         </a:bodyPr>
         <a:lstStyle/>
         <a:p>
-          <a:pPr marL="0" lvl="0" indent="0" algn="ctr" defTabSz="933450" rtl="0">
+          <a:pPr lvl="0" algn="ctr" defTabSz="933450" rtl="0">
             <a:lnSpc>
               <a:spcPct val="90000"/>
             </a:lnSpc>
@@ -13305,24 +13745,23 @@
             <a:spcAft>
               <a:spcPct val="35000"/>
             </a:spcAft>
-            <a:buNone/>
           </a:pPr>
           <a:r>
-            <a:rPr lang="hu-HU" sz="2100" kern="1200"/>
+            <a:rPr lang="hu-HU" sz="2100" kern="1200" dirty="0"/>
             <a:t>lv2d lekérdező gyökér alkalmazás / </a:t>
           </a:r>
           <a:r>
-            <a:rPr lang="hu-HU" sz="2100" kern="1200" err="1"/>
+            <a:rPr lang="hu-HU" sz="2100" kern="1200" dirty="0" err="1"/>
             <a:t>daemon</a:t>
           </a:r>
           <a:r>
-            <a:rPr lang="hu-HU" sz="2100" kern="1200"/>
+            <a:rPr lang="hu-HU" sz="2100" kern="1200" dirty="0"/>
             <a:t>.</a:t>
           </a:r>
         </a:p>
       </dsp:txBody>
       <dsp:txXfrm>
-        <a:off x="367703" y="1878449"/>
+        <a:off x="288586" y="1751938"/>
         <a:ext cx="2602942" cy="979737"/>
       </dsp:txXfrm>
     </dsp:sp>
@@ -13333,7 +13772,7 @@
       </dsp:nvSpPr>
       <dsp:spPr>
         <a:xfrm>
-          <a:off x="368141" y="3038868"/>
+          <a:off x="306603" y="2894784"/>
           <a:ext cx="2602942" cy="966804"/>
         </a:xfrm>
         <a:prstGeom prst="rect">
@@ -13413,7 +13852,7 @@
         </a:bodyPr>
         <a:lstStyle/>
         <a:p>
-          <a:pPr marL="0" lvl="0" indent="0" algn="ctr" defTabSz="933450" rtl="0">
+          <a:pPr lvl="0" algn="ctr" defTabSz="933450" rtl="0">
             <a:lnSpc>
               <a:spcPct val="90000"/>
             </a:lnSpc>
@@ -13423,16 +13862,15 @@
             <a:spcAft>
               <a:spcPct val="35000"/>
             </a:spcAft>
-            <a:buNone/>
           </a:pPr>
           <a:r>
-            <a:rPr lang="hu-HU" sz="2100" kern="1200"/>
+            <a:rPr lang="hu-HU" sz="2100" kern="1200" dirty="0"/>
             <a:t>Lekérdező alprogramok</a:t>
           </a:r>
         </a:p>
       </dsp:txBody>
       <dsp:txXfrm>
-        <a:off x="368141" y="3038868"/>
+        <a:off x="306603" y="2894784"/>
         <a:ext cx="2602942" cy="966804"/>
       </dsp:txXfrm>
     </dsp:sp>
@@ -13443,7 +13881,7 @@
       </dsp:nvSpPr>
       <dsp:spPr>
         <a:xfrm>
-          <a:off x="6402979" y="1854155"/>
+          <a:off x="6411754" y="1789198"/>
           <a:ext cx="2602942" cy="520588"/>
         </a:xfrm>
         <a:prstGeom prst="rect">
@@ -13523,7 +13961,7 @@
         </a:bodyPr>
         <a:lstStyle/>
         <a:p>
-          <a:pPr marL="0" lvl="0" indent="0" algn="ctr" defTabSz="933450" rtl="0">
+          <a:pPr lvl="0" algn="ctr" defTabSz="933450" rtl="0">
             <a:lnSpc>
               <a:spcPct val="90000"/>
             </a:lnSpc>
@@ -13533,16 +13971,15 @@
             <a:spcAft>
               <a:spcPct val="35000"/>
             </a:spcAft>
-            <a:buNone/>
           </a:pPr>
           <a:r>
-            <a:rPr lang="hu-HU" sz="2100" kern="1200"/>
+            <a:rPr lang="hu-HU" sz="2100" kern="1200" dirty="0"/>
             <a:t>lv2g GUI API</a:t>
           </a:r>
         </a:p>
       </dsp:txBody>
       <dsp:txXfrm>
-        <a:off x="6402979" y="1854155"/>
+        <a:off x="6411754" y="1789198"/>
         <a:ext cx="2602942" cy="520588"/>
       </dsp:txXfrm>
     </dsp:sp>
@@ -13553,7 +13990,7 @@
       </dsp:nvSpPr>
       <dsp:spPr>
         <a:xfrm>
-          <a:off x="6403212" y="2559804"/>
+          <a:off x="6409876" y="2468455"/>
           <a:ext cx="2602942" cy="522003"/>
         </a:xfrm>
         <a:prstGeom prst="rect">
@@ -13633,7 +14070,7 @@
         </a:bodyPr>
         <a:lstStyle/>
         <a:p>
-          <a:pPr marL="0" lvl="0" indent="0" algn="ctr" defTabSz="933450" rtl="0">
+          <a:pPr lvl="0" algn="ctr" defTabSz="933450" rtl="0">
             <a:lnSpc>
               <a:spcPct val="90000"/>
             </a:lnSpc>
@@ -13643,16 +14080,15 @@
             <a:spcAft>
               <a:spcPct val="35000"/>
             </a:spcAft>
-            <a:buNone/>
           </a:pPr>
           <a:r>
-            <a:rPr lang="hu-HU" sz="2100" kern="1200"/>
+            <a:rPr lang="hu-HU" sz="2100" kern="1200" dirty="0"/>
             <a:t>lv2gui GUI</a:t>
           </a:r>
         </a:p>
       </dsp:txBody>
       <dsp:txXfrm>
-        <a:off x="6403212" y="2559804"/>
+        <a:off x="6409876" y="2468455"/>
         <a:ext cx="2602942" cy="522003"/>
       </dsp:txXfrm>
     </dsp:sp>
@@ -13663,7 +14099,7 @@
       </dsp:nvSpPr>
       <dsp:spPr>
         <a:xfrm>
-          <a:off x="2184129" y="4222647"/>
+          <a:off x="3451499" y="3331205"/>
           <a:ext cx="2602942" cy="1125207"/>
         </a:xfrm>
         <a:prstGeom prst="rect">
@@ -13741,7 +14177,7 @@
         </a:bodyPr>
         <a:lstStyle/>
         <a:p>
-          <a:pPr marL="0" lvl="0" indent="0" algn="ctr" defTabSz="933450" rtl="0">
+          <a:pPr lvl="0" algn="ctr" defTabSz="933450" rtl="0">
             <a:lnSpc>
               <a:spcPct val="90000"/>
             </a:lnSpc>
@@ -13751,7 +14187,6 @@
             <a:spcAft>
               <a:spcPct val="35000"/>
             </a:spcAft>
-            <a:buNone/>
           </a:pPr>
           <a:r>
             <a:rPr lang="hu-HU" sz="2100" kern="1200"/>
@@ -13760,7 +14195,7 @@
         </a:p>
       </dsp:txBody>
       <dsp:txXfrm>
-        <a:off x="2184129" y="4222647"/>
+        <a:off x="3451499" y="3331205"/>
         <a:ext cx="2602942" cy="1125207"/>
       </dsp:txXfrm>
     </dsp:sp>
@@ -13771,8 +14206,8 @@
       </dsp:nvSpPr>
       <dsp:spPr>
         <a:xfrm>
-          <a:off x="3335554" y="1861447"/>
-          <a:ext cx="2742334" cy="520588"/>
+          <a:off x="2833322" y="950518"/>
+          <a:ext cx="3584122" cy="520588"/>
         </a:xfrm>
         <a:prstGeom prst="rect">
           <a:avLst/>
@@ -13851,7 +14286,7 @@
         </a:bodyPr>
         <a:lstStyle/>
         <a:p>
-          <a:pPr marL="0" lvl="0" indent="0" algn="ctr" defTabSz="933450" rtl="0">
+          <a:pPr lvl="0" algn="ctr" defTabSz="933450" rtl="0">
             <a:lnSpc>
               <a:spcPct val="90000"/>
             </a:lnSpc>
@@ -13861,21 +14296,20 @@
             <a:spcAft>
               <a:spcPct val="35000"/>
             </a:spcAft>
-            <a:buNone/>
           </a:pPr>
           <a:r>
-            <a:rPr lang="hu-HU" sz="2100" kern="1200" err="1"/>
+            <a:rPr lang="hu-HU" sz="2100" kern="1200" dirty="0" err="1"/>
             <a:t>Interpreter</a:t>
           </a:r>
           <a:r>
-            <a:rPr lang="hu-HU" sz="2100" kern="1200"/>
+            <a:rPr lang="hu-HU" sz="2100" kern="1200" dirty="0"/>
             <a:t> (CLI)</a:t>
           </a:r>
         </a:p>
       </dsp:txBody>
       <dsp:txXfrm>
-        <a:off x="3335554" y="1861447"/>
-        <a:ext cx="2742334" cy="520588"/>
+        <a:off x="2833322" y="950518"/>
+        <a:ext cx="3584122" cy="520588"/>
       </dsp:txXfrm>
     </dsp:sp>
   </dsp:spTree>
@@ -13977,7 +14411,7 @@
         </a:bodyPr>
         <a:lstStyle/>
         <a:p>
-          <a:pPr marL="0" lvl="0" indent="0" algn="l" defTabSz="844550" rtl="0">
+          <a:pPr lvl="0" algn="l" defTabSz="844550" rtl="0">
             <a:lnSpc>
               <a:spcPct val="90000"/>
             </a:lnSpc>
@@ -13987,7 +14421,6 @@
             <a:spcAft>
               <a:spcPct val="35000"/>
             </a:spcAft>
-            <a:buNone/>
           </a:pPr>
           <a:r>
             <a:rPr lang="hu-HU" sz="1900" kern="1200"/>
@@ -14095,7 +14528,7 @@
         </a:bodyPr>
         <a:lstStyle/>
         <a:p>
-          <a:pPr marL="0" lvl="0" indent="0" algn="l" defTabSz="844550" rtl="0">
+          <a:pPr lvl="0" algn="l" defTabSz="844550" rtl="0">
             <a:lnSpc>
               <a:spcPct val="90000"/>
             </a:lnSpc>
@@ -14105,7 +14538,6 @@
             <a:spcAft>
               <a:spcPct val="35000"/>
             </a:spcAft>
-            <a:buNone/>
           </a:pPr>
           <a:r>
             <a:rPr lang="hu-HU" sz="1900" kern="1200"/>
@@ -14205,7 +14637,7 @@
         </a:bodyPr>
         <a:lstStyle/>
         <a:p>
-          <a:pPr marL="0" lvl="0" indent="0" algn="l" defTabSz="844550" rtl="0">
+          <a:pPr lvl="0" algn="l" defTabSz="844550" rtl="0">
             <a:lnSpc>
               <a:spcPct val="90000"/>
             </a:lnSpc>
@@ -14215,7 +14647,6 @@
             <a:spcAft>
               <a:spcPct val="35000"/>
             </a:spcAft>
-            <a:buNone/>
           </a:pPr>
           <a:r>
             <a:rPr lang="hu-HU" sz="1900" kern="1200"/>
@@ -14315,7 +14746,7 @@
         </a:bodyPr>
         <a:lstStyle/>
         <a:p>
-          <a:pPr marL="0" lvl="0" indent="0" algn="l" defTabSz="844550" rtl="0">
+          <a:pPr lvl="0" algn="l" defTabSz="844550" rtl="0">
             <a:lnSpc>
               <a:spcPct val="90000"/>
             </a:lnSpc>
@@ -14325,7 +14756,6 @@
             <a:spcAft>
               <a:spcPct val="35000"/>
             </a:spcAft>
-            <a:buNone/>
           </a:pPr>
           <a:r>
             <a:rPr lang="hu-HU" sz="1900" kern="1200"/>
@@ -27821,7 +28251,7 @@
           <a:noFill/>
           <a:extLst>
             <a:ext uri="{909E8E84-426E-40dd-AFC4-6F175D3DCCD1}">
-              <a14:hiddenFill xmlns="" xmlns:a14="http://schemas.microsoft.com/office/drawing/2010/main">
+              <a14:hiddenFill xmlns:a14="http://schemas.microsoft.com/office/drawing/2010/main" xmlns="">
                 <a:solidFill>
                   <a:srgbClr val="FFFFFF"/>
                 </a:solidFill>
@@ -27881,7 +28311,7 @@
             </a:ln>
             <a:extLst>
               <a:ext uri="{91240B29-F687-4f45-9708-019B960494DF}">
-                <a14:hiddenLine xmlns="" xmlns:a14="http://schemas.microsoft.com/office/drawing/2010/main" w="9525">
+                <a14:hiddenLine xmlns:a14="http://schemas.microsoft.com/office/drawing/2010/main" xmlns="" w="9525">
                   <a:solidFill>
                     <a:srgbClr val="000000"/>
                   </a:solidFill>
@@ -27971,7 +28401,7 @@
             </a:ln>
             <a:extLst>
               <a:ext uri="{91240B29-F687-4f45-9708-019B960494DF}">
-                <a14:hiddenLine xmlns="" xmlns:a14="http://schemas.microsoft.com/office/drawing/2010/main" w="9525">
+                <a14:hiddenLine xmlns:a14="http://schemas.microsoft.com/office/drawing/2010/main" xmlns="" w="9525">
                   <a:solidFill>
                     <a:srgbClr val="000000"/>
                   </a:solidFill>
@@ -28061,7 +28491,7 @@
             </a:ln>
             <a:extLst>
               <a:ext uri="{91240B29-F687-4f45-9708-019B960494DF}">
-                <a14:hiddenLine xmlns="" xmlns:a14="http://schemas.microsoft.com/office/drawing/2010/main" w="9525">
+                <a14:hiddenLine xmlns:a14="http://schemas.microsoft.com/office/drawing/2010/main" xmlns="" w="9525">
                   <a:solidFill>
                     <a:srgbClr val="000000"/>
                   </a:solidFill>
@@ -28095,7 +28525,7 @@
             </a:ln>
             <a:extLst>
               <a:ext uri="{91240B29-F687-4f45-9708-019B960494DF}">
-                <a14:hiddenLine xmlns="" xmlns:a14="http://schemas.microsoft.com/office/drawing/2010/main" w="9525">
+                <a14:hiddenLine xmlns:a14="http://schemas.microsoft.com/office/drawing/2010/main" xmlns="" w="9525">
                   <a:solidFill>
                     <a:srgbClr val="000000"/>
                   </a:solidFill>
@@ -28185,7 +28615,7 @@
             </a:ln>
             <a:extLst>
               <a:ext uri="{91240B29-F687-4f45-9708-019B960494DF}">
-                <a14:hiddenLine xmlns="" xmlns:a14="http://schemas.microsoft.com/office/drawing/2010/main" w="9525">
+                <a14:hiddenLine xmlns:a14="http://schemas.microsoft.com/office/drawing/2010/main" xmlns="" w="9525">
                   <a:solidFill>
                     <a:srgbClr val="000000"/>
                   </a:solidFill>
@@ -28247,7 +28677,7 @@
             </a:ln>
             <a:extLst>
               <a:ext uri="{91240B29-F687-4f45-9708-019B960494DF}">
-                <a14:hiddenLine xmlns="" xmlns:a14="http://schemas.microsoft.com/office/drawing/2010/main" w="9525">
+                <a14:hiddenLine xmlns:a14="http://schemas.microsoft.com/office/drawing/2010/main" xmlns="" w="9525">
                   <a:solidFill>
                     <a:srgbClr val="000000"/>
                   </a:solidFill>
@@ -28309,7 +28739,7 @@
             </a:ln>
             <a:extLst>
               <a:ext uri="{91240B29-F687-4f45-9708-019B960494DF}">
-                <a14:hiddenLine xmlns="" xmlns:a14="http://schemas.microsoft.com/office/drawing/2010/main" w="9525">
+                <a14:hiddenLine xmlns:a14="http://schemas.microsoft.com/office/drawing/2010/main" xmlns="" w="9525">
                   <a:solidFill>
                     <a:srgbClr val="000000"/>
                   </a:solidFill>
@@ -28399,7 +28829,7 @@
             </a:ln>
             <a:extLst>
               <a:ext uri="{91240B29-F687-4f45-9708-019B960494DF}">
-                <a14:hiddenLine xmlns="" xmlns:a14="http://schemas.microsoft.com/office/drawing/2010/main" w="9525">
+                <a14:hiddenLine xmlns:a14="http://schemas.microsoft.com/office/drawing/2010/main" xmlns="" w="9525">
                   <a:solidFill>
                     <a:srgbClr val="000000"/>
                   </a:solidFill>
@@ -28461,7 +28891,7 @@
             </a:ln>
             <a:extLst>
               <a:ext uri="{91240B29-F687-4f45-9708-019B960494DF}">
-                <a14:hiddenLine xmlns="" xmlns:a14="http://schemas.microsoft.com/office/drawing/2010/main" w="9525">
+                <a14:hiddenLine xmlns:a14="http://schemas.microsoft.com/office/drawing/2010/main" xmlns="" w="9525">
                   <a:solidFill>
                     <a:srgbClr val="000000"/>
                   </a:solidFill>
@@ -28523,7 +28953,7 @@
             </a:ln>
             <a:extLst>
               <a:ext uri="{91240B29-F687-4f45-9708-019B960494DF}">
-                <a14:hiddenLine xmlns="" xmlns:a14="http://schemas.microsoft.com/office/drawing/2010/main" w="9525">
+                <a14:hiddenLine xmlns:a14="http://schemas.microsoft.com/office/drawing/2010/main" xmlns="" w="9525">
                   <a:solidFill>
                     <a:srgbClr val="000000"/>
                   </a:solidFill>
@@ -28613,7 +29043,7 @@
             </a:ln>
             <a:extLst>
               <a:ext uri="{91240B29-F687-4f45-9708-019B960494DF}">
-                <a14:hiddenLine xmlns="" xmlns:a14="http://schemas.microsoft.com/office/drawing/2010/main" w="9525">
+                <a14:hiddenLine xmlns:a14="http://schemas.microsoft.com/office/drawing/2010/main" xmlns="" w="9525">
                   <a:solidFill>
                     <a:srgbClr val="000000"/>
                   </a:solidFill>
@@ -28703,7 +29133,7 @@
             </a:ln>
             <a:extLst>
               <a:ext uri="{91240B29-F687-4f45-9708-019B960494DF}">
-                <a14:hiddenLine xmlns="" xmlns:a14="http://schemas.microsoft.com/office/drawing/2010/main" w="9525">
+                <a14:hiddenLine xmlns:a14="http://schemas.microsoft.com/office/drawing/2010/main" xmlns="" w="9525">
                   <a:solidFill>
                     <a:srgbClr val="000000"/>
                   </a:solidFill>
@@ -28765,7 +29195,7 @@
             </a:ln>
             <a:extLst>
               <a:ext uri="{91240B29-F687-4f45-9708-019B960494DF}">
-                <a14:hiddenLine xmlns="" xmlns:a14="http://schemas.microsoft.com/office/drawing/2010/main" w="9525">
+                <a14:hiddenLine xmlns:a14="http://schemas.microsoft.com/office/drawing/2010/main" xmlns="" w="9525">
                   <a:solidFill>
                     <a:srgbClr val="000000"/>
                   </a:solidFill>
@@ -28875,7 +29305,7 @@
             </a:ln>
             <a:extLst>
               <a:ext uri="{91240B29-F687-4f45-9708-019B960494DF}">
-                <a14:hiddenLine xmlns="" xmlns:a14="http://schemas.microsoft.com/office/drawing/2010/main" w="9525">
+                <a14:hiddenLine xmlns:a14="http://schemas.microsoft.com/office/drawing/2010/main" xmlns="" w="9525">
                   <a:solidFill>
                     <a:srgbClr val="000000"/>
                   </a:solidFill>
@@ -28937,7 +29367,7 @@
             </a:ln>
             <a:extLst>
               <a:ext uri="{91240B29-F687-4f45-9708-019B960494DF}">
-                <a14:hiddenLine xmlns="" xmlns:a14="http://schemas.microsoft.com/office/drawing/2010/main" w="9525">
+                <a14:hiddenLine xmlns:a14="http://schemas.microsoft.com/office/drawing/2010/main" xmlns="" w="9525">
                   <a:solidFill>
                     <a:srgbClr val="000000"/>
                   </a:solidFill>
@@ -29027,7 +29457,7 @@
             </a:ln>
             <a:extLst>
               <a:ext uri="{91240B29-F687-4f45-9708-019B960494DF}">
-                <a14:hiddenLine xmlns="" xmlns:a14="http://schemas.microsoft.com/office/drawing/2010/main" w="9525">
+                <a14:hiddenLine xmlns:a14="http://schemas.microsoft.com/office/drawing/2010/main" xmlns="" w="9525">
                   <a:solidFill>
                     <a:srgbClr val="000000"/>
                   </a:solidFill>
@@ -29117,7 +29547,7 @@
             </a:ln>
             <a:extLst>
               <a:ext uri="{91240B29-F687-4f45-9708-019B960494DF}">
-                <a14:hiddenLine xmlns="" xmlns:a14="http://schemas.microsoft.com/office/drawing/2010/main" w="9525">
+                <a14:hiddenLine xmlns:a14="http://schemas.microsoft.com/office/drawing/2010/main" xmlns="" w="9525">
                   <a:solidFill>
                     <a:srgbClr val="000000"/>
                   </a:solidFill>
@@ -29179,7 +29609,7 @@
             </a:ln>
             <a:extLst>
               <a:ext uri="{91240B29-F687-4f45-9708-019B960494DF}">
-                <a14:hiddenLine xmlns="" xmlns:a14="http://schemas.microsoft.com/office/drawing/2010/main" w="9525">
+                <a14:hiddenLine xmlns:a14="http://schemas.microsoft.com/office/drawing/2010/main" xmlns="" w="9525">
                   <a:solidFill>
                     <a:srgbClr val="000000"/>
                   </a:solidFill>
@@ -29269,7 +29699,7 @@
             </a:ln>
             <a:extLst>
               <a:ext uri="{91240B29-F687-4f45-9708-019B960494DF}">
-                <a14:hiddenLine xmlns="" xmlns:a14="http://schemas.microsoft.com/office/drawing/2010/main" w="9525">
+                <a14:hiddenLine xmlns:a14="http://schemas.microsoft.com/office/drawing/2010/main" xmlns="" w="9525">
                   <a:solidFill>
                     <a:srgbClr val="000000"/>
                   </a:solidFill>
@@ -29359,7 +29789,7 @@
             </a:ln>
             <a:extLst>
               <a:ext uri="{91240B29-F687-4f45-9708-019B960494DF}">
-                <a14:hiddenLine xmlns="" xmlns:a14="http://schemas.microsoft.com/office/drawing/2010/main" w="9525">
+                <a14:hiddenLine xmlns:a14="http://schemas.microsoft.com/office/drawing/2010/main" xmlns="" w="9525">
                   <a:solidFill>
                     <a:srgbClr val="000000"/>
                   </a:solidFill>
@@ -29415,7 +29845,7 @@
             </a:ln>
             <a:extLst>
               <a:ext uri="{91240B29-F687-4f45-9708-019B960494DF}">
-                <a14:hiddenLine xmlns="" xmlns:a14="http://schemas.microsoft.com/office/drawing/2010/main" w="9525">
+                <a14:hiddenLine xmlns:a14="http://schemas.microsoft.com/office/drawing/2010/main" xmlns="" w="9525">
                   <a:solidFill>
                     <a:srgbClr val="000000"/>
                   </a:solidFill>
@@ -29505,7 +29935,7 @@
             </a:ln>
             <a:extLst>
               <a:ext uri="{91240B29-F687-4f45-9708-019B960494DF}">
-                <a14:hiddenLine xmlns="" xmlns:a14="http://schemas.microsoft.com/office/drawing/2010/main" w="9525">
+                <a14:hiddenLine xmlns:a14="http://schemas.microsoft.com/office/drawing/2010/main" xmlns="" w="9525">
                   <a:solidFill>
                     <a:srgbClr val="000000"/>
                   </a:solidFill>
@@ -29561,7 +29991,7 @@
             </a:ln>
             <a:extLst>
               <a:ext uri="{91240B29-F687-4f45-9708-019B960494DF}">
-                <a14:hiddenLine xmlns="" xmlns:a14="http://schemas.microsoft.com/office/drawing/2010/main" w="9525">
+                <a14:hiddenLine xmlns:a14="http://schemas.microsoft.com/office/drawing/2010/main" xmlns="" w="9525">
                   <a:solidFill>
                     <a:srgbClr val="000000"/>
                   </a:solidFill>
@@ -29651,7 +30081,7 @@
             </a:ln>
             <a:extLst>
               <a:ext uri="{91240B29-F687-4f45-9708-019B960494DF}">
-                <a14:hiddenLine xmlns="" xmlns:a14="http://schemas.microsoft.com/office/drawing/2010/main" w="9525">
+                <a14:hiddenLine xmlns:a14="http://schemas.microsoft.com/office/drawing/2010/main" xmlns="" w="9525">
                   <a:solidFill>
                     <a:srgbClr val="000000"/>
                   </a:solidFill>
@@ -29719,7 +30149,7 @@
             </a:ln>
             <a:extLst>
               <a:ext uri="{91240B29-F687-4f45-9708-019B960494DF}">
-                <a14:hiddenLine xmlns="" xmlns:a14="http://schemas.microsoft.com/office/drawing/2010/main" w="9525">
+                <a14:hiddenLine xmlns:a14="http://schemas.microsoft.com/office/drawing/2010/main" xmlns="" w="9525">
                   <a:solidFill>
                     <a:srgbClr val="000000"/>
                   </a:solidFill>
@@ -29809,7 +30239,7 @@
             </a:ln>
             <a:extLst>
               <a:ext uri="{91240B29-F687-4f45-9708-019B960494DF}">
-                <a14:hiddenLine xmlns="" xmlns:a14="http://schemas.microsoft.com/office/drawing/2010/main" w="9525">
+                <a14:hiddenLine xmlns:a14="http://schemas.microsoft.com/office/drawing/2010/main" xmlns="" w="9525">
                   <a:solidFill>
                     <a:srgbClr val="000000"/>
                   </a:solidFill>
@@ -29877,7 +30307,7 @@
             </a:ln>
             <a:extLst>
               <a:ext uri="{91240B29-F687-4f45-9708-019B960494DF}">
-                <a14:hiddenLine xmlns="" xmlns:a14="http://schemas.microsoft.com/office/drawing/2010/main" w="9525">
+                <a14:hiddenLine xmlns:a14="http://schemas.microsoft.com/office/drawing/2010/main" xmlns="" w="9525">
                   <a:solidFill>
                     <a:srgbClr val="000000"/>
                   </a:solidFill>
@@ -29967,7 +30397,7 @@
             </a:ln>
             <a:extLst>
               <a:ext uri="{91240B29-F687-4f45-9708-019B960494DF}">
-                <a14:hiddenLine xmlns="" xmlns:a14="http://schemas.microsoft.com/office/drawing/2010/main" w="9525">
+                <a14:hiddenLine xmlns:a14="http://schemas.microsoft.com/office/drawing/2010/main" xmlns="" w="9525">
                   <a:solidFill>
                     <a:srgbClr val="000000"/>
                   </a:solidFill>
@@ -30001,7 +30431,7 @@
             </a:ln>
             <a:extLst>
               <a:ext uri="{91240B29-F687-4f45-9708-019B960494DF}">
-                <a14:hiddenLine xmlns="" xmlns:a14="http://schemas.microsoft.com/office/drawing/2010/main" w="9525">
+                <a14:hiddenLine xmlns:a14="http://schemas.microsoft.com/office/drawing/2010/main" xmlns="" w="9525">
                   <a:solidFill>
                     <a:srgbClr val="000000"/>
                   </a:solidFill>
@@ -30091,7 +30521,7 @@
             </a:ln>
             <a:extLst>
               <a:ext uri="{91240B29-F687-4f45-9708-019B960494DF}">
-                <a14:hiddenLine xmlns="" xmlns:a14="http://schemas.microsoft.com/office/drawing/2010/main" w="9525">
+                <a14:hiddenLine xmlns:a14="http://schemas.microsoft.com/office/drawing/2010/main" xmlns="" w="9525">
                   <a:solidFill>
                     <a:srgbClr val="000000"/>
                   </a:solidFill>
@@ -30153,7 +30583,7 @@
             </a:ln>
             <a:extLst>
               <a:ext uri="{91240B29-F687-4f45-9708-019B960494DF}">
-                <a14:hiddenLine xmlns="" xmlns:a14="http://schemas.microsoft.com/office/drawing/2010/main" w="9525">
+                <a14:hiddenLine xmlns:a14="http://schemas.microsoft.com/office/drawing/2010/main" xmlns="" w="9525">
                   <a:solidFill>
                     <a:srgbClr val="000000"/>
                   </a:solidFill>
@@ -30215,7 +30645,7 @@
             </a:ln>
             <a:extLst>
               <a:ext uri="{91240B29-F687-4f45-9708-019B960494DF}">
-                <a14:hiddenLine xmlns="" xmlns:a14="http://schemas.microsoft.com/office/drawing/2010/main" w="9525">
+                <a14:hiddenLine xmlns:a14="http://schemas.microsoft.com/office/drawing/2010/main" xmlns="" w="9525">
                   <a:solidFill>
                     <a:srgbClr val="000000"/>
                   </a:solidFill>
@@ -30305,7 +30735,7 @@
             </a:ln>
             <a:extLst>
               <a:ext uri="{91240B29-F687-4f45-9708-019B960494DF}">
-                <a14:hiddenLine xmlns="" xmlns:a14="http://schemas.microsoft.com/office/drawing/2010/main" w="9525">
+                <a14:hiddenLine xmlns:a14="http://schemas.microsoft.com/office/drawing/2010/main" xmlns="" w="9525">
                   <a:solidFill>
                     <a:srgbClr val="000000"/>
                   </a:solidFill>
@@ -30373,7 +30803,7 @@
             </a:ln>
             <a:extLst>
               <a:ext uri="{91240B29-F687-4f45-9708-019B960494DF}">
-                <a14:hiddenLine xmlns="" xmlns:a14="http://schemas.microsoft.com/office/drawing/2010/main" w="9525">
+                <a14:hiddenLine xmlns:a14="http://schemas.microsoft.com/office/drawing/2010/main" xmlns="" w="9525">
                   <a:solidFill>
                     <a:srgbClr val="000000"/>
                   </a:solidFill>
@@ -30435,7 +30865,7 @@
             </a:ln>
             <a:extLst>
               <a:ext uri="{91240B29-F687-4f45-9708-019B960494DF}">
-                <a14:hiddenLine xmlns="" xmlns:a14="http://schemas.microsoft.com/office/drawing/2010/main" w="9525">
+                <a14:hiddenLine xmlns:a14="http://schemas.microsoft.com/office/drawing/2010/main" xmlns="" w="9525">
                   <a:solidFill>
                     <a:srgbClr val="000000"/>
                   </a:solidFill>
@@ -30525,7 +30955,7 @@
             </a:ln>
             <a:extLst>
               <a:ext uri="{91240B29-F687-4f45-9708-019B960494DF}">
-                <a14:hiddenLine xmlns="" xmlns:a14="http://schemas.microsoft.com/office/drawing/2010/main" w="9525">
+                <a14:hiddenLine xmlns:a14="http://schemas.microsoft.com/office/drawing/2010/main" xmlns="" w="9525">
                   <a:solidFill>
                     <a:srgbClr val="000000"/>
                   </a:solidFill>
@@ -30587,7 +31017,7 @@
             </a:ln>
             <a:extLst>
               <a:ext uri="{91240B29-F687-4f45-9708-019B960494DF}">
-                <a14:hiddenLine xmlns="" xmlns:a14="http://schemas.microsoft.com/office/drawing/2010/main" w="9525">
+                <a14:hiddenLine xmlns:a14="http://schemas.microsoft.com/office/drawing/2010/main" xmlns="" w="9525">
                   <a:solidFill>
                     <a:srgbClr val="000000"/>
                   </a:solidFill>
@@ -30677,7 +31107,7 @@
             </a:ln>
             <a:extLst>
               <a:ext uri="{91240B29-F687-4f45-9708-019B960494DF}">
-                <a14:hiddenLine xmlns="" xmlns:a14="http://schemas.microsoft.com/office/drawing/2010/main" w="9525">
+                <a14:hiddenLine xmlns:a14="http://schemas.microsoft.com/office/drawing/2010/main" xmlns="" w="9525">
                   <a:solidFill>
                     <a:srgbClr val="000000"/>
                   </a:solidFill>
@@ -30739,7 +31169,7 @@
             </a:ln>
             <a:extLst>
               <a:ext uri="{91240B29-F687-4f45-9708-019B960494DF}">
-                <a14:hiddenLine xmlns="" xmlns:a14="http://schemas.microsoft.com/office/drawing/2010/main" w="9525">
+                <a14:hiddenLine xmlns:a14="http://schemas.microsoft.com/office/drawing/2010/main" xmlns="" w="9525">
                   <a:solidFill>
                     <a:srgbClr val="000000"/>
                   </a:solidFill>
@@ -30829,7 +31259,7 @@
             </a:ln>
             <a:extLst>
               <a:ext uri="{91240B29-F687-4f45-9708-019B960494DF}">
-                <a14:hiddenLine xmlns="" xmlns:a14="http://schemas.microsoft.com/office/drawing/2010/main" w="9525">
+                <a14:hiddenLine xmlns:a14="http://schemas.microsoft.com/office/drawing/2010/main" xmlns="" w="9525">
                   <a:solidFill>
                     <a:srgbClr val="000000"/>
                   </a:solidFill>
@@ -30863,7 +31293,7 @@
             </a:ln>
             <a:extLst>
               <a:ext uri="{91240B29-F687-4f45-9708-019B960494DF}">
-                <a14:hiddenLine xmlns="" xmlns:a14="http://schemas.microsoft.com/office/drawing/2010/main" w="9525">
+                <a14:hiddenLine xmlns:a14="http://schemas.microsoft.com/office/drawing/2010/main" xmlns="" w="9525">
                   <a:solidFill>
                     <a:srgbClr val="000000"/>
                   </a:solidFill>
@@ -30928,7 +31358,7 @@
             </a:ln>
             <a:extLst>
               <a:ext uri="{91240B29-F687-4f45-9708-019B960494DF}">
-                <a14:hiddenLine xmlns="" xmlns:a14="http://schemas.microsoft.com/office/drawing/2010/main" w="9525">
+                <a14:hiddenLine xmlns:a14="http://schemas.microsoft.com/office/drawing/2010/main" xmlns="" w="9525">
                   <a:solidFill>
                     <a:srgbClr val="000000"/>
                   </a:solidFill>
@@ -31018,7 +31448,7 @@
             </a:ln>
             <a:extLst>
               <a:ext uri="{91240B29-F687-4f45-9708-019B960494DF}">
-                <a14:hiddenLine xmlns="" xmlns:a14="http://schemas.microsoft.com/office/drawing/2010/main" w="9525">
+                <a14:hiddenLine xmlns:a14="http://schemas.microsoft.com/office/drawing/2010/main" xmlns="" w="9525">
                   <a:solidFill>
                     <a:srgbClr val="000000"/>
                   </a:solidFill>
@@ -31080,7 +31510,7 @@
             </a:ln>
             <a:extLst>
               <a:ext uri="{91240B29-F687-4f45-9708-019B960494DF}">
-                <a14:hiddenLine xmlns="" xmlns:a14="http://schemas.microsoft.com/office/drawing/2010/main" w="9525">
+                <a14:hiddenLine xmlns:a14="http://schemas.microsoft.com/office/drawing/2010/main" xmlns="" w="9525">
                   <a:solidFill>
                     <a:srgbClr val="000000"/>
                   </a:solidFill>
@@ -31170,7 +31600,7 @@
             </a:ln>
             <a:extLst>
               <a:ext uri="{91240B29-F687-4f45-9708-019B960494DF}">
-                <a14:hiddenLine xmlns="" xmlns:a14="http://schemas.microsoft.com/office/drawing/2010/main" w="9525">
+                <a14:hiddenLine xmlns:a14="http://schemas.microsoft.com/office/drawing/2010/main" xmlns="" w="9525">
                   <a:solidFill>
                     <a:srgbClr val="000000"/>
                   </a:solidFill>
@@ -31260,7 +31690,7 @@
             </a:ln>
             <a:extLst>
               <a:ext uri="{91240B29-F687-4f45-9708-019B960494DF}">
-                <a14:hiddenLine xmlns="" xmlns:a14="http://schemas.microsoft.com/office/drawing/2010/main" w="9525">
+                <a14:hiddenLine xmlns:a14="http://schemas.microsoft.com/office/drawing/2010/main" xmlns="" w="9525">
                   <a:solidFill>
                     <a:srgbClr val="000000"/>
                   </a:solidFill>
@@ -31325,7 +31755,7 @@
             </a:ln>
             <a:extLst>
               <a:ext uri="{91240B29-F687-4f45-9708-019B960494DF}">
-                <a14:hiddenLine xmlns="" xmlns:a14="http://schemas.microsoft.com/office/drawing/2010/main" w="9525">
+                <a14:hiddenLine xmlns:a14="http://schemas.microsoft.com/office/drawing/2010/main" xmlns="" w="9525">
                   <a:solidFill>
                     <a:srgbClr val="000000"/>
                   </a:solidFill>
@@ -31387,7 +31817,7 @@
             </a:ln>
             <a:extLst>
               <a:ext uri="{91240B29-F687-4f45-9708-019B960494DF}">
-                <a14:hiddenLine xmlns="" xmlns:a14="http://schemas.microsoft.com/office/drawing/2010/main" w="9525">
+                <a14:hiddenLine xmlns:a14="http://schemas.microsoft.com/office/drawing/2010/main" xmlns="" w="9525">
                   <a:solidFill>
                     <a:srgbClr val="000000"/>
                   </a:solidFill>
@@ -31477,7 +31907,7 @@
             </a:ln>
             <a:extLst>
               <a:ext uri="{91240B29-F687-4f45-9708-019B960494DF}">
-                <a14:hiddenLine xmlns="" xmlns:a14="http://schemas.microsoft.com/office/drawing/2010/main" w="9525">
+                <a14:hiddenLine xmlns:a14="http://schemas.microsoft.com/office/drawing/2010/main" xmlns="" w="9525">
                   <a:solidFill>
                     <a:srgbClr val="000000"/>
                   </a:solidFill>
@@ -31567,7 +31997,7 @@
             </a:ln>
             <a:extLst>
               <a:ext uri="{91240B29-F687-4f45-9708-019B960494DF}">
-                <a14:hiddenLine xmlns="" xmlns:a14="http://schemas.microsoft.com/office/drawing/2010/main" w="9525">
+                <a14:hiddenLine xmlns:a14="http://schemas.microsoft.com/office/drawing/2010/main" xmlns="" w="9525">
                   <a:solidFill>
                     <a:srgbClr val="000000"/>
                   </a:solidFill>
@@ -31629,7 +32059,7 @@
             </a:ln>
             <a:extLst>
               <a:ext uri="{91240B29-F687-4f45-9708-019B960494DF}">
-                <a14:hiddenLine xmlns="" xmlns:a14="http://schemas.microsoft.com/office/drawing/2010/main" w="9525">
+                <a14:hiddenLine xmlns:a14="http://schemas.microsoft.com/office/drawing/2010/main" xmlns="" w="9525">
                   <a:solidFill>
                     <a:srgbClr val="000000"/>
                   </a:solidFill>
@@ -31749,7 +32179,7 @@
             </a:ln>
             <a:extLst>
               <a:ext uri="{91240B29-F687-4f45-9708-019B960494DF}">
-                <a14:hiddenLine xmlns="" xmlns:a14="http://schemas.microsoft.com/office/drawing/2010/main" w="9525">
+                <a14:hiddenLine xmlns:a14="http://schemas.microsoft.com/office/drawing/2010/main" xmlns="" w="9525">
                   <a:solidFill>
                     <a:srgbClr val="000000"/>
                   </a:solidFill>
@@ -31817,7 +32247,7 @@
             </a:ln>
             <a:extLst>
               <a:ext uri="{91240B29-F687-4f45-9708-019B960494DF}">
-                <a14:hiddenLine xmlns="" xmlns:a14="http://schemas.microsoft.com/office/drawing/2010/main" w="9525">
+                <a14:hiddenLine xmlns:a14="http://schemas.microsoft.com/office/drawing/2010/main" xmlns="" w="9525">
                   <a:solidFill>
                     <a:srgbClr val="000000"/>
                   </a:solidFill>
@@ -31907,7 +32337,7 @@
             </a:ln>
             <a:extLst>
               <a:ext uri="{91240B29-F687-4f45-9708-019B960494DF}">
-                <a14:hiddenLine xmlns="" xmlns:a14="http://schemas.microsoft.com/office/drawing/2010/main" w="9525">
+                <a14:hiddenLine xmlns:a14="http://schemas.microsoft.com/office/drawing/2010/main" xmlns="" w="9525">
                   <a:solidFill>
                     <a:srgbClr val="000000"/>
                   </a:solidFill>
@@ -32047,7 +32477,7 @@
           <a:p>
             <a:fld id="{48A87A34-81AB-432B-8DAE-1953F412C126}" type="datetimeFigureOut">
               <a:rPr lang="en-US" smtClean="0"/>
-              <a:t>12/11/2017</a:t>
+              <a:t>12/12/2017</a:t>
             </a:fld>
             <a:endParaRPr lang="en-US"/>
           </a:p>
@@ -32315,7 +32745,7 @@
             <a:fld id="{48A87A34-81AB-432B-8DAE-1953F412C126}" type="datetimeFigureOut">
               <a:rPr lang="en-US" smtClean="0"/>
               <a:pPr/>
-              <a:t>12/11/2017</a:t>
+              <a:t>12/12/2017</a:t>
             </a:fld>
             <a:endParaRPr lang="en-US"/>
           </a:p>
@@ -32513,7 +32943,7 @@
             <a:fld id="{48A87A34-81AB-432B-8DAE-1953F412C126}" type="datetimeFigureOut">
               <a:rPr lang="en-US" smtClean="0"/>
               <a:pPr/>
-              <a:t>12/11/2017</a:t>
+              <a:t>12/12/2017</a:t>
             </a:fld>
             <a:endParaRPr lang="en-US"/>
           </a:p>
@@ -32778,7 +33208,7 @@
             <a:fld id="{48A87A34-81AB-432B-8DAE-1953F412C126}" type="datetimeFigureOut">
               <a:rPr lang="en-US" smtClean="0"/>
               <a:pPr/>
-              <a:t>12/11/2017</a:t>
+              <a:t>12/12/2017</a:t>
             </a:fld>
             <a:endParaRPr lang="en-US"/>
           </a:p>
@@ -33214,7 +33644,7 @@
             <a:fld id="{48A87A34-81AB-432B-8DAE-1953F412C126}" type="datetimeFigureOut">
               <a:rPr lang="en-US" smtClean="0"/>
               <a:pPr/>
-              <a:t>12/11/2017</a:t>
+              <a:t>12/12/2017</a:t>
             </a:fld>
             <a:endParaRPr lang="en-US"/>
           </a:p>
@@ -33762,7 +34192,7 @@
             <a:fld id="{48A87A34-81AB-432B-8DAE-1953F412C126}" type="datetimeFigureOut">
               <a:rPr lang="en-US" smtClean="0"/>
               <a:pPr/>
-              <a:t>12/11/2017</a:t>
+              <a:t>12/12/2017</a:t>
             </a:fld>
             <a:endParaRPr lang="en-US"/>
           </a:p>
@@ -34484,7 +34914,7 @@
             <a:fld id="{48A87A34-81AB-432B-8DAE-1953F412C126}" type="datetimeFigureOut">
               <a:rPr lang="en-US" smtClean="0"/>
               <a:pPr/>
-              <a:t>12/11/2017</a:t>
+              <a:t>12/12/2017</a:t>
             </a:fld>
             <a:endParaRPr lang="en-US"/>
           </a:p>
@@ -34656,7 +35086,7 @@
             <a:fld id="{48A87A34-81AB-432B-8DAE-1953F412C126}" type="datetimeFigureOut">
               <a:rPr lang="en-US" smtClean="0"/>
               <a:pPr/>
-              <a:t>12/11/2017</a:t>
+              <a:t>12/12/2017</a:t>
             </a:fld>
             <a:endParaRPr lang="en-US"/>
           </a:p>
@@ -34838,7 +35268,7 @@
             <a:fld id="{48A87A34-81AB-432B-8DAE-1953F412C126}" type="datetimeFigureOut">
               <a:rPr lang="en-US" smtClean="0"/>
               <a:pPr/>
-              <a:t>12/11/2017</a:t>
+              <a:t>12/12/2017</a:t>
             </a:fld>
             <a:endParaRPr lang="en-US"/>
           </a:p>
@@ -35010,7 +35440,7 @@
             <a:fld id="{48A87A34-81AB-432B-8DAE-1953F412C126}" type="datetimeFigureOut">
               <a:rPr lang="en-US" smtClean="0"/>
               <a:pPr/>
-              <a:t>12/11/2017</a:t>
+              <a:t>12/12/2017</a:t>
             </a:fld>
             <a:endParaRPr lang="en-US"/>
           </a:p>
@@ -35261,7 +35691,7 @@
           <a:p>
             <a:fld id="{48A87A34-81AB-432B-8DAE-1953F412C126}" type="datetimeFigureOut">
               <a:rPr lang="en-US" smtClean="0"/>
-              <a:t>12/11/2017</a:t>
+              <a:t>12/12/2017</a:t>
             </a:fld>
             <a:endParaRPr lang="en-US"/>
           </a:p>
@@ -35494,7 +35924,7 @@
             <a:fld id="{48A87A34-81AB-432B-8DAE-1953F412C126}" type="datetimeFigureOut">
               <a:rPr lang="en-US" smtClean="0"/>
               <a:pPr/>
-              <a:t>12/11/2017</a:t>
+              <a:t>12/12/2017</a:t>
             </a:fld>
             <a:endParaRPr lang="en-US"/>
           </a:p>
@@ -35877,7 +36307,7 @@
             <a:fld id="{48A87A34-81AB-432B-8DAE-1953F412C126}" type="datetimeFigureOut">
               <a:rPr lang="en-US" smtClean="0"/>
               <a:pPr/>
-              <a:t>12/11/2017</a:t>
+              <a:t>12/12/2017</a:t>
             </a:fld>
             <a:endParaRPr lang="en-US"/>
           </a:p>
@@ -35996,7 +36426,7 @@
           <a:p>
             <a:fld id="{48A87A34-81AB-432B-8DAE-1953F412C126}" type="datetimeFigureOut">
               <a:rPr lang="en-US" smtClean="0"/>
-              <a:t>12/11/2017</a:t>
+              <a:t>12/12/2017</a:t>
             </a:fld>
             <a:endParaRPr lang="en-US"/>
           </a:p>
@@ -36091,7 +36521,7 @@
           <a:p>
             <a:fld id="{48A87A34-81AB-432B-8DAE-1953F412C126}" type="datetimeFigureOut">
               <a:rPr lang="en-US" smtClean="0"/>
-              <a:t>12/11/2017</a:t>
+              <a:t>12/12/2017</a:t>
             </a:fld>
             <a:endParaRPr lang="en-US"/>
           </a:p>
@@ -36341,7 +36771,7 @@
             <a:fld id="{48A87A34-81AB-432B-8DAE-1953F412C126}" type="datetimeFigureOut">
               <a:rPr lang="en-US" smtClean="0"/>
               <a:pPr/>
-              <a:t>12/11/2017</a:t>
+              <a:t>12/12/2017</a:t>
             </a:fld>
             <a:endParaRPr lang="en-US"/>
           </a:p>
@@ -36622,7 +37052,7 @@
           <a:p>
             <a:fld id="{48A87A34-81AB-432B-8DAE-1953F412C126}" type="datetimeFigureOut">
               <a:rPr lang="en-US" smtClean="0"/>
-              <a:t>12/11/2017</a:t>
+              <a:t>12/12/2017</a:t>
             </a:fld>
             <a:endParaRPr lang="en-US"/>
           </a:p>
@@ -36738,7 +37168,7 @@
           <a:noFill/>
           <a:extLst>
             <a:ext uri="{909E8E84-426E-40dd-AFC4-6F175D3DCCD1}">
-              <a14:hiddenFill xmlns="" xmlns:a14="http://schemas.microsoft.com/office/drawing/2010/main">
+              <a14:hiddenFill xmlns:a14="http://schemas.microsoft.com/office/drawing/2010/main" xmlns="">
                 <a:solidFill>
                   <a:srgbClr val="FFFFFF"/>
                 </a:solidFill>
@@ -36812,7 +37242,7 @@
               </a:ln>
               <a:extLst>
                 <a:ext uri="{91240B29-F687-4f45-9708-019B960494DF}">
-                  <a14:hiddenLine xmlns="" xmlns:a14="http://schemas.microsoft.com/office/drawing/2010/main" w="9525">
+                  <a14:hiddenLine xmlns:a14="http://schemas.microsoft.com/office/drawing/2010/main" xmlns="" w="9525">
                     <a:solidFill>
                       <a:srgbClr val="000000"/>
                     </a:solidFill>
@@ -36902,7 +37332,7 @@
               </a:ln>
               <a:extLst>
                 <a:ext uri="{91240B29-F687-4f45-9708-019B960494DF}">
-                  <a14:hiddenLine xmlns="" xmlns:a14="http://schemas.microsoft.com/office/drawing/2010/main" w="9525">
+                  <a14:hiddenLine xmlns:a14="http://schemas.microsoft.com/office/drawing/2010/main" xmlns="" w="9525">
                     <a:solidFill>
                       <a:srgbClr val="000000"/>
                     </a:solidFill>
@@ -36992,7 +37422,7 @@
               </a:ln>
               <a:extLst>
                 <a:ext uri="{91240B29-F687-4f45-9708-019B960494DF}">
-                  <a14:hiddenLine xmlns="" xmlns:a14="http://schemas.microsoft.com/office/drawing/2010/main" w="9525">
+                  <a14:hiddenLine xmlns:a14="http://schemas.microsoft.com/office/drawing/2010/main" xmlns="" w="9525">
                     <a:solidFill>
                       <a:srgbClr val="000000"/>
                     </a:solidFill>
@@ -37054,7 +37484,7 @@
               </a:ln>
               <a:extLst>
                 <a:ext uri="{91240B29-F687-4f45-9708-019B960494DF}">
-                  <a14:hiddenLine xmlns="" xmlns:a14="http://schemas.microsoft.com/office/drawing/2010/main" w="9525">
+                  <a14:hiddenLine xmlns:a14="http://schemas.microsoft.com/office/drawing/2010/main" xmlns="" w="9525">
                     <a:solidFill>
                       <a:srgbClr val="000000"/>
                     </a:solidFill>
@@ -37144,7 +37574,7 @@
               </a:ln>
               <a:extLst>
                 <a:ext uri="{91240B29-F687-4f45-9708-019B960494DF}">
-                  <a14:hiddenLine xmlns="" xmlns:a14="http://schemas.microsoft.com/office/drawing/2010/main" w="9525">
+                  <a14:hiddenLine xmlns:a14="http://schemas.microsoft.com/office/drawing/2010/main" xmlns="" w="9525">
                     <a:solidFill>
                       <a:srgbClr val="000000"/>
                     </a:solidFill>
@@ -37206,7 +37636,7 @@
               </a:ln>
               <a:extLst>
                 <a:ext uri="{91240B29-F687-4f45-9708-019B960494DF}">
-                  <a14:hiddenLine xmlns="" xmlns:a14="http://schemas.microsoft.com/office/drawing/2010/main" w="9525">
+                  <a14:hiddenLine xmlns:a14="http://schemas.microsoft.com/office/drawing/2010/main" xmlns="" w="9525">
                     <a:solidFill>
                       <a:srgbClr val="000000"/>
                     </a:solidFill>
@@ -37268,7 +37698,7 @@
               </a:ln>
               <a:extLst>
                 <a:ext uri="{91240B29-F687-4f45-9708-019B960494DF}">
-                  <a14:hiddenLine xmlns="" xmlns:a14="http://schemas.microsoft.com/office/drawing/2010/main" w="9525">
+                  <a14:hiddenLine xmlns:a14="http://schemas.microsoft.com/office/drawing/2010/main" xmlns="" w="9525">
                     <a:solidFill>
                       <a:srgbClr val="000000"/>
                     </a:solidFill>
@@ -37358,7 +37788,7 @@
               </a:ln>
               <a:extLst>
                 <a:ext uri="{91240B29-F687-4f45-9708-019B960494DF}">
-                  <a14:hiddenLine xmlns="" xmlns:a14="http://schemas.microsoft.com/office/drawing/2010/main" w="9525">
+                  <a14:hiddenLine xmlns:a14="http://schemas.microsoft.com/office/drawing/2010/main" xmlns="" w="9525">
                     <a:solidFill>
                       <a:srgbClr val="000000"/>
                     </a:solidFill>
@@ -37448,7 +37878,7 @@
               </a:ln>
               <a:extLst>
                 <a:ext uri="{91240B29-F687-4f45-9708-019B960494DF}">
-                  <a14:hiddenLine xmlns="" xmlns:a14="http://schemas.microsoft.com/office/drawing/2010/main" w="9525">
+                  <a14:hiddenLine xmlns:a14="http://schemas.microsoft.com/office/drawing/2010/main" xmlns="" w="9525">
                     <a:solidFill>
                       <a:srgbClr val="000000"/>
                     </a:solidFill>
@@ -37510,7 +37940,7 @@
               </a:ln>
               <a:extLst>
                 <a:ext uri="{91240B29-F687-4f45-9708-019B960494DF}">
-                  <a14:hiddenLine xmlns="" xmlns:a14="http://schemas.microsoft.com/office/drawing/2010/main" w="9525">
+                  <a14:hiddenLine xmlns:a14="http://schemas.microsoft.com/office/drawing/2010/main" xmlns="" w="9525">
                     <a:solidFill>
                       <a:srgbClr val="000000"/>
                     </a:solidFill>
@@ -37620,7 +38050,7 @@
               </a:ln>
               <a:extLst>
                 <a:ext uri="{91240B29-F687-4f45-9708-019B960494DF}">
-                  <a14:hiddenLine xmlns="" xmlns:a14="http://schemas.microsoft.com/office/drawing/2010/main" w="9525">
+                  <a14:hiddenLine xmlns:a14="http://schemas.microsoft.com/office/drawing/2010/main" xmlns="" w="9525">
                     <a:solidFill>
                       <a:srgbClr val="000000"/>
                     </a:solidFill>
@@ -37704,7 +38134,7 @@
               </a:ln>
               <a:extLst>
                 <a:ext uri="{91240B29-F687-4f45-9708-019B960494DF}">
-                  <a14:hiddenLine xmlns="" xmlns:a14="http://schemas.microsoft.com/office/drawing/2010/main" w="9525">
+                  <a14:hiddenLine xmlns:a14="http://schemas.microsoft.com/office/drawing/2010/main" xmlns="" w="9525">
                     <a:solidFill>
                       <a:srgbClr val="000000"/>
                     </a:solidFill>
@@ -37766,7 +38196,7 @@
               </a:ln>
               <a:extLst>
                 <a:ext uri="{91240B29-F687-4f45-9708-019B960494DF}">
-                  <a14:hiddenLine xmlns="" xmlns:a14="http://schemas.microsoft.com/office/drawing/2010/main" w="9525">
+                  <a14:hiddenLine xmlns:a14="http://schemas.microsoft.com/office/drawing/2010/main" xmlns="" w="9525">
                     <a:solidFill>
                       <a:srgbClr val="000000"/>
                     </a:solidFill>
@@ -37828,7 +38258,7 @@
               </a:ln>
               <a:extLst>
                 <a:ext uri="{91240B29-F687-4f45-9708-019B960494DF}">
-                  <a14:hiddenLine xmlns="" xmlns:a14="http://schemas.microsoft.com/office/drawing/2010/main" w="9525">
+                  <a14:hiddenLine xmlns:a14="http://schemas.microsoft.com/office/drawing/2010/main" xmlns="" w="9525">
                     <a:solidFill>
                       <a:srgbClr val="000000"/>
                     </a:solidFill>
@@ -37918,7 +38348,7 @@
               </a:ln>
               <a:extLst>
                 <a:ext uri="{91240B29-F687-4f45-9708-019B960494DF}">
-                  <a14:hiddenLine xmlns="" xmlns:a14="http://schemas.microsoft.com/office/drawing/2010/main" w="9525">
+                  <a14:hiddenLine xmlns:a14="http://schemas.microsoft.com/office/drawing/2010/main" xmlns="" w="9525">
                     <a:solidFill>
                       <a:srgbClr val="000000"/>
                     </a:solidFill>
@@ -37952,7 +38382,7 @@
               </a:ln>
               <a:extLst>
                 <a:ext uri="{91240B29-F687-4f45-9708-019B960494DF}">
-                  <a14:hiddenLine xmlns="" xmlns:a14="http://schemas.microsoft.com/office/drawing/2010/main" w="9525">
+                  <a14:hiddenLine xmlns:a14="http://schemas.microsoft.com/office/drawing/2010/main" xmlns="" w="9525">
                     <a:solidFill>
                       <a:srgbClr val="000000"/>
                     </a:solidFill>
@@ -38017,7 +38447,7 @@
               </a:ln>
               <a:extLst>
                 <a:ext uri="{91240B29-F687-4f45-9708-019B960494DF}">
-                  <a14:hiddenLine xmlns="" xmlns:a14="http://schemas.microsoft.com/office/drawing/2010/main" w="9525">
+                  <a14:hiddenLine xmlns:a14="http://schemas.microsoft.com/office/drawing/2010/main" xmlns="" w="9525">
                     <a:solidFill>
                       <a:srgbClr val="000000"/>
                     </a:solidFill>
@@ -38107,7 +38537,7 @@
               </a:ln>
               <a:extLst>
                 <a:ext uri="{91240B29-F687-4f45-9708-019B960494DF}">
-                  <a14:hiddenLine xmlns="" xmlns:a14="http://schemas.microsoft.com/office/drawing/2010/main" w="9525">
+                  <a14:hiddenLine xmlns:a14="http://schemas.microsoft.com/office/drawing/2010/main" xmlns="" w="9525">
                     <a:solidFill>
                       <a:srgbClr val="000000"/>
                     </a:solidFill>
@@ -38169,7 +38599,7 @@
               </a:ln>
               <a:extLst>
                 <a:ext uri="{91240B29-F687-4f45-9708-019B960494DF}">
-                  <a14:hiddenLine xmlns="" xmlns:a14="http://schemas.microsoft.com/office/drawing/2010/main" w="9525">
+                  <a14:hiddenLine xmlns:a14="http://schemas.microsoft.com/office/drawing/2010/main" xmlns="" w="9525">
                     <a:solidFill>
                       <a:srgbClr val="000000"/>
                     </a:solidFill>
@@ -38259,7 +38689,7 @@
               </a:ln>
               <a:extLst>
                 <a:ext uri="{91240B29-F687-4f45-9708-019B960494DF}">
-                  <a14:hiddenLine xmlns="" xmlns:a14="http://schemas.microsoft.com/office/drawing/2010/main" w="9525">
+                  <a14:hiddenLine xmlns:a14="http://schemas.microsoft.com/office/drawing/2010/main" xmlns="" w="9525">
                     <a:solidFill>
                       <a:srgbClr val="000000"/>
                     </a:solidFill>
@@ -38324,7 +38754,7 @@
               </a:ln>
               <a:extLst>
                 <a:ext uri="{91240B29-F687-4f45-9708-019B960494DF}">
-                  <a14:hiddenLine xmlns="" xmlns:a14="http://schemas.microsoft.com/office/drawing/2010/main" w="9525">
+                  <a14:hiddenLine xmlns:a14="http://schemas.microsoft.com/office/drawing/2010/main" xmlns="" w="9525">
                     <a:solidFill>
                       <a:srgbClr val="000000"/>
                     </a:solidFill>
@@ -38386,7 +38816,7 @@
               </a:ln>
               <a:extLst>
                 <a:ext uri="{91240B29-F687-4f45-9708-019B960494DF}">
-                  <a14:hiddenLine xmlns="" xmlns:a14="http://schemas.microsoft.com/office/drawing/2010/main" w="9525">
+                  <a14:hiddenLine xmlns:a14="http://schemas.microsoft.com/office/drawing/2010/main" xmlns="" w="9525">
                     <a:solidFill>
                       <a:srgbClr val="000000"/>
                     </a:solidFill>
@@ -38476,7 +38906,7 @@
               </a:ln>
               <a:extLst>
                 <a:ext uri="{91240B29-F687-4f45-9708-019B960494DF}">
-                  <a14:hiddenLine xmlns="" xmlns:a14="http://schemas.microsoft.com/office/drawing/2010/main" w="9525">
+                  <a14:hiddenLine xmlns:a14="http://schemas.microsoft.com/office/drawing/2010/main" xmlns="" w="9525">
                     <a:solidFill>
                       <a:srgbClr val="000000"/>
                     </a:solidFill>
@@ -38566,7 +38996,7 @@
               </a:ln>
               <a:extLst>
                 <a:ext uri="{91240B29-F687-4f45-9708-019B960494DF}">
-                  <a14:hiddenLine xmlns="" xmlns:a14="http://schemas.microsoft.com/office/drawing/2010/main" w="9525">
+                  <a14:hiddenLine xmlns:a14="http://schemas.microsoft.com/office/drawing/2010/main" xmlns="" w="9525">
                     <a:solidFill>
                       <a:srgbClr val="000000"/>
                     </a:solidFill>
@@ -38631,7 +39061,7 @@
               </a:ln>
               <a:extLst>
                 <a:ext uri="{91240B29-F687-4f45-9708-019B960494DF}">
-                  <a14:hiddenLine xmlns="" xmlns:a14="http://schemas.microsoft.com/office/drawing/2010/main" w="9525">
+                  <a14:hiddenLine xmlns:a14="http://schemas.microsoft.com/office/drawing/2010/main" xmlns="" w="9525">
                     <a:solidFill>
                       <a:srgbClr val="000000"/>
                     </a:solidFill>
@@ -38751,7 +39181,7 @@
               </a:ln>
               <a:extLst>
                 <a:ext uri="{91240B29-F687-4f45-9708-019B960494DF}">
-                  <a14:hiddenLine xmlns="" xmlns:a14="http://schemas.microsoft.com/office/drawing/2010/main" w="9525">
+                  <a14:hiddenLine xmlns:a14="http://schemas.microsoft.com/office/drawing/2010/main" xmlns="" w="9525">
                     <a:solidFill>
                       <a:srgbClr val="000000"/>
                     </a:solidFill>
@@ -38849,7 +39279,7 @@
               </a:ln>
               <a:extLst>
                 <a:ext uri="{91240B29-F687-4f45-9708-019B960494DF}">
-                  <a14:hiddenLine xmlns="" xmlns:a14="http://schemas.microsoft.com/office/drawing/2010/main" w="9525">
+                  <a14:hiddenLine xmlns:a14="http://schemas.microsoft.com/office/drawing/2010/main" xmlns="" w="9525">
                     <a:solidFill>
                       <a:srgbClr val="000000"/>
                     </a:solidFill>
@@ -38964,7 +39394,7 @@
               </a:ln>
               <a:extLst>
                 <a:ext uri="{91240B29-F687-4f45-9708-019B960494DF}">
-                  <a14:hiddenLine xmlns="" xmlns:a14="http://schemas.microsoft.com/office/drawing/2010/main" w="9525">
+                  <a14:hiddenLine xmlns:a14="http://schemas.microsoft.com/office/drawing/2010/main" xmlns="" w="9525">
                     <a:solidFill>
                       <a:srgbClr val="000000"/>
                     </a:solidFill>
@@ -39054,7 +39484,7 @@
               </a:ln>
               <a:extLst>
                 <a:ext uri="{91240B29-F687-4f45-9708-019B960494DF}">
-                  <a14:hiddenLine xmlns="" xmlns:a14="http://schemas.microsoft.com/office/drawing/2010/main" w="9525">
+                  <a14:hiddenLine xmlns:a14="http://schemas.microsoft.com/office/drawing/2010/main" xmlns="" w="9525">
                     <a:solidFill>
                       <a:srgbClr val="000000"/>
                     </a:solidFill>
@@ -39119,7 +39549,7 @@
               </a:ln>
               <a:extLst>
                 <a:ext uri="{91240B29-F687-4f45-9708-019B960494DF}">
-                  <a14:hiddenLine xmlns="" xmlns:a14="http://schemas.microsoft.com/office/drawing/2010/main" w="9525">
+                  <a14:hiddenLine xmlns:a14="http://schemas.microsoft.com/office/drawing/2010/main" xmlns="" w="9525">
                     <a:solidFill>
                       <a:srgbClr val="000000"/>
                     </a:solidFill>
@@ -39209,7 +39639,7 @@
               </a:ln>
               <a:extLst>
                 <a:ext uri="{91240B29-F687-4f45-9708-019B960494DF}">
-                  <a14:hiddenLine xmlns="" xmlns:a14="http://schemas.microsoft.com/office/drawing/2010/main" w="9525">
+                  <a14:hiddenLine xmlns:a14="http://schemas.microsoft.com/office/drawing/2010/main" xmlns="" w="9525">
                     <a:solidFill>
                       <a:srgbClr val="000000"/>
                     </a:solidFill>
@@ -39277,7 +39707,7 @@
               </a:ln>
               <a:extLst>
                 <a:ext uri="{91240B29-F687-4f45-9708-019B960494DF}">
-                  <a14:hiddenLine xmlns="" xmlns:a14="http://schemas.microsoft.com/office/drawing/2010/main" w="9525">
+                  <a14:hiddenLine xmlns:a14="http://schemas.microsoft.com/office/drawing/2010/main" xmlns="" w="9525">
                     <a:solidFill>
                       <a:srgbClr val="000000"/>
                     </a:solidFill>
@@ -39367,7 +39797,7 @@
               </a:ln>
               <a:extLst>
                 <a:ext uri="{91240B29-F687-4f45-9708-019B960494DF}">
-                  <a14:hiddenLine xmlns="" xmlns:a14="http://schemas.microsoft.com/office/drawing/2010/main" w="9525">
+                  <a14:hiddenLine xmlns:a14="http://schemas.microsoft.com/office/drawing/2010/main" xmlns="" w="9525">
                     <a:solidFill>
                       <a:srgbClr val="000000"/>
                     </a:solidFill>
@@ -39435,7 +39865,7 @@
               </a:ln>
               <a:extLst>
                 <a:ext uri="{91240B29-F687-4f45-9708-019B960494DF}">
-                  <a14:hiddenLine xmlns="" xmlns:a14="http://schemas.microsoft.com/office/drawing/2010/main" w="9525">
+                  <a14:hiddenLine xmlns:a14="http://schemas.microsoft.com/office/drawing/2010/main" xmlns="" w="9525">
                     <a:solidFill>
                       <a:srgbClr val="000000"/>
                     </a:solidFill>
@@ -39525,7 +39955,7 @@
               </a:ln>
               <a:extLst>
                 <a:ext uri="{91240B29-F687-4f45-9708-019B960494DF}">
-                  <a14:hiddenLine xmlns="" xmlns:a14="http://schemas.microsoft.com/office/drawing/2010/main" w="9525">
+                  <a14:hiddenLine xmlns:a14="http://schemas.microsoft.com/office/drawing/2010/main" xmlns="" w="9525">
                     <a:solidFill>
                       <a:srgbClr val="000000"/>
                     </a:solidFill>
@@ -39559,7 +39989,7 @@
               </a:ln>
               <a:extLst>
                 <a:ext uri="{91240B29-F687-4f45-9708-019B960494DF}">
-                  <a14:hiddenLine xmlns="" xmlns:a14="http://schemas.microsoft.com/office/drawing/2010/main" w="9525">
+                  <a14:hiddenLine xmlns:a14="http://schemas.microsoft.com/office/drawing/2010/main" xmlns="" w="9525">
                     <a:solidFill>
                       <a:srgbClr val="000000"/>
                     </a:solidFill>
@@ -39700,7 +40130,7 @@
             <a:fld id="{48A87A34-81AB-432B-8DAE-1953F412C126}" type="datetimeFigureOut">
               <a:rPr lang="en-US" smtClean="0"/>
               <a:pPr/>
-              <a:t>12/11/2017</a:t>
+              <a:t>12/12/2017</a:t>
             </a:fld>
             <a:endParaRPr lang="en-US"/>
           </a:p>
@@ -40539,9 +40969,17 @@
               <a:rPr lang="hu-HU"/>
               <a:t> címtáblákban</a:t>
             </a:r>
+            <a:r>
+              <a:rPr lang="hu-HU" b="1"/>
+              <a:t/>
+            </a:r>
             <a:br>
               <a:rPr lang="hu-HU" b="1"/>
             </a:br>
+            <a:r>
+              <a:rPr lang="hu-HU" b="1"/>
+              <a:t/>
+            </a:r>
             <a:br>
               <a:rPr lang="hu-HU" b="1"/>
             </a:br>
@@ -43057,14 +43495,14 @@
           <p:nvPr>
             <p:extLst>
               <p:ext uri="{D42A27DB-BD31-4B8C-83A1-F6EECF244321}">
-                <p14:modId xmlns:p14="http://schemas.microsoft.com/office/powerpoint/2010/main" val="3116221257"/>
+                <p14:modId xmlns:p14="http://schemas.microsoft.com/office/powerpoint/2010/main" val="97204686"/>
               </p:ext>
             </p:extLst>
           </p:nvPr>
         </p:nvGraphicFramePr>
         <p:xfrm>
-          <a:off x="1343025" y="972640"/>
-          <a:ext cx="9267825" cy="5618660"/>
+          <a:off x="1343025" y="1591408"/>
+          <a:ext cx="9267825" cy="4999892"/>
         </p:xfrm>
         <a:graphic>
           <a:graphicData uri="http://schemas.openxmlformats.org/drawingml/2006/diagram">
@@ -43238,9 +43676,17 @@
               <a:rPr lang="hu-HU"/>
               <a:t>Az adatbázisban MAC alapján</a:t>
             </a:r>
+            <a:r>
+              <a:rPr lang="hu-HU" b="1"/>
+              <a:t/>
+            </a:r>
             <a:br>
               <a:rPr lang="hu-HU" b="1"/>
             </a:br>
+            <a:r>
+              <a:rPr lang="hu-HU" b="1"/>
+              <a:t/>
+            </a:r>
             <a:br>
               <a:rPr lang="hu-HU" b="1"/>
             </a:br>

</xml_diff>